<commit_message>
adicionando arquitetura e novas imagens
</commit_message>
<xml_diff>
--- a/docs/Hackaton-TechMedicos.pptx
+++ b/docs/Hackaton-TechMedicos.pptx
@@ -994,7 +994,7 @@
       </p:grpSpPr>
       <p:sp>
         <p:nvSpPr>
-          <p:cNvPr id="122" name="Google Shape;122;g21bd412a062_0_80:notes"/>
+          <p:cNvPr id="122" name="Google Shape;122;p10:notes"/>
           <p:cNvSpPr/>
           <p:nvPr>
             <p:ph idx="2" type="sldImg"/>
@@ -1039,7 +1039,7 @@
       </p:sp>
       <p:sp>
         <p:nvSpPr>
-          <p:cNvPr id="123" name="Google Shape;123;g21bd412a062_0_80:notes"/>
+          <p:cNvPr id="123" name="Google Shape;123;p10:notes"/>
           <p:cNvSpPr txBox="1"/>
           <p:nvPr>
             <p:ph idx="1" type="body"/>
@@ -1111,7 +1111,7 @@
       </p:grpSpPr>
       <p:sp>
         <p:nvSpPr>
-          <p:cNvPr id="128" name="Google Shape;128;g21bd412a062_0_90:notes"/>
+          <p:cNvPr id="128" name="Google Shape;128;p11:notes"/>
           <p:cNvSpPr/>
           <p:nvPr>
             <p:ph idx="2" type="sldImg"/>
@@ -1142,11 +1142,21 @@
               </a:path>
             </a:pathLst>
           </a:custGeom>
+          <a:noFill/>
+          <a:ln cap="flat" cmpd="sng" w="9525">
+            <a:solidFill>
+              <a:srgbClr val="000000"/>
+            </a:solidFill>
+            <a:prstDash val="solid"/>
+            <a:round/>
+            <a:headEnd len="sm" w="sm" type="none"/>
+            <a:tailEnd len="sm" w="sm" type="none"/>
+          </a:ln>
         </p:spPr>
       </p:sp>
       <p:sp>
         <p:nvSpPr>
-          <p:cNvPr id="129" name="Google Shape;129;g21bd412a062_0_90:notes"/>
+          <p:cNvPr id="129" name="Google Shape;129;p11:notes"/>
           <p:cNvSpPr txBox="1"/>
           <p:nvPr>
             <p:ph idx="1" type="body"/>
@@ -1160,6 +1170,10 @@
           <a:prstGeom prst="rect">
             <a:avLst/>
           </a:prstGeom>
+          <a:noFill/>
+          <a:ln>
+            <a:noFill/>
+          </a:ln>
         </p:spPr>
         <p:txBody>
           <a:bodyPr anchorCtr="0" anchor="t" bIns="91425" lIns="91425" spcFirstLastPara="1" rIns="91425" wrap="square" tIns="91425">
@@ -1168,12 +1182,16 @@
           <a:lstStyle/>
           <a:p>
             <a:pPr indent="0" lvl="0" marL="0" rtl="0" algn="l">
-              <a:spcBef>
-                <a:spcPts val="0"/>
-              </a:spcBef>
-              <a:spcAft>
-                <a:spcPts val="0"/>
-              </a:spcAft>
+              <a:lnSpc>
+                <a:spcPct val="100000"/>
+              </a:lnSpc>
+              <a:spcBef>
+                <a:spcPts val="0"/>
+              </a:spcBef>
+              <a:spcAft>
+                <a:spcPts val="0"/>
+              </a:spcAft>
+              <a:buSzPts val="1100"/>
               <a:buNone/>
             </a:pPr>
             <a:r>
@@ -1210,7 +1228,7 @@
       </p:grpSpPr>
       <p:sp>
         <p:nvSpPr>
-          <p:cNvPr id="134" name="Google Shape;134;g21bd412a062_0_85:notes"/>
+          <p:cNvPr id="134" name="Google Shape;134;p12:notes"/>
           <p:cNvSpPr/>
           <p:nvPr>
             <p:ph idx="2" type="sldImg"/>
@@ -1241,11 +1259,21 @@
               </a:path>
             </a:pathLst>
           </a:custGeom>
+          <a:noFill/>
+          <a:ln cap="flat" cmpd="sng" w="9525">
+            <a:solidFill>
+              <a:srgbClr val="000000"/>
+            </a:solidFill>
+            <a:prstDash val="solid"/>
+            <a:round/>
+            <a:headEnd len="sm" w="sm" type="none"/>
+            <a:tailEnd len="sm" w="sm" type="none"/>
+          </a:ln>
         </p:spPr>
       </p:sp>
       <p:sp>
         <p:nvSpPr>
-          <p:cNvPr id="135" name="Google Shape;135;g21bd412a062_0_85:notes"/>
+          <p:cNvPr id="135" name="Google Shape;135;p12:notes"/>
           <p:cNvSpPr txBox="1"/>
           <p:nvPr>
             <p:ph idx="1" type="body"/>
@@ -1259,6 +1287,10 @@
           <a:prstGeom prst="rect">
             <a:avLst/>
           </a:prstGeom>
+          <a:noFill/>
+          <a:ln>
+            <a:noFill/>
+          </a:ln>
         </p:spPr>
         <p:txBody>
           <a:bodyPr anchorCtr="0" anchor="t" bIns="91425" lIns="91425" spcFirstLastPara="1" rIns="91425" wrap="square" tIns="91425">
@@ -1267,12 +1299,16 @@
           <a:lstStyle/>
           <a:p>
             <a:pPr indent="0" lvl="0" marL="0" rtl="0" algn="l">
-              <a:spcBef>
-                <a:spcPts val="0"/>
-              </a:spcBef>
-              <a:spcAft>
-                <a:spcPts val="0"/>
-              </a:spcAft>
+              <a:lnSpc>
+                <a:spcPct val="100000"/>
+              </a:lnSpc>
+              <a:spcBef>
+                <a:spcPts val="0"/>
+              </a:spcBef>
+              <a:spcAft>
+                <a:spcPts val="0"/>
+              </a:spcAft>
+              <a:buSzPts val="1100"/>
               <a:buNone/>
             </a:pPr>
             <a:r>
@@ -1309,7 +1345,7 @@
       </p:grpSpPr>
       <p:sp>
         <p:nvSpPr>
-          <p:cNvPr id="140" name="Google Shape;140;g21bd412a062_0_60:notes"/>
+          <p:cNvPr id="140" name="Google Shape;140;p13:notes"/>
           <p:cNvSpPr/>
           <p:nvPr>
             <p:ph idx="2" type="sldImg"/>
@@ -1340,11 +1376,21 @@
               </a:path>
             </a:pathLst>
           </a:custGeom>
+          <a:noFill/>
+          <a:ln cap="flat" cmpd="sng" w="9525">
+            <a:solidFill>
+              <a:srgbClr val="000000"/>
+            </a:solidFill>
+            <a:prstDash val="solid"/>
+            <a:round/>
+            <a:headEnd len="sm" w="sm" type="none"/>
+            <a:tailEnd len="sm" w="sm" type="none"/>
+          </a:ln>
         </p:spPr>
       </p:sp>
       <p:sp>
         <p:nvSpPr>
-          <p:cNvPr id="141" name="Google Shape;141;g21bd412a062_0_60:notes"/>
+          <p:cNvPr id="141" name="Google Shape;141;p13:notes"/>
           <p:cNvSpPr txBox="1"/>
           <p:nvPr>
             <p:ph idx="1" type="body"/>
@@ -1358,6 +1404,10 @@
           <a:prstGeom prst="rect">
             <a:avLst/>
           </a:prstGeom>
+          <a:noFill/>
+          <a:ln>
+            <a:noFill/>
+          </a:ln>
         </p:spPr>
         <p:txBody>
           <a:bodyPr anchorCtr="0" anchor="t" bIns="91425" lIns="91425" spcFirstLastPara="1" rIns="91425" wrap="square" tIns="91425">
@@ -1366,12 +1416,16 @@
           <a:lstStyle/>
           <a:p>
             <a:pPr indent="0" lvl="0" marL="0" rtl="0" algn="l">
-              <a:spcBef>
-                <a:spcPts val="0"/>
-              </a:spcBef>
-              <a:spcAft>
-                <a:spcPts val="0"/>
-              </a:spcAft>
+              <a:lnSpc>
+                <a:spcPct val="100000"/>
+              </a:lnSpc>
+              <a:spcBef>
+                <a:spcPts val="0"/>
+              </a:spcBef>
+              <a:spcAft>
+                <a:spcPts val="0"/>
+              </a:spcAft>
+              <a:buSzPts val="1100"/>
               <a:buNone/>
             </a:pPr>
             <a:r>
@@ -1408,7 +1462,7 @@
       </p:grpSpPr>
       <p:sp>
         <p:nvSpPr>
-          <p:cNvPr id="146" name="Google Shape;146;g21bd412a062_0_124:notes"/>
+          <p:cNvPr id="146" name="Google Shape;146;p14:notes"/>
           <p:cNvSpPr/>
           <p:nvPr>
             <p:ph idx="2" type="sldImg"/>
@@ -1439,11 +1493,21 @@
               </a:path>
             </a:pathLst>
           </a:custGeom>
+          <a:noFill/>
+          <a:ln cap="flat" cmpd="sng" w="9525">
+            <a:solidFill>
+              <a:srgbClr val="000000"/>
+            </a:solidFill>
+            <a:prstDash val="solid"/>
+            <a:round/>
+            <a:headEnd len="sm" w="sm" type="none"/>
+            <a:tailEnd len="sm" w="sm" type="none"/>
+          </a:ln>
         </p:spPr>
       </p:sp>
       <p:sp>
         <p:nvSpPr>
-          <p:cNvPr id="147" name="Google Shape;147;g21bd412a062_0_124:notes"/>
+          <p:cNvPr id="147" name="Google Shape;147;p14:notes"/>
           <p:cNvSpPr txBox="1"/>
           <p:nvPr>
             <p:ph idx="1" type="body"/>
@@ -1457,6 +1521,10 @@
           <a:prstGeom prst="rect">
             <a:avLst/>
           </a:prstGeom>
+          <a:noFill/>
+          <a:ln>
+            <a:noFill/>
+          </a:ln>
         </p:spPr>
         <p:txBody>
           <a:bodyPr anchorCtr="0" anchor="t" bIns="91425" lIns="91425" spcFirstLastPara="1" rIns="91425" wrap="square" tIns="91425">
@@ -1465,12 +1533,16 @@
           <a:lstStyle/>
           <a:p>
             <a:pPr indent="0" lvl="0" marL="0" rtl="0" algn="l">
-              <a:spcBef>
-                <a:spcPts val="0"/>
-              </a:spcBef>
-              <a:spcAft>
-                <a:spcPts val="0"/>
-              </a:spcAft>
+              <a:lnSpc>
+                <a:spcPct val="100000"/>
+              </a:lnSpc>
+              <a:spcBef>
+                <a:spcPts val="0"/>
+              </a:spcBef>
+              <a:spcAft>
+                <a:spcPts val="0"/>
+              </a:spcAft>
+              <a:buSzPts val="1100"/>
               <a:buNone/>
             </a:pPr>
             <a:r>
@@ -1507,7 +1579,7 @@
       </p:grpSpPr>
       <p:sp>
         <p:nvSpPr>
-          <p:cNvPr id="153" name="Google Shape;153;g21bd412a062_0_42:notes"/>
+          <p:cNvPr id="153" name="Google Shape;153;p15:notes"/>
           <p:cNvSpPr/>
           <p:nvPr>
             <p:ph idx="2" type="sldImg"/>
@@ -1552,7 +1624,7 @@
       </p:sp>
       <p:sp>
         <p:nvSpPr>
-          <p:cNvPr id="154" name="Google Shape;154;g21bd412a062_0_42:notes"/>
+          <p:cNvPr id="154" name="Google Shape;154;p15:notes"/>
           <p:cNvSpPr txBox="1"/>
           <p:nvPr>
             <p:ph idx="1" type="body"/>
@@ -1624,7 +1696,7 @@
       </p:grpSpPr>
       <p:sp>
         <p:nvSpPr>
-          <p:cNvPr id="69" name="Google Shape;69;g21bd412a062_0_7:notes"/>
+          <p:cNvPr id="69" name="Google Shape;69;p2:notes"/>
           <p:cNvSpPr/>
           <p:nvPr>
             <p:ph idx="2" type="sldImg"/>
@@ -1655,11 +1727,21 @@
               </a:path>
             </a:pathLst>
           </a:custGeom>
+          <a:noFill/>
+          <a:ln cap="flat" cmpd="sng" w="9525">
+            <a:solidFill>
+              <a:srgbClr val="000000"/>
+            </a:solidFill>
+            <a:prstDash val="solid"/>
+            <a:round/>
+            <a:headEnd len="sm" w="sm" type="none"/>
+            <a:tailEnd len="sm" w="sm" type="none"/>
+          </a:ln>
         </p:spPr>
       </p:sp>
       <p:sp>
         <p:nvSpPr>
-          <p:cNvPr id="70" name="Google Shape;70;g21bd412a062_0_7:notes"/>
+          <p:cNvPr id="70" name="Google Shape;70;p2:notes"/>
           <p:cNvSpPr txBox="1"/>
           <p:nvPr>
             <p:ph idx="1" type="body"/>
@@ -1673,6 +1755,10 @@
           <a:prstGeom prst="rect">
             <a:avLst/>
           </a:prstGeom>
+          <a:noFill/>
+          <a:ln>
+            <a:noFill/>
+          </a:ln>
         </p:spPr>
         <p:txBody>
           <a:bodyPr anchorCtr="0" anchor="t" bIns="91425" lIns="91425" spcFirstLastPara="1" rIns="91425" wrap="square" tIns="91425">
@@ -1681,12 +1767,16 @@
           <a:lstStyle/>
           <a:p>
             <a:pPr indent="0" lvl="0" marL="0" rtl="0" algn="l">
-              <a:spcBef>
-                <a:spcPts val="0"/>
-              </a:spcBef>
-              <a:spcAft>
-                <a:spcPts val="0"/>
-              </a:spcAft>
+              <a:lnSpc>
+                <a:spcPct val="100000"/>
+              </a:lnSpc>
+              <a:spcBef>
+                <a:spcPts val="0"/>
+              </a:spcBef>
+              <a:spcAft>
+                <a:spcPts val="0"/>
+              </a:spcAft>
+              <a:buSzPts val="1100"/>
               <a:buNone/>
             </a:pPr>
             <a:r>
@@ -1723,7 +1813,7 @@
       </p:grpSpPr>
       <p:sp>
         <p:nvSpPr>
-          <p:cNvPr id="75" name="Google Shape;75;g21bd412a062_0_97:notes"/>
+          <p:cNvPr id="75" name="Google Shape;75;p3:notes"/>
           <p:cNvSpPr/>
           <p:nvPr>
             <p:ph idx="2" type="sldImg"/>
@@ -1768,7 +1858,7 @@
       </p:sp>
       <p:sp>
         <p:nvSpPr>
-          <p:cNvPr id="76" name="Google Shape;76;g21bd412a062_0_97:notes"/>
+          <p:cNvPr id="76" name="Google Shape;76;p3:notes"/>
           <p:cNvSpPr txBox="1"/>
           <p:nvPr>
             <p:ph idx="1" type="body"/>
@@ -1840,7 +1930,7 @@
       </p:grpSpPr>
       <p:sp>
         <p:nvSpPr>
-          <p:cNvPr id="81" name="Google Shape;81;g21bd412a062_0_27:notes"/>
+          <p:cNvPr id="81" name="Google Shape;81;p4:notes"/>
           <p:cNvSpPr/>
           <p:nvPr>
             <p:ph idx="2" type="sldImg"/>
@@ -1871,11 +1961,21 @@
               </a:path>
             </a:pathLst>
           </a:custGeom>
+          <a:noFill/>
+          <a:ln cap="flat" cmpd="sng" w="9525">
+            <a:solidFill>
+              <a:srgbClr val="000000"/>
+            </a:solidFill>
+            <a:prstDash val="solid"/>
+            <a:round/>
+            <a:headEnd len="sm" w="sm" type="none"/>
+            <a:tailEnd len="sm" w="sm" type="none"/>
+          </a:ln>
         </p:spPr>
       </p:sp>
       <p:sp>
         <p:nvSpPr>
-          <p:cNvPr id="82" name="Google Shape;82;g21bd412a062_0_27:notes"/>
+          <p:cNvPr id="82" name="Google Shape;82;p4:notes"/>
           <p:cNvSpPr txBox="1"/>
           <p:nvPr>
             <p:ph idx="1" type="body"/>
@@ -1889,6 +1989,10 @@
           <a:prstGeom prst="rect">
             <a:avLst/>
           </a:prstGeom>
+          <a:noFill/>
+          <a:ln>
+            <a:noFill/>
+          </a:ln>
         </p:spPr>
         <p:txBody>
           <a:bodyPr anchorCtr="0" anchor="t" bIns="91425" lIns="91425" spcFirstLastPara="1" rIns="91425" wrap="square" tIns="91425">
@@ -1897,12 +2001,16 @@
           <a:lstStyle/>
           <a:p>
             <a:pPr indent="0" lvl="0" marL="0" rtl="0" algn="l">
-              <a:spcBef>
-                <a:spcPts val="0"/>
-              </a:spcBef>
-              <a:spcAft>
-                <a:spcPts val="0"/>
-              </a:spcAft>
+              <a:lnSpc>
+                <a:spcPct val="100000"/>
+              </a:lnSpc>
+              <a:spcBef>
+                <a:spcPts val="0"/>
+              </a:spcBef>
+              <a:spcAft>
+                <a:spcPts val="0"/>
+              </a:spcAft>
+              <a:buSzPts val="1100"/>
               <a:buNone/>
             </a:pPr>
             <a:r>
@@ -1939,7 +2047,7 @@
       </p:grpSpPr>
       <p:sp>
         <p:nvSpPr>
-          <p:cNvPr id="89" name="Google Shape;89;g21bd412a062_0_104:notes"/>
+          <p:cNvPr id="89" name="Google Shape;89;p5:notes"/>
           <p:cNvSpPr/>
           <p:nvPr>
             <p:ph idx="2" type="sldImg"/>
@@ -1970,11 +2078,21 @@
               </a:path>
             </a:pathLst>
           </a:custGeom>
+          <a:noFill/>
+          <a:ln cap="flat" cmpd="sng" w="9525">
+            <a:solidFill>
+              <a:srgbClr val="000000"/>
+            </a:solidFill>
+            <a:prstDash val="solid"/>
+            <a:round/>
+            <a:headEnd len="sm" w="sm" type="none"/>
+            <a:tailEnd len="sm" w="sm" type="none"/>
+          </a:ln>
         </p:spPr>
       </p:sp>
       <p:sp>
         <p:nvSpPr>
-          <p:cNvPr id="90" name="Google Shape;90;g21bd412a062_0_104:notes"/>
+          <p:cNvPr id="90" name="Google Shape;90;p5:notes"/>
           <p:cNvSpPr txBox="1"/>
           <p:nvPr>
             <p:ph idx="1" type="body"/>
@@ -1988,6 +2106,10 @@
           <a:prstGeom prst="rect">
             <a:avLst/>
           </a:prstGeom>
+          <a:noFill/>
+          <a:ln>
+            <a:noFill/>
+          </a:ln>
         </p:spPr>
         <p:txBody>
           <a:bodyPr anchorCtr="0" anchor="t" bIns="91425" lIns="91425" spcFirstLastPara="1" rIns="91425" wrap="square" tIns="91425">
@@ -1996,12 +2118,16 @@
           <a:lstStyle/>
           <a:p>
             <a:pPr indent="0" lvl="0" marL="0" rtl="0" algn="l">
-              <a:spcBef>
-                <a:spcPts val="0"/>
-              </a:spcBef>
-              <a:spcAft>
-                <a:spcPts val="0"/>
-              </a:spcAft>
+              <a:lnSpc>
+                <a:spcPct val="100000"/>
+              </a:lnSpc>
+              <a:spcBef>
+                <a:spcPts val="0"/>
+              </a:spcBef>
+              <a:spcAft>
+                <a:spcPts val="0"/>
+              </a:spcAft>
+              <a:buSzPts val="1100"/>
               <a:buNone/>
             </a:pPr>
             <a:r>
@@ -2038,7 +2164,7 @@
       </p:grpSpPr>
       <p:sp>
         <p:nvSpPr>
-          <p:cNvPr id="96" name="Google Shape;96;g21bd412a062_0_112:notes"/>
+          <p:cNvPr id="96" name="Google Shape;96;p6:notes"/>
           <p:cNvSpPr/>
           <p:nvPr>
             <p:ph idx="2" type="sldImg"/>
@@ -2069,11 +2195,21 @@
               </a:path>
             </a:pathLst>
           </a:custGeom>
+          <a:noFill/>
+          <a:ln cap="flat" cmpd="sng" w="9525">
+            <a:solidFill>
+              <a:srgbClr val="000000"/>
+            </a:solidFill>
+            <a:prstDash val="solid"/>
+            <a:round/>
+            <a:headEnd len="sm" w="sm" type="none"/>
+            <a:tailEnd len="sm" w="sm" type="none"/>
+          </a:ln>
         </p:spPr>
       </p:sp>
       <p:sp>
         <p:nvSpPr>
-          <p:cNvPr id="97" name="Google Shape;97;g21bd412a062_0_112:notes"/>
+          <p:cNvPr id="97" name="Google Shape;97;p6:notes"/>
           <p:cNvSpPr txBox="1"/>
           <p:nvPr>
             <p:ph idx="1" type="body"/>
@@ -2087,6 +2223,10 @@
           <a:prstGeom prst="rect">
             <a:avLst/>
           </a:prstGeom>
+          <a:noFill/>
+          <a:ln>
+            <a:noFill/>
+          </a:ln>
         </p:spPr>
         <p:txBody>
           <a:bodyPr anchorCtr="0" anchor="t" bIns="91425" lIns="91425" spcFirstLastPara="1" rIns="91425" wrap="square" tIns="91425">
@@ -2095,12 +2235,16 @@
           <a:lstStyle/>
           <a:p>
             <a:pPr indent="0" lvl="0" marL="0" rtl="0" algn="l">
-              <a:spcBef>
-                <a:spcPts val="0"/>
-              </a:spcBef>
-              <a:spcAft>
-                <a:spcPts val="0"/>
-              </a:spcAft>
+              <a:lnSpc>
+                <a:spcPct val="100000"/>
+              </a:lnSpc>
+              <a:spcBef>
+                <a:spcPts val="0"/>
+              </a:spcBef>
+              <a:spcAft>
+                <a:spcPts val="0"/>
+              </a:spcAft>
+              <a:buSzPts val="1100"/>
               <a:buNone/>
             </a:pPr>
             <a:r>
@@ -2137,7 +2281,7 @@
       </p:grpSpPr>
       <p:sp>
         <p:nvSpPr>
-          <p:cNvPr id="104" name="Google Shape;104;g21bd412a062_0_74:notes"/>
+          <p:cNvPr id="104" name="Google Shape;104;p7:notes"/>
           <p:cNvSpPr/>
           <p:nvPr>
             <p:ph idx="2" type="sldImg"/>
@@ -2168,11 +2312,21 @@
               </a:path>
             </a:pathLst>
           </a:custGeom>
+          <a:noFill/>
+          <a:ln cap="flat" cmpd="sng" w="9525">
+            <a:solidFill>
+              <a:srgbClr val="000000"/>
+            </a:solidFill>
+            <a:prstDash val="solid"/>
+            <a:round/>
+            <a:headEnd len="sm" w="sm" type="none"/>
+            <a:tailEnd len="sm" w="sm" type="none"/>
+          </a:ln>
         </p:spPr>
       </p:sp>
       <p:sp>
         <p:nvSpPr>
-          <p:cNvPr id="105" name="Google Shape;105;g21bd412a062_0_74:notes"/>
+          <p:cNvPr id="105" name="Google Shape;105;p7:notes"/>
           <p:cNvSpPr txBox="1"/>
           <p:nvPr>
             <p:ph idx="1" type="body"/>
@@ -2186,6 +2340,10 @@
           <a:prstGeom prst="rect">
             <a:avLst/>
           </a:prstGeom>
+          <a:noFill/>
+          <a:ln>
+            <a:noFill/>
+          </a:ln>
         </p:spPr>
         <p:txBody>
           <a:bodyPr anchorCtr="0" anchor="t" bIns="91425" lIns="91425" spcFirstLastPara="1" rIns="91425" wrap="square" tIns="91425">
@@ -2194,12 +2352,16 @@
           <a:lstStyle/>
           <a:p>
             <a:pPr indent="0" lvl="0" marL="0" rtl="0" algn="l">
-              <a:spcBef>
-                <a:spcPts val="0"/>
-              </a:spcBef>
-              <a:spcAft>
-                <a:spcPts val="0"/>
-              </a:spcAft>
+              <a:lnSpc>
+                <a:spcPct val="100000"/>
+              </a:lnSpc>
+              <a:spcBef>
+                <a:spcPts val="0"/>
+              </a:spcBef>
+              <a:spcAft>
+                <a:spcPts val="0"/>
+              </a:spcAft>
+              <a:buSzPts val="1100"/>
               <a:buNone/>
             </a:pPr>
             <a:r>
@@ -2236,7 +2398,7 @@
       </p:grpSpPr>
       <p:sp>
         <p:nvSpPr>
-          <p:cNvPr id="110" name="Google Shape;110;g21bd412a062_0_32:notes"/>
+          <p:cNvPr id="110" name="Google Shape;110;p8:notes"/>
           <p:cNvSpPr/>
           <p:nvPr>
             <p:ph idx="2" type="sldImg"/>
@@ -2267,11 +2429,21 @@
               </a:path>
             </a:pathLst>
           </a:custGeom>
+          <a:noFill/>
+          <a:ln cap="flat" cmpd="sng" w="9525">
+            <a:solidFill>
+              <a:srgbClr val="000000"/>
+            </a:solidFill>
+            <a:prstDash val="solid"/>
+            <a:round/>
+            <a:headEnd len="sm" w="sm" type="none"/>
+            <a:tailEnd len="sm" w="sm" type="none"/>
+          </a:ln>
         </p:spPr>
       </p:sp>
       <p:sp>
         <p:nvSpPr>
-          <p:cNvPr id="111" name="Google Shape;111;g21bd412a062_0_32:notes"/>
+          <p:cNvPr id="111" name="Google Shape;111;p8:notes"/>
           <p:cNvSpPr txBox="1"/>
           <p:nvPr>
             <p:ph idx="1" type="body"/>
@@ -2285,6 +2457,10 @@
           <a:prstGeom prst="rect">
             <a:avLst/>
           </a:prstGeom>
+          <a:noFill/>
+          <a:ln>
+            <a:noFill/>
+          </a:ln>
         </p:spPr>
         <p:txBody>
           <a:bodyPr anchorCtr="0" anchor="t" bIns="91425" lIns="91425" spcFirstLastPara="1" rIns="91425" wrap="square" tIns="91425">
@@ -2293,12 +2469,16 @@
           <a:lstStyle/>
           <a:p>
             <a:pPr indent="0" lvl="0" marL="0" rtl="0" algn="l">
-              <a:spcBef>
-                <a:spcPts val="0"/>
-              </a:spcBef>
-              <a:spcAft>
-                <a:spcPts val="0"/>
-              </a:spcAft>
+              <a:lnSpc>
+                <a:spcPct val="100000"/>
+              </a:lnSpc>
+              <a:spcBef>
+                <a:spcPts val="0"/>
+              </a:spcBef>
+              <a:spcAft>
+                <a:spcPts val="0"/>
+              </a:spcAft>
+              <a:buSzPts val="1100"/>
               <a:buNone/>
             </a:pPr>
             <a:r>
@@ -2335,7 +2515,7 @@
       </p:grpSpPr>
       <p:sp>
         <p:nvSpPr>
-          <p:cNvPr id="116" name="Google Shape;116;p6:notes"/>
+          <p:cNvPr id="116" name="Google Shape;116;p9:notes"/>
           <p:cNvSpPr/>
           <p:nvPr>
             <p:ph idx="2" type="sldImg"/>
@@ -2380,7 +2560,7 @@
       </p:sp>
       <p:sp>
         <p:nvSpPr>
-          <p:cNvPr id="117" name="Google Shape;117;p6:notes"/>
+          <p:cNvPr id="117" name="Google Shape;117;p9:notes"/>
           <p:cNvSpPr txBox="1"/>
           <p:nvPr>
             <p:ph idx="1" type="body"/>
@@ -11743,13 +11923,12 @@
           <p:cNvPicPr preferRelativeResize="0"/>
           <p:nvPr/>
         </p:nvPicPr>
-        <p:blipFill>
+        <p:blipFill rotWithShape="1">
           <a:blip r:embed="rId3">
             <a:alphaModFix/>
           </a:blip>
-          <a:stretch>
-            <a:fillRect/>
-          </a:stretch>
+          <a:srcRect b="0" l="0" r="0" t="0"/>
+          <a:stretch/>
         </p:blipFill>
         <p:spPr>
           <a:xfrm>
@@ -11848,13 +12027,12 @@
           <p:cNvPicPr preferRelativeResize="0"/>
           <p:nvPr/>
         </p:nvPicPr>
-        <p:blipFill>
+        <p:blipFill rotWithShape="1">
           <a:blip r:embed="rId3">
             <a:alphaModFix/>
           </a:blip>
-          <a:stretch>
-            <a:fillRect/>
-          </a:stretch>
+          <a:srcRect b="0" l="0" r="0" t="0"/>
+          <a:stretch/>
         </p:blipFill>
         <p:spPr>
           <a:xfrm>
@@ -11918,6 +12096,10 @@
           <a:prstGeom prst="rect">
             <a:avLst/>
           </a:prstGeom>
+          <a:noFill/>
+          <a:ln>
+            <a:noFill/>
+          </a:ln>
         </p:spPr>
         <p:txBody>
           <a:bodyPr anchorCtr="0" anchor="t" bIns="91425" lIns="91425" spcFirstLastPara="1" rIns="91425" wrap="square" tIns="91425">
@@ -11926,12 +12108,16 @@
           <a:lstStyle/>
           <a:p>
             <a:pPr indent="0" lvl="0" marL="0" rtl="0" algn="l">
-              <a:spcBef>
-                <a:spcPts val="0"/>
-              </a:spcBef>
-              <a:spcAft>
-                <a:spcPts val="0"/>
-              </a:spcAft>
+              <a:lnSpc>
+                <a:spcPct val="100000"/>
+              </a:lnSpc>
+              <a:spcBef>
+                <a:spcPts val="0"/>
+              </a:spcBef>
+              <a:spcAft>
+                <a:spcPts val="0"/>
+              </a:spcAft>
+              <a:buSzPts val="2800"/>
               <a:buNone/>
             </a:pPr>
             <a:r>
@@ -11962,8 +12148,8 @@
         </p:blipFill>
         <p:spPr>
           <a:xfrm>
-            <a:off x="152400" y="1366725"/>
-            <a:ext cx="8839204" cy="3694511"/>
+            <a:off x="0" y="1278475"/>
+            <a:ext cx="9144003" cy="3865024"/>
           </a:xfrm>
           <a:prstGeom prst="rect">
             <a:avLst/>
@@ -12022,6 +12208,10 @@
           <a:prstGeom prst="rect">
             <a:avLst/>
           </a:prstGeom>
+          <a:noFill/>
+          <a:ln>
+            <a:noFill/>
+          </a:ln>
         </p:spPr>
         <p:txBody>
           <a:bodyPr anchorCtr="0" anchor="t" bIns="91425" lIns="91425" spcFirstLastPara="1" rIns="91425" wrap="square" tIns="91425">
@@ -12030,12 +12220,16 @@
           <a:lstStyle/>
           <a:p>
             <a:pPr indent="0" lvl="0" marL="0" rtl="0" algn="l">
-              <a:spcBef>
-                <a:spcPts val="0"/>
-              </a:spcBef>
-              <a:spcAft>
-                <a:spcPts val="0"/>
-              </a:spcAft>
+              <a:lnSpc>
+                <a:spcPct val="100000"/>
+              </a:lnSpc>
+              <a:spcBef>
+                <a:spcPts val="0"/>
+              </a:spcBef>
+              <a:spcAft>
+                <a:spcPts val="0"/>
+              </a:spcAft>
+              <a:buSzPts val="2800"/>
               <a:buNone/>
             </a:pPr>
             <a:r>
@@ -12066,8 +12260,8 @@
         </p:blipFill>
         <p:spPr>
           <a:xfrm>
-            <a:off x="2353763" y="1309800"/>
-            <a:ext cx="4436483" cy="3833700"/>
+            <a:off x="2421150" y="1309800"/>
+            <a:ext cx="4648095" cy="3833698"/>
           </a:xfrm>
           <a:prstGeom prst="rect">
             <a:avLst/>
@@ -12126,6 +12320,10 @@
           <a:prstGeom prst="rect">
             <a:avLst/>
           </a:prstGeom>
+          <a:noFill/>
+          <a:ln>
+            <a:noFill/>
+          </a:ln>
         </p:spPr>
         <p:txBody>
           <a:bodyPr anchorCtr="0" anchor="t" bIns="91425" lIns="91425" spcFirstLastPara="1" rIns="91425" wrap="square" tIns="91425">
@@ -12134,12 +12332,16 @@
           <a:lstStyle/>
           <a:p>
             <a:pPr indent="0" lvl="0" marL="0" rtl="0" algn="l">
-              <a:spcBef>
-                <a:spcPts val="0"/>
-              </a:spcBef>
-              <a:spcAft>
-                <a:spcPts val="0"/>
-              </a:spcAft>
+              <a:lnSpc>
+                <a:spcPct val="100000"/>
+              </a:lnSpc>
+              <a:spcBef>
+                <a:spcPts val="0"/>
+              </a:spcBef>
+              <a:spcAft>
+                <a:spcPts val="0"/>
+              </a:spcAft>
+              <a:buSzPts val="2800"/>
               <a:buNone/>
             </a:pPr>
             <a:r>
@@ -12170,6 +12372,10 @@
           <a:prstGeom prst="rect">
             <a:avLst/>
           </a:prstGeom>
+          <a:noFill/>
+          <a:ln>
+            <a:noFill/>
+          </a:ln>
         </p:spPr>
         <p:txBody>
           <a:bodyPr anchorCtr="0" anchor="t" bIns="91425" lIns="91425" spcFirstLastPara="1" rIns="91425" wrap="square" tIns="91425">
@@ -12178,12 +12384,16 @@
           <a:lstStyle/>
           <a:p>
             <a:pPr indent="0" lvl="0" marL="0" rtl="0" algn="l">
-              <a:spcBef>
-                <a:spcPts val="0"/>
-              </a:spcBef>
-              <a:spcAft>
-                <a:spcPts val="0"/>
-              </a:spcAft>
+              <a:lnSpc>
+                <a:spcPct val="115000"/>
+              </a:lnSpc>
+              <a:spcBef>
+                <a:spcPts val="0"/>
+              </a:spcBef>
+              <a:spcAft>
+                <a:spcPts val="0"/>
+              </a:spcAft>
+              <a:buSzPts val="1300"/>
               <a:buNone/>
             </a:pPr>
             <a:r>
@@ -12203,12 +12413,16 @@
           </a:p>
           <a:p>
             <a:pPr indent="0" lvl="0" marL="0" rtl="0" algn="l">
-              <a:spcBef>
-                <a:spcPts val="0"/>
-              </a:spcBef>
-              <a:spcAft>
-                <a:spcPts val="0"/>
-              </a:spcAft>
+              <a:lnSpc>
+                <a:spcPct val="115000"/>
+              </a:lnSpc>
+              <a:spcBef>
+                <a:spcPts val="0"/>
+              </a:spcBef>
+              <a:spcAft>
+                <a:spcPts val="0"/>
+              </a:spcAft>
+              <a:buSzPts val="1300"/>
               <a:buNone/>
             </a:pPr>
             <a:r>
@@ -12218,30 +12432,29 @@
           </a:p>
           <a:p>
             <a:pPr indent="0" lvl="0" marL="0" rtl="0" algn="l">
-              <a:spcBef>
-                <a:spcPts val="0"/>
-              </a:spcBef>
-              <a:spcAft>
-                <a:spcPts val="0"/>
-              </a:spcAft>
+              <a:lnSpc>
+                <a:spcPct val="115000"/>
+              </a:lnSpc>
+              <a:spcBef>
+                <a:spcPts val="0"/>
+              </a:spcBef>
+              <a:spcAft>
+                <a:spcPts val="0"/>
+              </a:spcAft>
+              <a:buSzPts val="1300"/>
               <a:buNone/>
             </a:pPr>
             <a:r>
               <a:rPr lang="pt-BR"/>
-              <a:t>Solução MVP vs </a:t>
-            </a:r>
-            <a:r>
-              <a:rPr lang="pt-BR"/>
-              <a:t>Solução </a:t>
-            </a:r>
-            <a:r>
-              <a:rPr lang="pt-BR"/>
-              <a:t>Completa</a:t>
+              <a:t>Solução MVP vs Solução Completa</a:t>
             </a:r>
             <a:endParaRPr/>
           </a:p>
           <a:p>
             <a:pPr indent="-311150" lvl="0" marL="457200" rtl="0" algn="l">
+              <a:lnSpc>
+                <a:spcPct val="115000"/>
+              </a:lnSpc>
               <a:spcBef>
                 <a:spcPts val="0"/>
               </a:spcBef>
@@ -12253,22 +12466,22 @@
             </a:pPr>
             <a:r>
               <a:rPr lang="pt-BR"/>
-              <a:t>Arquitetura monolito modular vs </a:t>
-            </a:r>
-            <a:r>
-              <a:rPr lang="pt-BR"/>
-              <a:t>micro-serviços</a:t>
+              <a:t>Arquitetura monolito modular vs micro-serviços</a:t>
             </a:r>
             <a:endParaRPr/>
           </a:p>
           <a:p>
             <a:pPr indent="0" lvl="0" marL="0" rtl="0" algn="l">
-              <a:spcBef>
-                <a:spcPts val="0"/>
-              </a:spcBef>
-              <a:spcAft>
-                <a:spcPts val="0"/>
-              </a:spcAft>
+              <a:lnSpc>
+                <a:spcPct val="115000"/>
+              </a:lnSpc>
+              <a:spcBef>
+                <a:spcPts val="0"/>
+              </a:spcBef>
+              <a:spcAft>
+                <a:spcPts val="0"/>
+              </a:spcAft>
+              <a:buSzPts val="1300"/>
               <a:buNone/>
             </a:pPr>
             <a:r>
@@ -12278,12 +12491,16 @@
           </a:p>
           <a:p>
             <a:pPr indent="0" lvl="0" marL="0" rtl="0" algn="l">
-              <a:spcBef>
-                <a:spcPts val="0"/>
-              </a:spcBef>
-              <a:spcAft>
-                <a:spcPts val="0"/>
-              </a:spcAft>
+              <a:lnSpc>
+                <a:spcPct val="115000"/>
+              </a:lnSpc>
+              <a:spcBef>
+                <a:spcPts val="0"/>
+              </a:spcBef>
+              <a:spcAft>
+                <a:spcPts val="0"/>
+              </a:spcAft>
+              <a:buSzPts val="1300"/>
               <a:buNone/>
             </a:pPr>
             <a:r>
@@ -12294,6 +12511,9 @@
           </a:p>
           <a:p>
             <a:pPr indent="-311150" lvl="0" marL="457200" rtl="0" algn="l">
+              <a:lnSpc>
+                <a:spcPct val="115000"/>
+              </a:lnSpc>
               <a:spcBef>
                 <a:spcPts val="0"/>
               </a:spcBef>
@@ -12311,6 +12531,9 @@
           </a:p>
           <a:p>
             <a:pPr indent="-311150" lvl="0" marL="457200" rtl="0" algn="l">
+              <a:lnSpc>
+                <a:spcPct val="115000"/>
+              </a:lnSpc>
               <a:spcBef>
                 <a:spcPts val="0"/>
               </a:spcBef>
@@ -12328,6 +12551,9 @@
           </a:p>
           <a:p>
             <a:pPr indent="-311150" lvl="0" marL="457200" rtl="0" algn="l">
+              <a:lnSpc>
+                <a:spcPct val="115000"/>
+              </a:lnSpc>
               <a:spcBef>
                 <a:spcPts val="0"/>
               </a:spcBef>
@@ -12345,6 +12571,9 @@
           </a:p>
           <a:p>
             <a:pPr indent="-311150" lvl="0" marL="457200" rtl="0" algn="l">
+              <a:lnSpc>
+                <a:spcPct val="115000"/>
+              </a:lnSpc>
               <a:spcBef>
                 <a:spcPts val="0"/>
               </a:spcBef>
@@ -12362,6 +12591,9 @@
           </a:p>
           <a:p>
             <a:pPr indent="-311150" lvl="0" marL="457200" rtl="0" algn="l">
+              <a:lnSpc>
+                <a:spcPct val="115000"/>
+              </a:lnSpc>
               <a:spcBef>
                 <a:spcPts val="0"/>
               </a:spcBef>
@@ -12379,12 +12611,16 @@
           </a:p>
           <a:p>
             <a:pPr indent="0" lvl="0" marL="0" rtl="0" algn="l">
-              <a:spcBef>
-                <a:spcPts val="0"/>
-              </a:spcBef>
-              <a:spcAft>
-                <a:spcPts val="0"/>
-              </a:spcAft>
+              <a:lnSpc>
+                <a:spcPct val="115000"/>
+              </a:lnSpc>
+              <a:spcBef>
+                <a:spcPts val="0"/>
+              </a:spcBef>
+              <a:spcAft>
+                <a:spcPts val="0"/>
+              </a:spcAft>
+              <a:buSzPts val="1300"/>
               <a:buNone/>
             </a:pPr>
             <a:r>
@@ -12442,6 +12678,10 @@
           <a:prstGeom prst="rect">
             <a:avLst/>
           </a:prstGeom>
+          <a:noFill/>
+          <a:ln>
+            <a:noFill/>
+          </a:ln>
         </p:spPr>
         <p:txBody>
           <a:bodyPr anchorCtr="0" anchor="t" bIns="91425" lIns="91425" spcFirstLastPara="1" rIns="91425" wrap="square" tIns="91425">
@@ -12450,12 +12690,16 @@
           <a:lstStyle/>
           <a:p>
             <a:pPr indent="0" lvl="0" marL="0" rtl="0" algn="l">
-              <a:spcBef>
-                <a:spcPts val="0"/>
-              </a:spcBef>
-              <a:spcAft>
-                <a:spcPts val="0"/>
-              </a:spcAft>
+              <a:lnSpc>
+                <a:spcPct val="115000"/>
+              </a:lnSpc>
+              <a:spcBef>
+                <a:spcPts val="0"/>
+              </a:spcBef>
+              <a:spcAft>
+                <a:spcPts val="0"/>
+              </a:spcAft>
+              <a:buSzPts val="1300"/>
               <a:buNone/>
             </a:pPr>
             <a:r>
@@ -12466,6 +12710,9 @@
           </a:p>
           <a:p>
             <a:pPr indent="-311150" lvl="0" marL="457200" rtl="0" algn="l">
+              <a:lnSpc>
+                <a:spcPct val="115000"/>
+              </a:lnSpc>
               <a:spcBef>
                 <a:spcPts val="0"/>
               </a:spcBef>
@@ -12483,6 +12730,9 @@
           </a:p>
           <a:p>
             <a:pPr indent="-311150" lvl="0" marL="457200" rtl="0" algn="l">
+              <a:lnSpc>
+                <a:spcPct val="115000"/>
+              </a:lnSpc>
               <a:spcBef>
                 <a:spcPts val="0"/>
               </a:spcBef>
@@ -12500,6 +12750,9 @@
           </a:p>
           <a:p>
             <a:pPr indent="-311150" lvl="0" marL="457200" rtl="0" algn="l">
+              <a:lnSpc>
+                <a:spcPct val="115000"/>
+              </a:lnSpc>
               <a:spcBef>
                 <a:spcPts val="0"/>
               </a:spcBef>
@@ -12517,12 +12770,16 @@
           </a:p>
           <a:p>
             <a:pPr indent="0" lvl="0" marL="0" rtl="0" algn="l">
-              <a:spcBef>
-                <a:spcPts val="0"/>
-              </a:spcBef>
-              <a:spcAft>
-                <a:spcPts val="0"/>
-              </a:spcAft>
+              <a:lnSpc>
+                <a:spcPct val="115000"/>
+              </a:lnSpc>
+              <a:spcBef>
+                <a:spcPts val="0"/>
+              </a:spcBef>
+              <a:spcAft>
+                <a:spcPts val="0"/>
+              </a:spcAft>
+              <a:buSzPts val="1300"/>
               <a:buNone/>
             </a:pPr>
             <a:r>
@@ -12532,12 +12789,16 @@
           </a:p>
           <a:p>
             <a:pPr indent="0" lvl="0" marL="0" rtl="0" algn="l">
-              <a:spcBef>
-                <a:spcPts val="0"/>
-              </a:spcBef>
-              <a:spcAft>
-                <a:spcPts val="0"/>
-              </a:spcAft>
+              <a:lnSpc>
+                <a:spcPct val="115000"/>
+              </a:lnSpc>
+              <a:spcBef>
+                <a:spcPts val="0"/>
+              </a:spcBef>
+              <a:spcAft>
+                <a:spcPts val="0"/>
+              </a:spcAft>
+              <a:buSzPts val="1300"/>
               <a:buNone/>
             </a:pPr>
             <a:r>
@@ -12548,6 +12809,9 @@
           </a:p>
           <a:p>
             <a:pPr indent="-311150" lvl="0" marL="457200" rtl="0" algn="l">
+              <a:lnSpc>
+                <a:spcPct val="115000"/>
+              </a:lnSpc>
               <a:spcBef>
                 <a:spcPts val="0"/>
               </a:spcBef>
@@ -12565,6 +12829,9 @@
           </a:p>
           <a:p>
             <a:pPr indent="-311150" lvl="0" marL="457200" rtl="0" algn="l">
+              <a:lnSpc>
+                <a:spcPct val="115000"/>
+              </a:lnSpc>
               <a:spcBef>
                 <a:spcPts val="0"/>
               </a:spcBef>
@@ -12582,12 +12849,16 @@
           </a:p>
           <a:p>
             <a:pPr indent="0" lvl="0" marL="0" rtl="0" algn="l">
-              <a:spcBef>
-                <a:spcPts val="0"/>
-              </a:spcBef>
-              <a:spcAft>
-                <a:spcPts val="0"/>
-              </a:spcAft>
+              <a:lnSpc>
+                <a:spcPct val="115000"/>
+              </a:lnSpc>
+              <a:spcBef>
+                <a:spcPts val="0"/>
+              </a:spcBef>
+              <a:spcAft>
+                <a:spcPts val="0"/>
+              </a:spcAft>
+              <a:buSzPts val="1300"/>
               <a:buNone/>
             </a:pPr>
             <a:r>
@@ -12597,12 +12868,16 @@
           </a:p>
           <a:p>
             <a:pPr indent="0" lvl="0" marL="0" rtl="0" algn="l">
-              <a:spcBef>
-                <a:spcPts val="0"/>
-              </a:spcBef>
-              <a:spcAft>
-                <a:spcPts val="0"/>
-              </a:spcAft>
+              <a:lnSpc>
+                <a:spcPct val="115000"/>
+              </a:lnSpc>
+              <a:spcBef>
+                <a:spcPts val="0"/>
+              </a:spcBef>
+              <a:spcAft>
+                <a:spcPts val="0"/>
+              </a:spcAft>
+              <a:buSzPts val="1300"/>
               <a:buNone/>
             </a:pPr>
             <a:r>
@@ -12613,6 +12888,9 @@
           </a:p>
           <a:p>
             <a:pPr indent="-311150" lvl="0" marL="457200" rtl="0" algn="l">
+              <a:lnSpc>
+                <a:spcPct val="115000"/>
+              </a:lnSpc>
               <a:spcBef>
                 <a:spcPts val="0"/>
               </a:spcBef>
@@ -12630,6 +12908,9 @@
           </a:p>
           <a:p>
             <a:pPr indent="-311150" lvl="0" marL="457200" rtl="0" algn="l">
+              <a:lnSpc>
+                <a:spcPct val="115000"/>
+              </a:lnSpc>
               <a:spcBef>
                 <a:spcPts val="0"/>
               </a:spcBef>
@@ -12647,6 +12928,9 @@
           </a:p>
           <a:p>
             <a:pPr indent="-311150" lvl="0" marL="457200" rtl="0" algn="l">
+              <a:lnSpc>
+                <a:spcPct val="115000"/>
+              </a:lnSpc>
               <a:spcBef>
                 <a:spcPts val="0"/>
               </a:spcBef>
@@ -12664,6 +12948,9 @@
           </a:p>
           <a:p>
             <a:pPr indent="-311150" lvl="0" marL="457200" rtl="0" algn="l">
+              <a:lnSpc>
+                <a:spcPct val="115000"/>
+              </a:lnSpc>
               <a:spcBef>
                 <a:spcPts val="0"/>
               </a:spcBef>
@@ -12697,20 +12984,28 @@
           <a:prstGeom prst="rect">
             <a:avLst/>
           </a:prstGeom>
+          <a:noFill/>
+          <a:ln>
+            <a:noFill/>
+          </a:ln>
         </p:spPr>
         <p:txBody>
           <a:bodyPr anchorCtr="0" anchor="t" bIns="91425" lIns="91425" spcFirstLastPara="1" rIns="91425" wrap="square" tIns="91425">
-            <a:normAutofit lnSpcReduction="10000"/>
+            <a:normAutofit lnSpcReduction="20000"/>
           </a:bodyPr>
           <a:lstStyle/>
           <a:p>
             <a:pPr indent="0" lvl="0" marL="0" rtl="0" algn="l">
-              <a:spcBef>
-                <a:spcPts val="0"/>
-              </a:spcBef>
-              <a:spcAft>
-                <a:spcPts val="0"/>
-              </a:spcAft>
+              <a:lnSpc>
+                <a:spcPct val="115000"/>
+              </a:lnSpc>
+              <a:spcBef>
+                <a:spcPts val="0"/>
+              </a:spcBef>
+              <a:spcAft>
+                <a:spcPts val="0"/>
+              </a:spcAft>
+              <a:buSzPts val="1300"/>
               <a:buNone/>
             </a:pPr>
             <a:r>
@@ -12721,6 +13016,9 @@
           </a:p>
           <a:p>
             <a:pPr indent="-311150" lvl="0" marL="457200" rtl="0" algn="l">
+              <a:lnSpc>
+                <a:spcPct val="115000"/>
+              </a:lnSpc>
               <a:spcBef>
                 <a:spcPts val="0"/>
               </a:spcBef>
@@ -12738,6 +13036,9 @@
           </a:p>
           <a:p>
             <a:pPr indent="-311150" lvl="0" marL="457200" rtl="0" algn="l">
+              <a:lnSpc>
+                <a:spcPct val="115000"/>
+              </a:lnSpc>
               <a:spcBef>
                 <a:spcPts val="0"/>
               </a:spcBef>
@@ -12755,6 +13056,9 @@
           </a:p>
           <a:p>
             <a:pPr indent="-311150" lvl="0" marL="457200" rtl="0" algn="l">
+              <a:lnSpc>
+                <a:spcPct val="115000"/>
+              </a:lnSpc>
               <a:spcBef>
                 <a:spcPts val="0"/>
               </a:spcBef>
@@ -12771,188 +13075,221 @@
             <a:endParaRPr/>
           </a:p>
           <a:p>
-            <a:pPr indent="-298450" lvl="1" marL="914400" rtl="0" algn="l">
-              <a:spcBef>
-                <a:spcPts val="0"/>
-              </a:spcBef>
-              <a:spcAft>
-                <a:spcPts val="0"/>
-              </a:spcAft>
-              <a:buSzPts val="1100"/>
-              <a:buChar char="○"/>
-            </a:pPr>
-            <a:r>
-              <a:rPr lang="pt-BR"/>
+            <a:pPr indent="-311150" lvl="0" marL="457200" marR="0" rtl="0" algn="l">
+              <a:lnSpc>
+                <a:spcPct val="115000"/>
+              </a:lnSpc>
+              <a:spcBef>
+                <a:spcPts val="0"/>
+              </a:spcBef>
+              <a:spcAft>
+                <a:spcPts val="0"/>
+              </a:spcAft>
+              <a:buSzPts val="1300"/>
+              <a:buChar char="●"/>
+            </a:pPr>
+            <a:r>
+              <a:rPr lang="pt-BR" sz="1300"/>
               <a:t>DynamoDB</a:t>
             </a:r>
-            <a:endParaRPr/>
-          </a:p>
-          <a:p>
-            <a:pPr indent="-298450" lvl="1" marL="914400" rtl="0" algn="l">
-              <a:spcBef>
-                <a:spcPts val="0"/>
-              </a:spcBef>
-              <a:spcAft>
-                <a:spcPts val="0"/>
-              </a:spcAft>
-              <a:buSzPts val="1100"/>
-              <a:buChar char="○"/>
-            </a:pPr>
-            <a:r>
-              <a:rPr lang="pt-BR"/>
+            <a:endParaRPr sz="1300"/>
+          </a:p>
+          <a:p>
+            <a:pPr indent="-311150" lvl="0" marL="457200" marR="0" rtl="0" algn="l">
+              <a:lnSpc>
+                <a:spcPct val="115000"/>
+              </a:lnSpc>
+              <a:spcBef>
+                <a:spcPts val="0"/>
+              </a:spcBef>
+              <a:spcAft>
+                <a:spcPts val="0"/>
+              </a:spcAft>
+              <a:buSzPts val="1300"/>
+              <a:buChar char="●"/>
+            </a:pPr>
+            <a:r>
+              <a:rPr lang="pt-BR" sz="1300"/>
               <a:t>EKS / Kubernetes</a:t>
             </a:r>
-            <a:endParaRPr/>
-          </a:p>
-          <a:p>
-            <a:pPr indent="-298450" lvl="1" marL="914400" rtl="0" algn="l">
-              <a:spcBef>
-                <a:spcPts val="0"/>
-              </a:spcBef>
-              <a:spcAft>
-                <a:spcPts val="0"/>
-              </a:spcAft>
-              <a:buSzPts val="1100"/>
-              <a:buChar char="○"/>
-            </a:pPr>
-            <a:r>
-              <a:rPr lang="pt-BR"/>
+            <a:endParaRPr sz="1300"/>
+          </a:p>
+          <a:p>
+            <a:pPr indent="-311150" lvl="0" marL="457200" marR="0" rtl="0" algn="l">
+              <a:lnSpc>
+                <a:spcPct val="115000"/>
+              </a:lnSpc>
+              <a:spcBef>
+                <a:spcPts val="0"/>
+              </a:spcBef>
+              <a:spcAft>
+                <a:spcPts val="0"/>
+              </a:spcAft>
+              <a:buSzPts val="1300"/>
+              <a:buChar char="●"/>
+            </a:pPr>
+            <a:r>
+              <a:rPr lang="pt-BR" sz="1300"/>
               <a:t>AWS Lambda</a:t>
             </a:r>
-            <a:endParaRPr/>
-          </a:p>
-          <a:p>
-            <a:pPr indent="-298450" lvl="1" marL="914400" rtl="0" algn="l">
-              <a:spcBef>
-                <a:spcPts val="0"/>
-              </a:spcBef>
-              <a:spcAft>
-                <a:spcPts val="0"/>
-              </a:spcAft>
-              <a:buSzPts val="1100"/>
-              <a:buChar char="○"/>
-            </a:pPr>
-            <a:r>
-              <a:rPr lang="pt-BR"/>
+            <a:endParaRPr sz="1300"/>
+          </a:p>
+          <a:p>
+            <a:pPr indent="-311150" lvl="0" marL="457200" marR="0" rtl="0" algn="l">
+              <a:lnSpc>
+                <a:spcPct val="115000"/>
+              </a:lnSpc>
+              <a:spcBef>
+                <a:spcPts val="0"/>
+              </a:spcBef>
+              <a:spcAft>
+                <a:spcPts val="0"/>
+              </a:spcAft>
+              <a:buSzPts val="1300"/>
+              <a:buChar char="●"/>
+            </a:pPr>
+            <a:r>
+              <a:rPr lang="pt-BR" sz="1300"/>
               <a:t>API Gateway</a:t>
             </a:r>
-            <a:endParaRPr/>
-          </a:p>
-          <a:p>
-            <a:pPr indent="-298450" lvl="1" marL="914400" rtl="0" algn="l">
-              <a:spcBef>
-                <a:spcPts val="0"/>
-              </a:spcBef>
-              <a:spcAft>
-                <a:spcPts val="0"/>
-              </a:spcAft>
-              <a:buSzPts val="1100"/>
-              <a:buChar char="○"/>
-            </a:pPr>
-            <a:r>
-              <a:rPr lang="pt-BR"/>
+            <a:endParaRPr sz="1300"/>
+          </a:p>
+          <a:p>
+            <a:pPr indent="-311150" lvl="0" marL="457200" marR="0" rtl="0" algn="l">
+              <a:lnSpc>
+                <a:spcPct val="115000"/>
+              </a:lnSpc>
+              <a:spcBef>
+                <a:spcPts val="0"/>
+              </a:spcBef>
+              <a:spcAft>
+                <a:spcPts val="0"/>
+              </a:spcAft>
+              <a:buSzPts val="1300"/>
+              <a:buChar char="●"/>
+            </a:pPr>
+            <a:r>
+              <a:rPr lang="pt-BR" sz="1300"/>
               <a:t>S3 Bucket</a:t>
             </a:r>
-            <a:endParaRPr/>
-          </a:p>
-          <a:p>
-            <a:pPr indent="-298450" lvl="1" marL="914400" rtl="0" algn="l">
-              <a:spcBef>
-                <a:spcPts val="0"/>
-              </a:spcBef>
-              <a:spcAft>
-                <a:spcPts val="0"/>
-              </a:spcAft>
-              <a:buSzPts val="1100"/>
-              <a:buChar char="○"/>
-            </a:pPr>
-            <a:r>
-              <a:rPr lang="pt-BR"/>
+            <a:endParaRPr sz="1300"/>
+          </a:p>
+          <a:p>
+            <a:pPr indent="-311150" lvl="0" marL="457200" marR="0" rtl="0" algn="l">
+              <a:lnSpc>
+                <a:spcPct val="115000"/>
+              </a:lnSpc>
+              <a:spcBef>
+                <a:spcPts val="0"/>
+              </a:spcBef>
+              <a:spcAft>
+                <a:spcPts val="0"/>
+              </a:spcAft>
+              <a:buSzPts val="1300"/>
+              <a:buChar char="●"/>
+            </a:pPr>
+            <a:r>
+              <a:rPr lang="pt-BR" sz="1300"/>
               <a:t>WAF</a:t>
             </a:r>
-            <a:endParaRPr/>
-          </a:p>
-          <a:p>
-            <a:pPr indent="-298450" lvl="1" marL="914400" rtl="0" algn="l">
-              <a:spcBef>
-                <a:spcPts val="0"/>
-              </a:spcBef>
-              <a:spcAft>
-                <a:spcPts val="0"/>
-              </a:spcAft>
-              <a:buSzPts val="1100"/>
-              <a:buChar char="○"/>
-            </a:pPr>
-            <a:r>
-              <a:rPr lang="pt-BR"/>
+            <a:endParaRPr sz="1300"/>
+          </a:p>
+          <a:p>
+            <a:pPr indent="-311150" lvl="0" marL="457200" marR="0" rtl="0" algn="l">
+              <a:lnSpc>
+                <a:spcPct val="115000"/>
+              </a:lnSpc>
+              <a:spcBef>
+                <a:spcPts val="0"/>
+              </a:spcBef>
+              <a:spcAft>
+                <a:spcPts val="0"/>
+              </a:spcAft>
+              <a:buSzPts val="1300"/>
+              <a:buChar char="●"/>
+            </a:pPr>
+            <a:r>
+              <a:rPr lang="pt-BR" sz="1300"/>
               <a:t>Route53</a:t>
             </a:r>
-            <a:endParaRPr/>
-          </a:p>
-          <a:p>
-            <a:pPr indent="-298450" lvl="1" marL="914400" rtl="0" algn="l">
-              <a:spcBef>
-                <a:spcPts val="0"/>
-              </a:spcBef>
-              <a:spcAft>
-                <a:spcPts val="0"/>
-              </a:spcAft>
-              <a:buSzPts val="1100"/>
-              <a:buChar char="○"/>
-            </a:pPr>
-            <a:r>
-              <a:rPr lang="pt-BR"/>
+            <a:endParaRPr sz="1300"/>
+          </a:p>
+          <a:p>
+            <a:pPr indent="-311150" lvl="0" marL="457200" marR="0" rtl="0" algn="l">
+              <a:lnSpc>
+                <a:spcPct val="115000"/>
+              </a:lnSpc>
+              <a:spcBef>
+                <a:spcPts val="0"/>
+              </a:spcBef>
+              <a:spcAft>
+                <a:spcPts val="0"/>
+              </a:spcAft>
+              <a:buSzPts val="1300"/>
+              <a:buChar char="●"/>
+            </a:pPr>
+            <a:r>
+              <a:rPr lang="pt-BR" sz="1300"/>
               <a:t>AWS Shield</a:t>
             </a:r>
-            <a:endParaRPr/>
-          </a:p>
-          <a:p>
-            <a:pPr indent="-298450" lvl="1" marL="914400" rtl="0" algn="l">
-              <a:spcBef>
-                <a:spcPts val="0"/>
-              </a:spcBef>
-              <a:spcAft>
-                <a:spcPts val="0"/>
-              </a:spcAft>
-              <a:buSzPts val="1100"/>
-              <a:buChar char="○"/>
-            </a:pPr>
-            <a:r>
-              <a:rPr lang="pt-BR"/>
+            <a:endParaRPr sz="1300"/>
+          </a:p>
+          <a:p>
+            <a:pPr indent="-311150" lvl="0" marL="457200" marR="0" rtl="0" algn="l">
+              <a:lnSpc>
+                <a:spcPct val="115000"/>
+              </a:lnSpc>
+              <a:spcBef>
+                <a:spcPts val="0"/>
+              </a:spcBef>
+              <a:spcAft>
+                <a:spcPts val="0"/>
+              </a:spcAft>
+              <a:buSzPts val="1300"/>
+              <a:buChar char="●"/>
+            </a:pPr>
+            <a:r>
+              <a:rPr lang="pt-BR" sz="1300"/>
               <a:t>CloudFront</a:t>
             </a:r>
-            <a:endParaRPr/>
-          </a:p>
-          <a:p>
-            <a:pPr indent="-298450" lvl="1" marL="914400" rtl="0" algn="l">
-              <a:spcBef>
-                <a:spcPts val="0"/>
-              </a:spcBef>
-              <a:spcAft>
-                <a:spcPts val="0"/>
-              </a:spcAft>
-              <a:buSzPts val="1100"/>
-              <a:buChar char="○"/>
-            </a:pPr>
-            <a:r>
-              <a:rPr lang="pt-BR"/>
+            <a:endParaRPr sz="1300"/>
+          </a:p>
+          <a:p>
+            <a:pPr indent="-311150" lvl="0" marL="457200" marR="0" rtl="0" algn="l">
+              <a:lnSpc>
+                <a:spcPct val="115000"/>
+              </a:lnSpc>
+              <a:spcBef>
+                <a:spcPts val="0"/>
+              </a:spcBef>
+              <a:spcAft>
+                <a:spcPts val="0"/>
+              </a:spcAft>
+              <a:buSzPts val="1300"/>
+              <a:buChar char="●"/>
+            </a:pPr>
+            <a:r>
+              <a:rPr lang="pt-BR" sz="1300"/>
               <a:t>NLB (Network Load Balancer)</a:t>
             </a:r>
-            <a:endParaRPr/>
-          </a:p>
-          <a:p>
-            <a:pPr indent="-298450" lvl="1" marL="914400" rtl="0" algn="l">
-              <a:spcBef>
-                <a:spcPts val="0"/>
-              </a:spcBef>
-              <a:spcAft>
-                <a:spcPts val="0"/>
-              </a:spcAft>
-              <a:buSzPts val="1100"/>
-              <a:buChar char="○"/>
-            </a:pPr>
-            <a:r>
-              <a:rPr lang="pt-BR"/>
+            <a:endParaRPr sz="1300"/>
+          </a:p>
+          <a:p>
+            <a:pPr indent="-311150" lvl="0" marL="457200" marR="0" rtl="0" algn="l">
+              <a:lnSpc>
+                <a:spcPct val="115000"/>
+              </a:lnSpc>
+              <a:spcBef>
+                <a:spcPts val="0"/>
+              </a:spcBef>
+              <a:spcAft>
+                <a:spcPts val="0"/>
+              </a:spcAft>
+              <a:buSzPts val="1300"/>
+              <a:buChar char="●"/>
+            </a:pPr>
+            <a:r>
+              <a:rPr lang="pt-BR" sz="1300"/>
               <a:t>VPC Link</a:t>
             </a:r>
             <a:endParaRPr/>
@@ -12975,6 +13312,10 @@
           <a:prstGeom prst="rect">
             <a:avLst/>
           </a:prstGeom>
+          <a:noFill/>
+          <a:ln>
+            <a:noFill/>
+          </a:ln>
         </p:spPr>
         <p:txBody>
           <a:bodyPr anchorCtr="0" anchor="t" bIns="91425" lIns="91425" spcFirstLastPara="1" rIns="91425" wrap="square" tIns="91425">
@@ -12983,12 +13324,16 @@
           <a:lstStyle/>
           <a:p>
             <a:pPr indent="0" lvl="0" marL="0" rtl="0" algn="l">
-              <a:spcBef>
-                <a:spcPts val="0"/>
-              </a:spcBef>
-              <a:spcAft>
-                <a:spcPts val="0"/>
-              </a:spcAft>
+              <a:lnSpc>
+                <a:spcPct val="100000"/>
+              </a:lnSpc>
+              <a:spcBef>
+                <a:spcPts val="0"/>
+              </a:spcBef>
+              <a:spcAft>
+                <a:spcPts val="0"/>
+              </a:spcAft>
+              <a:buSzPts val="2800"/>
               <a:buNone/>
             </a:pPr>
             <a:r>
@@ -13483,13 +13828,12 @@
           <p:cNvPicPr preferRelativeResize="0"/>
           <p:nvPr/>
         </p:nvPicPr>
-        <p:blipFill>
+        <p:blipFill rotWithShape="1">
           <a:blip r:embed="rId3">
             <a:alphaModFix/>
           </a:blip>
-          <a:stretch>
-            <a:fillRect/>
-          </a:stretch>
+          <a:srcRect b="0" l="0" r="0" t="0"/>
+          <a:stretch/>
         </p:blipFill>
         <p:spPr>
           <a:xfrm>
@@ -13530,20 +13874,44 @@
           </a:bodyPr>
           <a:lstStyle/>
           <a:p>
-            <a:pPr indent="0" lvl="0" marL="0" rtl="0" algn="l">
-              <a:spcBef>
-                <a:spcPts val="0"/>
-              </a:spcBef>
-              <a:spcAft>
-                <a:spcPts val="0"/>
-              </a:spcAft>
-              <a:buNone/>
-            </a:pPr>
-            <a:r>
-              <a:rPr lang="pt-BR"/>
+            <a:pPr indent="0" lvl="0" marL="0" marR="0" rtl="0" algn="l">
+              <a:lnSpc>
+                <a:spcPct val="100000"/>
+              </a:lnSpc>
+              <a:spcBef>
+                <a:spcPts val="0"/>
+              </a:spcBef>
+              <a:spcAft>
+                <a:spcPts val="0"/>
+              </a:spcAft>
+              <a:buClr>
+                <a:srgbClr val="000000"/>
+              </a:buClr>
+              <a:buSzPts val="1400"/>
+              <a:buFont typeface="Arial"/>
+              <a:buNone/>
+            </a:pPr>
+            <a:r>
+              <a:rPr b="0" i="0" lang="pt-BR" sz="1400" u="none" cap="none" strike="noStrike">
+                <a:solidFill>
+                  <a:srgbClr val="000000"/>
+                </a:solidFill>
+                <a:latin typeface="Arial"/>
+                <a:ea typeface="Arial"/>
+                <a:cs typeface="Arial"/>
+                <a:sym typeface="Arial"/>
+              </a:rPr>
               <a:t> </a:t>
             </a:r>
-            <a:endParaRPr/>
+            <a:endParaRPr b="0" i="0" sz="1400" u="none" cap="none" strike="noStrike">
+              <a:solidFill>
+                <a:srgbClr val="000000"/>
+              </a:solidFill>
+              <a:latin typeface="Arial"/>
+              <a:ea typeface="Arial"/>
+              <a:cs typeface="Arial"/>
+              <a:sym typeface="Arial"/>
+            </a:endParaRPr>
           </a:p>
         </p:txBody>
       </p:sp>
@@ -13595,6 +13963,10 @@
           <a:prstGeom prst="rect">
             <a:avLst/>
           </a:prstGeom>
+          <a:noFill/>
+          <a:ln>
+            <a:noFill/>
+          </a:ln>
         </p:spPr>
         <p:txBody>
           <a:bodyPr anchorCtr="0" anchor="t" bIns="91425" lIns="91425" spcFirstLastPara="1" rIns="91425" wrap="square" tIns="91425">
@@ -13603,12 +13975,16 @@
           <a:lstStyle/>
           <a:p>
             <a:pPr indent="0" lvl="0" marL="0" rtl="0" algn="l">
-              <a:spcBef>
-                <a:spcPts val="0"/>
-              </a:spcBef>
-              <a:spcAft>
-                <a:spcPts val="0"/>
-              </a:spcAft>
+              <a:lnSpc>
+                <a:spcPct val="100000"/>
+              </a:lnSpc>
+              <a:spcBef>
+                <a:spcPts val="0"/>
+              </a:spcBef>
+              <a:spcAft>
+                <a:spcPts val="0"/>
+              </a:spcAft>
+              <a:buSzPts val="2800"/>
               <a:buNone/>
             </a:pPr>
             <a:r>
@@ -13639,6 +14015,10 @@
           <a:prstGeom prst="rect">
             <a:avLst/>
           </a:prstGeom>
+          <a:noFill/>
+          <a:ln>
+            <a:noFill/>
+          </a:ln>
         </p:spPr>
         <p:txBody>
           <a:bodyPr anchorCtr="0" anchor="t" bIns="91425" lIns="91425" spcFirstLastPara="1" rIns="91425" wrap="square" tIns="91425">
@@ -13647,12 +14027,16 @@
           <a:lstStyle/>
           <a:p>
             <a:pPr indent="0" lvl="0" marL="0" rtl="0" algn="just">
-              <a:spcBef>
-                <a:spcPts val="0"/>
-              </a:spcBef>
-              <a:spcAft>
-                <a:spcPts val="0"/>
-              </a:spcAft>
+              <a:lnSpc>
+                <a:spcPct val="115000"/>
+              </a:lnSpc>
+              <a:spcBef>
+                <a:spcPts val="0"/>
+              </a:spcBef>
+              <a:spcAft>
+                <a:spcPts val="0"/>
+              </a:spcAft>
+              <a:buSzPts val="1300"/>
               <a:buNone/>
             </a:pPr>
             <a:r>
@@ -13716,12 +14100,16 @@
           <a:lstStyle/>
           <a:p>
             <a:pPr indent="0" lvl="0" marL="0" rtl="0" algn="l">
-              <a:spcBef>
-                <a:spcPts val="0"/>
-              </a:spcBef>
-              <a:spcAft>
-                <a:spcPts val="0"/>
-              </a:spcAft>
+              <a:lnSpc>
+                <a:spcPct val="100000"/>
+              </a:lnSpc>
+              <a:spcBef>
+                <a:spcPts val="0"/>
+              </a:spcBef>
+              <a:spcAft>
+                <a:spcPts val="0"/>
+              </a:spcAft>
+              <a:buSzPct val="142857"/>
               <a:buNone/>
             </a:pPr>
             <a:r>
@@ -13772,13 +14160,12 @@
           <p:cNvPicPr preferRelativeResize="0"/>
           <p:nvPr/>
         </p:nvPicPr>
-        <p:blipFill>
+        <p:blipFill rotWithShape="1">
           <a:blip r:embed="rId3">
             <a:alphaModFix/>
           </a:blip>
-          <a:stretch>
-            <a:fillRect/>
-          </a:stretch>
+          <a:srcRect b="0" l="0" r="0" t="0"/>
+          <a:stretch/>
         </p:blipFill>
         <p:spPr>
           <a:xfrm>
@@ -13842,6 +14229,10 @@
           <a:prstGeom prst="rect">
             <a:avLst/>
           </a:prstGeom>
+          <a:noFill/>
+          <a:ln>
+            <a:noFill/>
+          </a:ln>
         </p:spPr>
         <p:txBody>
           <a:bodyPr anchorCtr="0" anchor="t" bIns="91425" lIns="91425" spcFirstLastPara="1" rIns="91425" wrap="square" tIns="91425">
@@ -13850,12 +14241,16 @@
           <a:lstStyle/>
           <a:p>
             <a:pPr indent="0" lvl="0" marL="0" rtl="0" algn="l">
-              <a:spcBef>
-                <a:spcPts val="0"/>
-              </a:spcBef>
-              <a:spcAft>
-                <a:spcPts val="0"/>
-              </a:spcAft>
+              <a:lnSpc>
+                <a:spcPct val="100000"/>
+              </a:lnSpc>
+              <a:spcBef>
+                <a:spcPts val="0"/>
+              </a:spcBef>
+              <a:spcAft>
+                <a:spcPts val="0"/>
+              </a:spcAft>
+              <a:buSzPts val="2800"/>
               <a:buNone/>
             </a:pPr>
             <a:r>
@@ -13886,6 +14281,10 @@
           <a:prstGeom prst="rect">
             <a:avLst/>
           </a:prstGeom>
+          <a:noFill/>
+          <a:ln>
+            <a:noFill/>
+          </a:ln>
         </p:spPr>
         <p:txBody>
           <a:bodyPr anchorCtr="0" anchor="t" bIns="91425" lIns="91425" spcFirstLastPara="1" rIns="91425" wrap="square" tIns="91425">
@@ -13894,12 +14293,16 @@
           <a:lstStyle/>
           <a:p>
             <a:pPr indent="0" lvl="0" marL="0" rtl="0" algn="just">
-              <a:spcBef>
-                <a:spcPts val="0"/>
-              </a:spcBef>
-              <a:spcAft>
-                <a:spcPts val="0"/>
-              </a:spcAft>
+              <a:lnSpc>
+                <a:spcPct val="115000"/>
+              </a:lnSpc>
+              <a:spcBef>
+                <a:spcPts val="0"/>
+              </a:spcBef>
+              <a:spcAft>
+                <a:spcPts val="0"/>
+              </a:spcAft>
+              <a:buSzPct val="142857"/>
               <a:buNone/>
             </a:pPr>
             <a:r>
@@ -13910,6 +14313,9 @@
           </a:p>
           <a:p>
             <a:pPr indent="-286385" lvl="0" marL="457200" rtl="0" algn="just">
+              <a:lnSpc>
+                <a:spcPct val="115000"/>
+              </a:lnSpc>
               <a:spcBef>
                 <a:spcPts val="0"/>
               </a:spcBef>
@@ -13927,12 +14333,16 @@
           </a:p>
           <a:p>
             <a:pPr indent="0" lvl="0" marL="0" rtl="0" algn="just">
-              <a:spcBef>
-                <a:spcPts val="0"/>
-              </a:spcBef>
-              <a:spcAft>
-                <a:spcPts val="0"/>
-              </a:spcAft>
+              <a:lnSpc>
+                <a:spcPct val="115000"/>
+              </a:lnSpc>
+              <a:spcBef>
+                <a:spcPts val="0"/>
+              </a:spcBef>
+              <a:spcAft>
+                <a:spcPts val="0"/>
+              </a:spcAft>
+              <a:buSzPct val="142857"/>
               <a:buNone/>
             </a:pPr>
             <a:r>
@@ -13942,12 +14352,16 @@
           </a:p>
           <a:p>
             <a:pPr indent="0" lvl="0" marL="0" rtl="0" algn="just">
-              <a:spcBef>
-                <a:spcPts val="0"/>
-              </a:spcBef>
-              <a:spcAft>
-                <a:spcPts val="0"/>
-              </a:spcAft>
+              <a:lnSpc>
+                <a:spcPct val="115000"/>
+              </a:lnSpc>
+              <a:spcBef>
+                <a:spcPts val="0"/>
+              </a:spcBef>
+              <a:spcAft>
+                <a:spcPts val="0"/>
+              </a:spcAft>
+              <a:buSzPct val="142857"/>
               <a:buNone/>
             </a:pPr>
             <a:r>
@@ -13958,6 +14372,9 @@
           </a:p>
           <a:p>
             <a:pPr indent="-286385" lvl="0" marL="457200" rtl="0" algn="just">
+              <a:lnSpc>
+                <a:spcPct val="115000"/>
+              </a:lnSpc>
               <a:spcBef>
                 <a:spcPts val="0"/>
               </a:spcBef>
@@ -13975,12 +14392,16 @@
           </a:p>
           <a:p>
             <a:pPr indent="0" lvl="0" marL="0" rtl="0" algn="just">
-              <a:spcBef>
-                <a:spcPts val="0"/>
-              </a:spcBef>
-              <a:spcAft>
-                <a:spcPts val="0"/>
-              </a:spcAft>
+              <a:lnSpc>
+                <a:spcPct val="115000"/>
+              </a:lnSpc>
+              <a:spcBef>
+                <a:spcPts val="0"/>
+              </a:spcBef>
+              <a:spcAft>
+                <a:spcPts val="0"/>
+              </a:spcAft>
+              <a:buSzPct val="142857"/>
               <a:buNone/>
             </a:pPr>
             <a:r>
@@ -13990,12 +14411,16 @@
           </a:p>
           <a:p>
             <a:pPr indent="0" lvl="0" marL="0" rtl="0" algn="just">
-              <a:spcBef>
-                <a:spcPts val="0"/>
-              </a:spcBef>
-              <a:spcAft>
-                <a:spcPts val="0"/>
-              </a:spcAft>
+              <a:lnSpc>
+                <a:spcPct val="115000"/>
+              </a:lnSpc>
+              <a:spcBef>
+                <a:spcPts val="0"/>
+              </a:spcBef>
+              <a:spcAft>
+                <a:spcPts val="0"/>
+              </a:spcAft>
+              <a:buSzPct val="142857"/>
               <a:buNone/>
             </a:pPr>
             <a:r>
@@ -14006,6 +14431,9 @@
           </a:p>
           <a:p>
             <a:pPr indent="-286385" lvl="0" marL="457200" rtl="0" algn="just">
+              <a:lnSpc>
+                <a:spcPct val="115000"/>
+              </a:lnSpc>
               <a:spcBef>
                 <a:spcPts val="0"/>
               </a:spcBef>
@@ -14023,12 +14451,16 @@
           </a:p>
           <a:p>
             <a:pPr indent="0" lvl="0" marL="0" rtl="0" algn="just">
-              <a:spcBef>
-                <a:spcPts val="0"/>
-              </a:spcBef>
-              <a:spcAft>
-                <a:spcPts val="0"/>
-              </a:spcAft>
+              <a:lnSpc>
+                <a:spcPct val="115000"/>
+              </a:lnSpc>
+              <a:spcBef>
+                <a:spcPts val="0"/>
+              </a:spcBef>
+              <a:spcAft>
+                <a:spcPts val="0"/>
+              </a:spcAft>
+              <a:buSzPct val="142857"/>
               <a:buNone/>
             </a:pPr>
             <a:r>
@@ -14038,12 +14470,16 @@
           </a:p>
           <a:p>
             <a:pPr indent="0" lvl="0" marL="0" rtl="0" algn="just">
-              <a:spcBef>
-                <a:spcPts val="0"/>
-              </a:spcBef>
-              <a:spcAft>
-                <a:spcPts val="0"/>
-              </a:spcAft>
+              <a:lnSpc>
+                <a:spcPct val="115000"/>
+              </a:lnSpc>
+              <a:spcBef>
+                <a:spcPts val="0"/>
+              </a:spcBef>
+              <a:spcAft>
+                <a:spcPts val="0"/>
+              </a:spcAft>
+              <a:buSzPct val="142857"/>
               <a:buNone/>
             </a:pPr>
             <a:r>
@@ -14054,6 +14490,9 @@
           </a:p>
           <a:p>
             <a:pPr indent="-286385" lvl="0" marL="457200" rtl="0" algn="just">
+              <a:lnSpc>
+                <a:spcPct val="115000"/>
+              </a:lnSpc>
               <a:spcBef>
                 <a:spcPts val="0"/>
               </a:spcBef>
@@ -14071,12 +14510,16 @@
           </a:p>
           <a:p>
             <a:pPr indent="0" lvl="0" marL="0" rtl="0" algn="just">
-              <a:spcBef>
-                <a:spcPts val="0"/>
-              </a:spcBef>
-              <a:spcAft>
-                <a:spcPts val="0"/>
-              </a:spcAft>
+              <a:lnSpc>
+                <a:spcPct val="115000"/>
+              </a:lnSpc>
+              <a:spcBef>
+                <a:spcPts val="0"/>
+              </a:spcBef>
+              <a:spcAft>
+                <a:spcPts val="0"/>
+              </a:spcAft>
+              <a:buSzPct val="142857"/>
               <a:buNone/>
             </a:pPr>
             <a:r>
@@ -14086,12 +14529,16 @@
           </a:p>
           <a:p>
             <a:pPr indent="0" lvl="0" marL="0" rtl="0" algn="just">
-              <a:spcBef>
-                <a:spcPts val="0"/>
-              </a:spcBef>
-              <a:spcAft>
-                <a:spcPts val="0"/>
-              </a:spcAft>
+              <a:lnSpc>
+                <a:spcPct val="115000"/>
+              </a:lnSpc>
+              <a:spcBef>
+                <a:spcPts val="0"/>
+              </a:spcBef>
+              <a:spcAft>
+                <a:spcPts val="0"/>
+              </a:spcAft>
+              <a:buSzPct val="142857"/>
               <a:buNone/>
             </a:pPr>
             <a:r>
@@ -14102,6 +14549,9 @@
           </a:p>
           <a:p>
             <a:pPr indent="-286385" lvl="0" marL="457200" rtl="0" algn="just">
+              <a:lnSpc>
+                <a:spcPct val="115000"/>
+              </a:lnSpc>
               <a:spcBef>
                 <a:spcPts val="0"/>
               </a:spcBef>
@@ -14119,12 +14569,16 @@
           </a:p>
           <a:p>
             <a:pPr indent="0" lvl="0" marL="0" rtl="0" algn="just">
-              <a:spcBef>
-                <a:spcPts val="0"/>
-              </a:spcBef>
-              <a:spcAft>
-                <a:spcPts val="0"/>
-              </a:spcAft>
+              <a:lnSpc>
+                <a:spcPct val="115000"/>
+              </a:lnSpc>
+              <a:spcBef>
+                <a:spcPts val="0"/>
+              </a:spcBef>
+              <a:spcAft>
+                <a:spcPts val="0"/>
+              </a:spcAft>
+              <a:buSzPct val="142857"/>
               <a:buNone/>
             </a:pPr>
             <a:r>
@@ -14160,20 +14614,44 @@
           </a:bodyPr>
           <a:lstStyle/>
           <a:p>
-            <a:pPr indent="0" lvl="0" marL="0" rtl="0" algn="l">
-              <a:spcBef>
-                <a:spcPts val="0"/>
-              </a:spcBef>
-              <a:spcAft>
-                <a:spcPts val="0"/>
-              </a:spcAft>
-              <a:buNone/>
-            </a:pPr>
-            <a:r>
-              <a:rPr lang="pt-BR" sz="1000"/>
+            <a:pPr indent="0" lvl="0" marL="0" marR="0" rtl="0" algn="l">
+              <a:lnSpc>
+                <a:spcPct val="100000"/>
+              </a:lnSpc>
+              <a:spcBef>
+                <a:spcPts val="0"/>
+              </a:spcBef>
+              <a:spcAft>
+                <a:spcPts val="0"/>
+              </a:spcAft>
+              <a:buClr>
+                <a:srgbClr val="000000"/>
+              </a:buClr>
+              <a:buSzPts val="1000"/>
+              <a:buFont typeface="Arial"/>
+              <a:buNone/>
+            </a:pPr>
+            <a:r>
+              <a:rPr b="0" i="0" lang="pt-BR" sz="1000" u="none" cap="none" strike="noStrike">
+                <a:solidFill>
+                  <a:srgbClr val="000000"/>
+                </a:solidFill>
+                <a:latin typeface="Arial"/>
+                <a:ea typeface="Arial"/>
+                <a:cs typeface="Arial"/>
+                <a:sym typeface="Arial"/>
+              </a:rPr>
               <a:t>https://github.com/g12-4soat/techmedicos-docs/blob/main/docs/hackathon-soat.pdf</a:t>
             </a:r>
-            <a:endParaRPr sz="1000"/>
+            <a:endParaRPr b="0" i="0" sz="1000" u="none" cap="none" strike="noStrike">
+              <a:solidFill>
+                <a:srgbClr val="000000"/>
+              </a:solidFill>
+              <a:latin typeface="Arial"/>
+              <a:ea typeface="Arial"/>
+              <a:cs typeface="Arial"/>
+              <a:sym typeface="Arial"/>
+            </a:endParaRPr>
           </a:p>
         </p:txBody>
       </p:sp>
@@ -14193,6 +14671,10 @@
           <a:prstGeom prst="rect">
             <a:avLst/>
           </a:prstGeom>
+          <a:noFill/>
+          <a:ln>
+            <a:noFill/>
+          </a:ln>
         </p:spPr>
         <p:txBody>
           <a:bodyPr anchorCtr="0" anchor="t" bIns="91425" lIns="91425" spcFirstLastPara="1" rIns="91425" wrap="square" tIns="91425">
@@ -14201,12 +14683,16 @@
           <a:lstStyle/>
           <a:p>
             <a:pPr indent="0" lvl="0" marL="0" rtl="0" algn="just">
-              <a:spcBef>
-                <a:spcPts val="0"/>
-              </a:spcBef>
-              <a:spcAft>
-                <a:spcPts val="0"/>
-              </a:spcAft>
+              <a:lnSpc>
+                <a:spcPct val="115000"/>
+              </a:lnSpc>
+              <a:spcBef>
+                <a:spcPts val="0"/>
+              </a:spcBef>
+              <a:spcAft>
+                <a:spcPts val="0"/>
+              </a:spcAft>
+              <a:buSzPct val="142857"/>
               <a:buNone/>
             </a:pPr>
             <a:r>
@@ -14217,6 +14703,9 @@
           </a:p>
           <a:p>
             <a:pPr indent="-286385" lvl="0" marL="457200" rtl="0" algn="just">
+              <a:lnSpc>
+                <a:spcPct val="115000"/>
+              </a:lnSpc>
               <a:spcBef>
                 <a:spcPts val="0"/>
               </a:spcBef>
@@ -14234,12 +14723,16 @@
           </a:p>
           <a:p>
             <a:pPr indent="0" lvl="0" marL="0" rtl="0" algn="just">
-              <a:spcBef>
-                <a:spcPts val="0"/>
-              </a:spcBef>
-              <a:spcAft>
-                <a:spcPts val="0"/>
-              </a:spcAft>
+              <a:lnSpc>
+                <a:spcPct val="115000"/>
+              </a:lnSpc>
+              <a:spcBef>
+                <a:spcPts val="0"/>
+              </a:spcBef>
+              <a:spcAft>
+                <a:spcPts val="0"/>
+              </a:spcAft>
+              <a:buSzPct val="142857"/>
               <a:buNone/>
             </a:pPr>
             <a:r>
@@ -14250,12 +14743,16 @@
           </a:p>
           <a:p>
             <a:pPr indent="0" lvl="0" marL="0" rtl="0" algn="just">
-              <a:spcBef>
-                <a:spcPts val="0"/>
-              </a:spcBef>
-              <a:spcAft>
-                <a:spcPts val="0"/>
-              </a:spcAft>
+              <a:lnSpc>
+                <a:spcPct val="115000"/>
+              </a:lnSpc>
+              <a:spcBef>
+                <a:spcPts val="0"/>
+              </a:spcBef>
+              <a:spcAft>
+                <a:spcPts val="0"/>
+              </a:spcAft>
+              <a:buSzPct val="142857"/>
               <a:buNone/>
             </a:pPr>
             <a:r>
@@ -14265,12 +14762,16 @@
           </a:p>
           <a:p>
             <a:pPr indent="0" lvl="0" marL="0" rtl="0" algn="just">
-              <a:spcBef>
-                <a:spcPts val="0"/>
-              </a:spcBef>
-              <a:spcAft>
-                <a:spcPts val="0"/>
-              </a:spcAft>
+              <a:lnSpc>
+                <a:spcPct val="115000"/>
+              </a:lnSpc>
+              <a:spcBef>
+                <a:spcPts val="0"/>
+              </a:spcBef>
+              <a:spcAft>
+                <a:spcPts val="0"/>
+              </a:spcAft>
+              <a:buSzPct val="142857"/>
               <a:buNone/>
             </a:pPr>
             <a:r>
@@ -14281,6 +14782,9 @@
           </a:p>
           <a:p>
             <a:pPr indent="-286385" lvl="0" marL="457200" rtl="0" algn="just">
+              <a:lnSpc>
+                <a:spcPct val="115000"/>
+              </a:lnSpc>
               <a:spcBef>
                 <a:spcPts val="0"/>
               </a:spcBef>
@@ -14298,12 +14802,16 @@
           </a:p>
           <a:p>
             <a:pPr indent="0" lvl="0" marL="0" rtl="0" algn="just">
-              <a:spcBef>
-                <a:spcPts val="0"/>
-              </a:spcBef>
-              <a:spcAft>
-                <a:spcPts val="0"/>
-              </a:spcAft>
+              <a:lnSpc>
+                <a:spcPct val="115000"/>
+              </a:lnSpc>
+              <a:spcBef>
+                <a:spcPts val="0"/>
+              </a:spcBef>
+              <a:spcAft>
+                <a:spcPts val="0"/>
+              </a:spcAft>
+              <a:buSzPct val="142857"/>
               <a:buNone/>
             </a:pPr>
             <a:r>
@@ -14313,12 +14821,16 @@
           </a:p>
           <a:p>
             <a:pPr indent="0" lvl="0" marL="0" rtl="0" algn="just">
-              <a:spcBef>
-                <a:spcPts val="0"/>
-              </a:spcBef>
-              <a:spcAft>
-                <a:spcPts val="0"/>
-              </a:spcAft>
+              <a:lnSpc>
+                <a:spcPct val="115000"/>
+              </a:lnSpc>
+              <a:spcBef>
+                <a:spcPts val="0"/>
+              </a:spcBef>
+              <a:spcAft>
+                <a:spcPts val="0"/>
+              </a:spcAft>
+              <a:buSzPct val="142857"/>
               <a:buNone/>
             </a:pPr>
             <a:r>
@@ -14329,12 +14841,16 @@
           </a:p>
           <a:p>
             <a:pPr indent="0" lvl="0" marL="0" rtl="0" algn="just">
-              <a:spcBef>
-                <a:spcPts val="0"/>
-              </a:spcBef>
-              <a:spcAft>
-                <a:spcPts val="0"/>
-              </a:spcAft>
+              <a:lnSpc>
+                <a:spcPct val="115000"/>
+              </a:lnSpc>
+              <a:spcBef>
+                <a:spcPts val="0"/>
+              </a:spcBef>
+              <a:spcAft>
+                <a:spcPts val="0"/>
+              </a:spcAft>
+              <a:buSzPct val="142857"/>
               <a:buNone/>
             </a:pPr>
             <a:r>
@@ -14345,6 +14861,9 @@
           </a:p>
           <a:p>
             <a:pPr indent="-286385" lvl="0" marL="457200" rtl="0" algn="just">
+              <a:lnSpc>
+                <a:spcPct val="115000"/>
+              </a:lnSpc>
               <a:spcBef>
                 <a:spcPts val="0"/>
               </a:spcBef>
@@ -14362,12 +14881,16 @@
           </a:p>
           <a:p>
             <a:pPr indent="0" lvl="0" marL="0" rtl="0" algn="just">
-              <a:spcBef>
-                <a:spcPts val="0"/>
-              </a:spcBef>
-              <a:spcAft>
-                <a:spcPts val="0"/>
-              </a:spcAft>
+              <a:lnSpc>
+                <a:spcPct val="115000"/>
+              </a:lnSpc>
+              <a:spcBef>
+                <a:spcPts val="0"/>
+              </a:spcBef>
+              <a:spcAft>
+                <a:spcPts val="0"/>
+              </a:spcAft>
+              <a:buSzPct val="142857"/>
               <a:buNone/>
             </a:pPr>
             <a:r>
@@ -14378,6 +14901,9 @@
           </a:p>
           <a:p>
             <a:pPr indent="-286385" lvl="0" marL="457200" rtl="0" algn="just">
+              <a:lnSpc>
+                <a:spcPct val="115000"/>
+              </a:lnSpc>
               <a:spcBef>
                 <a:spcPts val="0"/>
               </a:spcBef>
@@ -14395,12 +14921,16 @@
           </a:p>
           <a:p>
             <a:pPr indent="0" lvl="0" marL="0" rtl="0" algn="just">
-              <a:spcBef>
-                <a:spcPts val="0"/>
-              </a:spcBef>
-              <a:spcAft>
-                <a:spcPts val="0"/>
-              </a:spcAft>
+              <a:lnSpc>
+                <a:spcPct val="115000"/>
+              </a:lnSpc>
+              <a:spcBef>
+                <a:spcPts val="0"/>
+              </a:spcBef>
+              <a:spcAft>
+                <a:spcPts val="0"/>
+              </a:spcAft>
+              <a:buSzPct val="142857"/>
               <a:buNone/>
             </a:pPr>
             <a:r>
@@ -14459,6 +14989,10 @@
           <a:prstGeom prst="rect">
             <a:avLst/>
           </a:prstGeom>
+          <a:noFill/>
+          <a:ln>
+            <a:noFill/>
+          </a:ln>
         </p:spPr>
         <p:txBody>
           <a:bodyPr anchorCtr="0" anchor="t" bIns="91425" lIns="91425" spcFirstLastPara="1" rIns="91425" wrap="square" tIns="91425">
@@ -14467,12 +15001,16 @@
           <a:lstStyle/>
           <a:p>
             <a:pPr indent="0" lvl="0" marL="0" rtl="0" algn="l">
-              <a:spcBef>
-                <a:spcPts val="0"/>
-              </a:spcBef>
-              <a:spcAft>
-                <a:spcPts val="0"/>
-              </a:spcAft>
+              <a:lnSpc>
+                <a:spcPct val="100000"/>
+              </a:lnSpc>
+              <a:spcBef>
+                <a:spcPts val="0"/>
+              </a:spcBef>
+              <a:spcAft>
+                <a:spcPts val="0"/>
+              </a:spcAft>
+              <a:buSzPts val="2800"/>
               <a:buNone/>
             </a:pPr>
             <a:r>
@@ -14503,6 +15041,10 @@
           <a:prstGeom prst="rect">
             <a:avLst/>
           </a:prstGeom>
+          <a:noFill/>
+          <a:ln>
+            <a:noFill/>
+          </a:ln>
         </p:spPr>
         <p:txBody>
           <a:bodyPr anchorCtr="0" anchor="t" bIns="91425" lIns="91425" spcFirstLastPara="1" rIns="91425" wrap="square" tIns="91425">
@@ -14511,12 +15053,16 @@
           <a:lstStyle/>
           <a:p>
             <a:pPr indent="0" lvl="0" marL="0" rtl="0" algn="just">
-              <a:spcBef>
-                <a:spcPts val="0"/>
-              </a:spcBef>
-              <a:spcAft>
-                <a:spcPts val="0"/>
-              </a:spcAft>
+              <a:lnSpc>
+                <a:spcPct val="115000"/>
+              </a:lnSpc>
+              <a:spcBef>
+                <a:spcPts val="0"/>
+              </a:spcBef>
+              <a:spcAft>
+                <a:spcPts val="0"/>
+              </a:spcAft>
+              <a:buSzPts val="1300"/>
               <a:buNone/>
             </a:pPr>
             <a:r>
@@ -14527,6 +15073,9 @@
           </a:p>
           <a:p>
             <a:pPr indent="-311150" lvl="0" marL="457200" rtl="0" algn="just">
+              <a:lnSpc>
+                <a:spcPct val="115000"/>
+              </a:lnSpc>
               <a:spcBef>
                 <a:spcPts val="0"/>
               </a:spcBef>
@@ -14544,12 +15093,16 @@
           </a:p>
           <a:p>
             <a:pPr indent="0" lvl="0" marL="0" rtl="0" algn="just">
-              <a:spcBef>
-                <a:spcPts val="0"/>
-              </a:spcBef>
-              <a:spcAft>
-                <a:spcPts val="0"/>
-              </a:spcAft>
+              <a:lnSpc>
+                <a:spcPct val="115000"/>
+              </a:lnSpc>
+              <a:spcBef>
+                <a:spcPts val="0"/>
+              </a:spcBef>
+              <a:spcAft>
+                <a:spcPts val="0"/>
+              </a:spcAft>
+              <a:buSzPts val="1300"/>
               <a:buNone/>
             </a:pPr>
             <a:r>
@@ -14559,12 +15112,16 @@
           </a:p>
           <a:p>
             <a:pPr indent="0" lvl="0" marL="0" rtl="0" algn="just">
-              <a:spcBef>
-                <a:spcPts val="0"/>
-              </a:spcBef>
-              <a:spcAft>
-                <a:spcPts val="0"/>
-              </a:spcAft>
+              <a:lnSpc>
+                <a:spcPct val="115000"/>
+              </a:lnSpc>
+              <a:spcBef>
+                <a:spcPts val="0"/>
+              </a:spcBef>
+              <a:spcAft>
+                <a:spcPts val="0"/>
+              </a:spcAft>
+              <a:buSzPts val="1300"/>
               <a:buNone/>
             </a:pPr>
             <a:r>
@@ -14575,6 +15132,9 @@
           </a:p>
           <a:p>
             <a:pPr indent="-311150" lvl="0" marL="457200" rtl="0" algn="just">
+              <a:lnSpc>
+                <a:spcPct val="115000"/>
+              </a:lnSpc>
               <a:spcBef>
                 <a:spcPts val="0"/>
               </a:spcBef>
@@ -14592,12 +15152,16 @@
           </a:p>
           <a:p>
             <a:pPr indent="0" lvl="0" marL="0" rtl="0" algn="just">
-              <a:spcBef>
-                <a:spcPts val="0"/>
-              </a:spcBef>
-              <a:spcAft>
-                <a:spcPts val="0"/>
-              </a:spcAft>
+              <a:lnSpc>
+                <a:spcPct val="115000"/>
+              </a:lnSpc>
+              <a:spcBef>
+                <a:spcPts val="0"/>
+              </a:spcBef>
+              <a:spcAft>
+                <a:spcPts val="0"/>
+              </a:spcAft>
+              <a:buSzPts val="1300"/>
               <a:buNone/>
             </a:pPr>
             <a:r>
@@ -14607,12 +15171,16 @@
           </a:p>
           <a:p>
             <a:pPr indent="0" lvl="0" marL="0" rtl="0" algn="just">
-              <a:spcBef>
-                <a:spcPts val="0"/>
-              </a:spcBef>
-              <a:spcAft>
-                <a:spcPts val="0"/>
-              </a:spcAft>
+              <a:lnSpc>
+                <a:spcPct val="115000"/>
+              </a:lnSpc>
+              <a:spcBef>
+                <a:spcPts val="0"/>
+              </a:spcBef>
+              <a:spcAft>
+                <a:spcPts val="0"/>
+              </a:spcAft>
+              <a:buSzPts val="1300"/>
               <a:buNone/>
             </a:pPr>
             <a:r>
@@ -14623,6 +15191,9 @@
           </a:p>
           <a:p>
             <a:pPr indent="-311150" lvl="0" marL="457200" rtl="0" algn="just">
+              <a:lnSpc>
+                <a:spcPct val="115000"/>
+              </a:lnSpc>
               <a:spcBef>
                 <a:spcPts val="0"/>
               </a:spcBef>
@@ -14640,6 +15211,9 @@
           </a:p>
           <a:p>
             <a:pPr indent="-311150" lvl="0" marL="457200" rtl="0" algn="just">
+              <a:lnSpc>
+                <a:spcPct val="115000"/>
+              </a:lnSpc>
               <a:spcBef>
                 <a:spcPts val="0"/>
               </a:spcBef>
@@ -14682,20 +15256,44 @@
           </a:bodyPr>
           <a:lstStyle/>
           <a:p>
-            <a:pPr indent="0" lvl="0" marL="0" rtl="0" algn="l">
-              <a:spcBef>
-                <a:spcPts val="0"/>
-              </a:spcBef>
-              <a:spcAft>
-                <a:spcPts val="0"/>
-              </a:spcAft>
-              <a:buNone/>
-            </a:pPr>
-            <a:r>
-              <a:rPr lang="pt-BR" sz="1000"/>
+            <a:pPr indent="0" lvl="0" marL="0" marR="0" rtl="0" algn="l">
+              <a:lnSpc>
+                <a:spcPct val="100000"/>
+              </a:lnSpc>
+              <a:spcBef>
+                <a:spcPts val="0"/>
+              </a:spcBef>
+              <a:spcAft>
+                <a:spcPts val="0"/>
+              </a:spcAft>
+              <a:buClr>
+                <a:srgbClr val="000000"/>
+              </a:buClr>
+              <a:buSzPts val="1000"/>
+              <a:buFont typeface="Arial"/>
+              <a:buNone/>
+            </a:pPr>
+            <a:r>
+              <a:rPr b="0" i="0" lang="pt-BR" sz="1000" u="none" cap="none" strike="noStrike">
+                <a:solidFill>
+                  <a:srgbClr val="000000"/>
+                </a:solidFill>
+                <a:latin typeface="Arial"/>
+                <a:ea typeface="Arial"/>
+                <a:cs typeface="Arial"/>
+                <a:sym typeface="Arial"/>
+              </a:rPr>
               <a:t>https://github.com/g12-4soat/techmedicos-docs/blob/main/docs/hackathon-soat.pdf</a:t>
             </a:r>
-            <a:endParaRPr sz="1000"/>
+            <a:endParaRPr b="0" i="0" sz="1000" u="none" cap="none" strike="noStrike">
+              <a:solidFill>
+                <a:srgbClr val="000000"/>
+              </a:solidFill>
+              <a:latin typeface="Arial"/>
+              <a:ea typeface="Arial"/>
+              <a:cs typeface="Arial"/>
+              <a:sym typeface="Arial"/>
+            </a:endParaRPr>
           </a:p>
         </p:txBody>
       </p:sp>
@@ -14747,6 +15345,10 @@
           <a:prstGeom prst="rect">
             <a:avLst/>
           </a:prstGeom>
+          <a:noFill/>
+          <a:ln>
+            <a:noFill/>
+          </a:ln>
         </p:spPr>
         <p:txBody>
           <a:bodyPr anchorCtr="0" anchor="t" bIns="91425" lIns="91425" spcFirstLastPara="1" rIns="91425" wrap="square" tIns="91425">
@@ -14755,12 +15357,16 @@
           <a:lstStyle/>
           <a:p>
             <a:pPr indent="0" lvl="0" marL="0" rtl="0" algn="l">
-              <a:spcBef>
-                <a:spcPts val="0"/>
-              </a:spcBef>
-              <a:spcAft>
-                <a:spcPts val="0"/>
-              </a:spcAft>
+              <a:lnSpc>
+                <a:spcPct val="100000"/>
+              </a:lnSpc>
+              <a:spcBef>
+                <a:spcPts val="0"/>
+              </a:spcBef>
+              <a:spcAft>
+                <a:spcPts val="0"/>
+              </a:spcAft>
+              <a:buSzPts val="2800"/>
               <a:buNone/>
             </a:pPr>
             <a:r>
@@ -14791,6 +15397,10 @@
           <a:prstGeom prst="rect">
             <a:avLst/>
           </a:prstGeom>
+          <a:noFill/>
+          <a:ln>
+            <a:noFill/>
+          </a:ln>
         </p:spPr>
         <p:txBody>
           <a:bodyPr anchorCtr="0" anchor="t" bIns="91425" lIns="91425" spcFirstLastPara="1" rIns="91425" wrap="square" tIns="91425">
@@ -14799,12 +15409,16 @@
           <a:lstStyle/>
           <a:p>
             <a:pPr indent="0" lvl="0" marL="0" rtl="0" algn="just">
-              <a:spcBef>
-                <a:spcPts val="0"/>
-              </a:spcBef>
-              <a:spcAft>
-                <a:spcPts val="0"/>
-              </a:spcAft>
+              <a:lnSpc>
+                <a:spcPct val="115000"/>
+              </a:lnSpc>
+              <a:spcBef>
+                <a:spcPts val="0"/>
+              </a:spcBef>
+              <a:spcAft>
+                <a:spcPts val="0"/>
+              </a:spcAft>
+              <a:buSzPct val="108108"/>
               <a:buNone/>
             </a:pPr>
             <a:r>
@@ -14815,12 +15429,16 @@
           </a:p>
           <a:p>
             <a:pPr indent="0" lvl="0" marL="0" rtl="0" algn="just">
-              <a:spcBef>
-                <a:spcPts val="0"/>
-              </a:spcBef>
-              <a:spcAft>
-                <a:spcPts val="0"/>
-              </a:spcAft>
+              <a:lnSpc>
+                <a:spcPct val="115000"/>
+              </a:lnSpc>
+              <a:spcBef>
+                <a:spcPts val="0"/>
+              </a:spcBef>
+              <a:spcAft>
+                <a:spcPts val="0"/>
+              </a:spcAft>
+              <a:buSzPct val="108108"/>
               <a:buNone/>
             </a:pPr>
             <a:r>
@@ -14830,12 +15448,16 @@
           </a:p>
           <a:p>
             <a:pPr indent="0" lvl="0" marL="0" rtl="0" algn="just">
-              <a:spcBef>
-                <a:spcPts val="0"/>
-              </a:spcBef>
-              <a:spcAft>
-                <a:spcPts val="0"/>
-              </a:spcAft>
+              <a:lnSpc>
+                <a:spcPct val="115000"/>
+              </a:lnSpc>
+              <a:spcBef>
+                <a:spcPts val="0"/>
+              </a:spcBef>
+              <a:spcAft>
+                <a:spcPts val="0"/>
+              </a:spcAft>
+              <a:buSzPct val="108108"/>
               <a:buNone/>
             </a:pPr>
             <a:r>
@@ -14846,12 +15468,16 @@
           </a:p>
           <a:p>
             <a:pPr indent="0" lvl="0" marL="0" rtl="0" algn="just">
-              <a:spcBef>
-                <a:spcPts val="0"/>
-              </a:spcBef>
-              <a:spcAft>
-                <a:spcPts val="0"/>
-              </a:spcAft>
+              <a:lnSpc>
+                <a:spcPct val="115000"/>
+              </a:lnSpc>
+              <a:spcBef>
+                <a:spcPts val="0"/>
+              </a:spcBef>
+              <a:spcAft>
+                <a:spcPts val="0"/>
+              </a:spcAft>
+              <a:buSzPct val="108108"/>
               <a:buNone/>
             </a:pPr>
             <a:r>
@@ -14861,12 +15487,16 @@
           </a:p>
           <a:p>
             <a:pPr indent="0" lvl="0" marL="0" rtl="0" algn="just">
-              <a:spcBef>
-                <a:spcPts val="0"/>
-              </a:spcBef>
-              <a:spcAft>
-                <a:spcPts val="0"/>
-              </a:spcAft>
+              <a:lnSpc>
+                <a:spcPct val="115000"/>
+              </a:lnSpc>
+              <a:spcBef>
+                <a:spcPts val="0"/>
+              </a:spcBef>
+              <a:spcAft>
+                <a:spcPts val="0"/>
+              </a:spcAft>
+              <a:buSzPct val="108108"/>
               <a:buNone/>
             </a:pPr>
             <a:r>
@@ -14877,12 +15507,16 @@
           </a:p>
           <a:p>
             <a:pPr indent="0" lvl="0" marL="0" rtl="0" algn="just">
-              <a:spcBef>
-                <a:spcPts val="0"/>
-              </a:spcBef>
-              <a:spcAft>
-                <a:spcPts val="0"/>
-              </a:spcAft>
+              <a:lnSpc>
+                <a:spcPct val="115000"/>
+              </a:lnSpc>
+              <a:spcBef>
+                <a:spcPts val="0"/>
+              </a:spcBef>
+              <a:spcAft>
+                <a:spcPts val="0"/>
+              </a:spcAft>
+              <a:buSzPct val="108108"/>
               <a:buNone/>
             </a:pPr>
             <a:r>
@@ -14892,12 +15526,16 @@
           </a:p>
           <a:p>
             <a:pPr indent="0" lvl="0" marL="0" rtl="0" algn="just">
-              <a:spcBef>
-                <a:spcPts val="0"/>
-              </a:spcBef>
-              <a:spcAft>
-                <a:spcPts val="0"/>
-              </a:spcAft>
+              <a:lnSpc>
+                <a:spcPct val="115000"/>
+              </a:lnSpc>
+              <a:spcBef>
+                <a:spcPts val="0"/>
+              </a:spcBef>
+              <a:spcAft>
+                <a:spcPts val="0"/>
+              </a:spcAft>
+              <a:buSzPct val="108108"/>
               <a:buNone/>
             </a:pPr>
             <a:r>
@@ -14933,20 +15571,44 @@
           </a:bodyPr>
           <a:lstStyle/>
           <a:p>
-            <a:pPr indent="0" lvl="0" marL="0" rtl="0" algn="l">
-              <a:spcBef>
-                <a:spcPts val="0"/>
-              </a:spcBef>
-              <a:spcAft>
-                <a:spcPts val="0"/>
-              </a:spcAft>
-              <a:buNone/>
-            </a:pPr>
-            <a:r>
-              <a:rPr lang="pt-BR" sz="1000"/>
+            <a:pPr indent="0" lvl="0" marL="0" marR="0" rtl="0" algn="l">
+              <a:lnSpc>
+                <a:spcPct val="100000"/>
+              </a:lnSpc>
+              <a:spcBef>
+                <a:spcPts val="0"/>
+              </a:spcBef>
+              <a:spcAft>
+                <a:spcPts val="0"/>
+              </a:spcAft>
+              <a:buClr>
+                <a:srgbClr val="000000"/>
+              </a:buClr>
+              <a:buSzPts val="1000"/>
+              <a:buFont typeface="Arial"/>
+              <a:buNone/>
+            </a:pPr>
+            <a:r>
+              <a:rPr b="0" i="0" lang="pt-BR" sz="1000" u="none" cap="none" strike="noStrike">
+                <a:solidFill>
+                  <a:srgbClr val="000000"/>
+                </a:solidFill>
+                <a:latin typeface="Arial"/>
+                <a:ea typeface="Arial"/>
+                <a:cs typeface="Arial"/>
+                <a:sym typeface="Arial"/>
+              </a:rPr>
               <a:t>https://github.com/g12-4soat/techmedicos-docs/blob/main/docs/hackathon-soat.pdf</a:t>
             </a:r>
-            <a:endParaRPr sz="1000"/>
+            <a:endParaRPr b="0" i="0" sz="1000" u="none" cap="none" strike="noStrike">
+              <a:solidFill>
+                <a:srgbClr val="000000"/>
+              </a:solidFill>
+              <a:latin typeface="Arial"/>
+              <a:ea typeface="Arial"/>
+              <a:cs typeface="Arial"/>
+              <a:sym typeface="Arial"/>
+            </a:endParaRPr>
           </a:p>
         </p:txBody>
       </p:sp>
@@ -14966,6 +15628,10 @@
           <a:prstGeom prst="rect">
             <a:avLst/>
           </a:prstGeom>
+          <a:noFill/>
+          <a:ln>
+            <a:noFill/>
+          </a:ln>
         </p:spPr>
         <p:txBody>
           <a:bodyPr anchorCtr="0" anchor="t" bIns="91425" lIns="91425" spcFirstLastPara="1" rIns="91425" wrap="square" tIns="91425">
@@ -14974,12 +15640,16 @@
           <a:lstStyle/>
           <a:p>
             <a:pPr indent="0" lvl="0" marL="0" rtl="0" algn="just">
-              <a:spcBef>
-                <a:spcPts val="0"/>
-              </a:spcBef>
-              <a:spcAft>
-                <a:spcPts val="0"/>
-              </a:spcAft>
+              <a:lnSpc>
+                <a:spcPct val="115000"/>
+              </a:lnSpc>
+              <a:spcBef>
+                <a:spcPts val="0"/>
+              </a:spcBef>
+              <a:spcAft>
+                <a:spcPts val="0"/>
+              </a:spcAft>
+              <a:buSzPct val="159999"/>
               <a:buNone/>
             </a:pPr>
             <a:r>
@@ -14989,7 +15659,10 @@
             <a:endParaRPr b="1"/>
           </a:p>
           <a:p>
-            <a:pPr indent="-280193" lvl="0" marL="457200" rtl="0" algn="just">
+            <a:pPr indent="-280224" lvl="0" marL="457200" rtl="0" algn="just">
+              <a:lnSpc>
+                <a:spcPct val="115000"/>
+              </a:lnSpc>
               <a:spcBef>
                 <a:spcPts val="0"/>
               </a:spcBef>
@@ -15007,12 +15680,16 @@
           </a:p>
           <a:p>
             <a:pPr indent="0" lvl="0" marL="0" rtl="0" algn="just">
-              <a:spcBef>
-                <a:spcPts val="0"/>
-              </a:spcBef>
-              <a:spcAft>
-                <a:spcPts val="0"/>
-              </a:spcAft>
+              <a:lnSpc>
+                <a:spcPct val="115000"/>
+              </a:lnSpc>
+              <a:spcBef>
+                <a:spcPts val="0"/>
+              </a:spcBef>
+              <a:spcAft>
+                <a:spcPts val="0"/>
+              </a:spcAft>
+              <a:buSzPct val="159999"/>
               <a:buNone/>
             </a:pPr>
             <a:r>
@@ -15022,12 +15699,16 @@
           </a:p>
           <a:p>
             <a:pPr indent="0" lvl="0" marL="0" rtl="0" algn="just">
-              <a:spcBef>
-                <a:spcPts val="0"/>
-              </a:spcBef>
-              <a:spcAft>
-                <a:spcPts val="0"/>
-              </a:spcAft>
+              <a:lnSpc>
+                <a:spcPct val="115000"/>
+              </a:lnSpc>
+              <a:spcBef>
+                <a:spcPts val="0"/>
+              </a:spcBef>
+              <a:spcAft>
+                <a:spcPts val="0"/>
+              </a:spcAft>
+              <a:buSzPct val="159999"/>
               <a:buNone/>
             </a:pPr>
             <a:r>
@@ -15037,7 +15718,10 @@
             <a:endParaRPr b="1"/>
           </a:p>
           <a:p>
-            <a:pPr indent="-280193" lvl="0" marL="457200" rtl="0" algn="just">
+            <a:pPr indent="-280224" lvl="0" marL="457200" rtl="0" algn="just">
+              <a:lnSpc>
+                <a:spcPct val="115000"/>
+              </a:lnSpc>
               <a:spcBef>
                 <a:spcPts val="0"/>
               </a:spcBef>
@@ -15055,12 +15739,16 @@
           </a:p>
           <a:p>
             <a:pPr indent="0" lvl="0" marL="0" rtl="0" algn="just">
-              <a:spcBef>
-                <a:spcPts val="0"/>
-              </a:spcBef>
-              <a:spcAft>
-                <a:spcPts val="0"/>
-              </a:spcAft>
+              <a:lnSpc>
+                <a:spcPct val="115000"/>
+              </a:lnSpc>
+              <a:spcBef>
+                <a:spcPts val="0"/>
+              </a:spcBef>
+              <a:spcAft>
+                <a:spcPts val="0"/>
+              </a:spcAft>
+              <a:buSzPct val="159999"/>
               <a:buNone/>
             </a:pPr>
             <a:r>
@@ -15070,12 +15758,16 @@
           </a:p>
           <a:p>
             <a:pPr indent="0" lvl="0" marL="0" rtl="0" algn="just">
-              <a:spcBef>
-                <a:spcPts val="0"/>
-              </a:spcBef>
-              <a:spcAft>
-                <a:spcPts val="0"/>
-              </a:spcAft>
+              <a:lnSpc>
+                <a:spcPct val="115000"/>
+              </a:lnSpc>
+              <a:spcBef>
+                <a:spcPts val="0"/>
+              </a:spcBef>
+              <a:spcAft>
+                <a:spcPts val="0"/>
+              </a:spcAft>
+              <a:buSzPct val="159999"/>
               <a:buNone/>
             </a:pPr>
             <a:r>
@@ -15085,7 +15777,10 @@
             <a:endParaRPr b="1"/>
           </a:p>
           <a:p>
-            <a:pPr indent="-280193" lvl="0" marL="457200" rtl="0" algn="just">
+            <a:pPr indent="-280224" lvl="0" marL="457200" rtl="0" algn="just">
+              <a:lnSpc>
+                <a:spcPct val="115000"/>
+              </a:lnSpc>
               <a:spcBef>
                 <a:spcPts val="0"/>
               </a:spcBef>
@@ -15103,12 +15798,16 @@
           </a:p>
           <a:p>
             <a:pPr indent="0" lvl="0" marL="0" rtl="0" algn="just">
-              <a:spcBef>
-                <a:spcPts val="0"/>
-              </a:spcBef>
-              <a:spcAft>
-                <a:spcPts val="0"/>
-              </a:spcAft>
+              <a:lnSpc>
+                <a:spcPct val="115000"/>
+              </a:lnSpc>
+              <a:spcBef>
+                <a:spcPts val="0"/>
+              </a:spcBef>
+              <a:spcAft>
+                <a:spcPts val="0"/>
+              </a:spcAft>
+              <a:buSzPct val="159999"/>
               <a:buNone/>
             </a:pPr>
             <a:r>
@@ -15118,12 +15817,16 @@
           </a:p>
           <a:p>
             <a:pPr indent="0" lvl="0" marL="0" rtl="0" algn="just">
-              <a:spcBef>
-                <a:spcPts val="0"/>
-              </a:spcBef>
-              <a:spcAft>
-                <a:spcPts val="0"/>
-              </a:spcAft>
+              <a:lnSpc>
+                <a:spcPct val="115000"/>
+              </a:lnSpc>
+              <a:spcBef>
+                <a:spcPts val="0"/>
+              </a:spcBef>
+              <a:spcAft>
+                <a:spcPts val="0"/>
+              </a:spcAft>
+              <a:buSzPct val="159999"/>
               <a:buNone/>
             </a:pPr>
             <a:r>
@@ -15133,7 +15836,10 @@
             <a:endParaRPr b="1"/>
           </a:p>
           <a:p>
-            <a:pPr indent="-280193" lvl="0" marL="457200" rtl="0" algn="just">
+            <a:pPr indent="-280224" lvl="0" marL="457200" rtl="0" algn="just">
+              <a:lnSpc>
+                <a:spcPct val="115000"/>
+              </a:lnSpc>
               <a:spcBef>
                 <a:spcPts val="0"/>
               </a:spcBef>
@@ -15151,12 +15857,16 @@
           </a:p>
           <a:p>
             <a:pPr indent="0" lvl="0" marL="0" rtl="0" algn="just">
-              <a:spcBef>
-                <a:spcPts val="0"/>
-              </a:spcBef>
-              <a:spcAft>
-                <a:spcPts val="0"/>
-              </a:spcAft>
+              <a:lnSpc>
+                <a:spcPct val="115000"/>
+              </a:lnSpc>
+              <a:spcBef>
+                <a:spcPts val="0"/>
+              </a:spcBef>
+              <a:spcAft>
+                <a:spcPts val="0"/>
+              </a:spcAft>
+              <a:buSzPct val="159999"/>
               <a:buNone/>
             </a:pPr>
             <a:r>
@@ -15166,12 +15876,16 @@
           </a:p>
           <a:p>
             <a:pPr indent="0" lvl="0" marL="0" rtl="0" algn="just">
-              <a:spcBef>
-                <a:spcPts val="0"/>
-              </a:spcBef>
-              <a:spcAft>
-                <a:spcPts val="0"/>
-              </a:spcAft>
+              <a:lnSpc>
+                <a:spcPct val="115000"/>
+              </a:lnSpc>
+              <a:spcBef>
+                <a:spcPts val="0"/>
+              </a:spcBef>
+              <a:spcAft>
+                <a:spcPts val="0"/>
+              </a:spcAft>
+              <a:buSzPct val="159999"/>
               <a:buNone/>
             </a:pPr>
             <a:r>
@@ -15181,7 +15895,10 @@
             <a:endParaRPr b="1"/>
           </a:p>
           <a:p>
-            <a:pPr indent="-280193" lvl="0" marL="457200" rtl="0" algn="just">
+            <a:pPr indent="-280224" lvl="0" marL="457200" rtl="0" algn="just">
+              <a:lnSpc>
+                <a:spcPct val="115000"/>
+              </a:lnSpc>
               <a:spcBef>
                 <a:spcPts val="0"/>
               </a:spcBef>
@@ -15199,12 +15916,16 @@
           </a:p>
           <a:p>
             <a:pPr indent="0" lvl="0" marL="0" rtl="0" algn="just">
-              <a:spcBef>
-                <a:spcPts val="0"/>
-              </a:spcBef>
-              <a:spcAft>
-                <a:spcPts val="0"/>
-              </a:spcAft>
+              <a:lnSpc>
+                <a:spcPct val="115000"/>
+              </a:lnSpc>
+              <a:spcBef>
+                <a:spcPts val="0"/>
+              </a:spcBef>
+              <a:spcAft>
+                <a:spcPts val="0"/>
+              </a:spcAft>
+              <a:buSzPct val="159999"/>
               <a:buNone/>
             </a:pPr>
             <a:r>
@@ -15215,12 +15936,16 @@
           </a:p>
           <a:p>
             <a:pPr indent="0" lvl="0" marL="0" rtl="0" algn="just">
-              <a:spcBef>
-                <a:spcPts val="0"/>
-              </a:spcBef>
-              <a:spcAft>
-                <a:spcPts val="0"/>
-              </a:spcAft>
+              <a:lnSpc>
+                <a:spcPct val="115000"/>
+              </a:lnSpc>
+              <a:spcBef>
+                <a:spcPts val="0"/>
+              </a:spcBef>
+              <a:spcAft>
+                <a:spcPts val="0"/>
+              </a:spcAft>
+              <a:buSzPct val="159999"/>
               <a:buNone/>
             </a:pPr>
             <a:r>
@@ -15230,12 +15955,16 @@
           </a:p>
           <a:p>
             <a:pPr indent="0" lvl="0" marL="0" rtl="0" algn="just">
-              <a:spcBef>
-                <a:spcPts val="0"/>
-              </a:spcBef>
-              <a:spcAft>
-                <a:spcPts val="0"/>
-              </a:spcAft>
+              <a:lnSpc>
+                <a:spcPct val="115000"/>
+              </a:lnSpc>
+              <a:spcBef>
+                <a:spcPts val="0"/>
+              </a:spcBef>
+              <a:spcAft>
+                <a:spcPts val="0"/>
+              </a:spcAft>
+              <a:buSzPct val="159999"/>
               <a:buNone/>
             </a:pPr>
             <a:r>
@@ -15245,7 +15974,10 @@
             <a:endParaRPr b="1"/>
           </a:p>
           <a:p>
-            <a:pPr indent="-280193" lvl="0" marL="457200" rtl="0" algn="just">
+            <a:pPr indent="-280224" lvl="0" marL="457200" rtl="0" algn="just">
+              <a:lnSpc>
+                <a:spcPct val="115000"/>
+              </a:lnSpc>
               <a:spcBef>
                 <a:spcPts val="0"/>
               </a:spcBef>
@@ -15263,12 +15995,16 @@
           </a:p>
           <a:p>
             <a:pPr indent="0" lvl="0" marL="0" rtl="0" algn="just">
-              <a:spcBef>
-                <a:spcPts val="0"/>
-              </a:spcBef>
-              <a:spcAft>
-                <a:spcPts val="0"/>
-              </a:spcAft>
+              <a:lnSpc>
+                <a:spcPct val="115000"/>
+              </a:lnSpc>
+              <a:spcBef>
+                <a:spcPts val="0"/>
+              </a:spcBef>
+              <a:spcAft>
+                <a:spcPts val="0"/>
+              </a:spcAft>
+              <a:buSzPct val="159999"/>
               <a:buNone/>
             </a:pPr>
             <a:r>
@@ -15327,6 +16063,10 @@
           <a:prstGeom prst="rect">
             <a:avLst/>
           </a:prstGeom>
+          <a:noFill/>
+          <a:ln>
+            <a:noFill/>
+          </a:ln>
         </p:spPr>
         <p:txBody>
           <a:bodyPr anchorCtr="0" anchor="t" bIns="91425" lIns="91425" spcFirstLastPara="1" rIns="91425" wrap="square" tIns="91425">
@@ -15335,21 +16075,21 @@
           <a:lstStyle/>
           <a:p>
             <a:pPr indent="0" lvl="0" marL="0" rtl="0" algn="l">
-              <a:spcBef>
-                <a:spcPts val="0"/>
-              </a:spcBef>
-              <a:spcAft>
-                <a:spcPts val="0"/>
-              </a:spcAft>
+              <a:lnSpc>
+                <a:spcPct val="100000"/>
+              </a:lnSpc>
+              <a:spcBef>
+                <a:spcPts val="0"/>
+              </a:spcBef>
+              <a:spcAft>
+                <a:spcPts val="0"/>
+              </a:spcAft>
+              <a:buSzPts val="2800"/>
               <a:buNone/>
             </a:pPr>
             <a:r>
               <a:rPr b="1" lang="pt-BR"/>
-              <a:t>Solução MVP - </a:t>
-            </a:r>
-            <a:r>
-              <a:rPr b="1" lang="pt-BR"/>
-              <a:t>Arquitetura Cloud</a:t>
+              <a:t>Solução MVP - Arquitetura Cloud</a:t>
             </a:r>
             <a:endParaRPr b="1">
               <a:highlight>
@@ -15365,13 +16105,12 @@
           <p:cNvPicPr preferRelativeResize="0"/>
           <p:nvPr/>
         </p:nvPicPr>
-        <p:blipFill>
+        <p:blipFill rotWithShape="1">
           <a:blip r:embed="rId3">
             <a:alphaModFix/>
           </a:blip>
-          <a:stretch>
-            <a:fillRect/>
-          </a:stretch>
+          <a:srcRect b="0" l="0" r="0" t="0"/>
+          <a:stretch/>
         </p:blipFill>
         <p:spPr>
           <a:xfrm>
@@ -15435,6 +16174,10 @@
           <a:prstGeom prst="rect">
             <a:avLst/>
           </a:prstGeom>
+          <a:noFill/>
+          <a:ln>
+            <a:noFill/>
+          </a:ln>
         </p:spPr>
         <p:txBody>
           <a:bodyPr anchorCtr="0" anchor="t" bIns="91425" lIns="91425" spcFirstLastPara="1" rIns="91425" wrap="square" tIns="91425">
@@ -15443,12 +16186,16 @@
           <a:lstStyle/>
           <a:p>
             <a:pPr indent="0" lvl="0" marL="0" rtl="0" algn="l">
-              <a:spcBef>
-                <a:spcPts val="0"/>
-              </a:spcBef>
-              <a:spcAft>
-                <a:spcPts val="0"/>
-              </a:spcAft>
+              <a:lnSpc>
+                <a:spcPct val="100000"/>
+              </a:lnSpc>
+              <a:spcBef>
+                <a:spcPts val="0"/>
+              </a:spcBef>
+              <a:spcAft>
+                <a:spcPts val="0"/>
+              </a:spcAft>
+              <a:buSzPts val="2800"/>
               <a:buNone/>
             </a:pPr>
             <a:r>
@@ -15469,13 +16216,12 @@
           <p:cNvPicPr preferRelativeResize="0"/>
           <p:nvPr/>
         </p:nvPicPr>
-        <p:blipFill>
+        <p:blipFill rotWithShape="1">
           <a:blip r:embed="rId3">
             <a:alphaModFix/>
           </a:blip>
-          <a:stretch>
-            <a:fillRect/>
-          </a:stretch>
+          <a:srcRect b="0" l="0" r="0" t="0"/>
+          <a:stretch/>
         </p:blipFill>
         <p:spPr>
           <a:xfrm>
@@ -15544,12 +16290,16 @@
           <a:lstStyle/>
           <a:p>
             <a:pPr indent="0" lvl="0" marL="0" rtl="0" algn="l">
-              <a:spcBef>
-                <a:spcPts val="0"/>
-              </a:spcBef>
-              <a:spcAft>
-                <a:spcPts val="0"/>
-              </a:spcAft>
+              <a:lnSpc>
+                <a:spcPct val="100000"/>
+              </a:lnSpc>
+              <a:spcBef>
+                <a:spcPts val="0"/>
+              </a:spcBef>
+              <a:spcAft>
+                <a:spcPts val="0"/>
+              </a:spcAft>
+              <a:buSzPct val="111111"/>
               <a:buNone/>
             </a:pPr>
             <a:r>
@@ -15593,13 +16343,12 @@
           <p:cNvPicPr preferRelativeResize="0"/>
           <p:nvPr/>
         </p:nvPicPr>
-        <p:blipFill>
+        <p:blipFill rotWithShape="1">
           <a:blip r:embed="rId3">
             <a:alphaModFix/>
           </a:blip>
-          <a:stretch>
-            <a:fillRect/>
-          </a:stretch>
+          <a:srcRect b="0" l="0" r="0" t="0"/>
+          <a:stretch/>
         </p:blipFill>
         <p:spPr>
           <a:xfrm>
@@ -15624,6 +16373,285 @@
 </file>
 
 <file path=ppt/theme/theme1.xml><?xml version="1.0" encoding="utf-8"?>
+<a:theme xmlns:a="http://schemas.openxmlformats.org/drawingml/2006/main" xmlns:r="http://schemas.openxmlformats.org/officeDocument/2006/relationships">
+  <a:themeElements>
+    <a:clrScheme name="Default">
+      <a:dk1>
+        <a:srgbClr val="000000"/>
+      </a:dk1>
+      <a:lt1>
+        <a:srgbClr val="FFFFFF"/>
+      </a:lt1>
+      <a:dk2>
+        <a:srgbClr val="158158"/>
+      </a:dk2>
+      <a:lt2>
+        <a:srgbClr val="F3F3F3"/>
+      </a:lt2>
+      <a:accent1>
+        <a:srgbClr val="058DC7"/>
+      </a:accent1>
+      <a:accent2>
+        <a:srgbClr val="50B432"/>
+      </a:accent2>
+      <a:accent3>
+        <a:srgbClr val="ED561B"/>
+      </a:accent3>
+      <a:accent4>
+        <a:srgbClr val="EDEF00"/>
+      </a:accent4>
+      <a:accent5>
+        <a:srgbClr val="24CBE5"/>
+      </a:accent5>
+      <a:accent6>
+        <a:srgbClr val="64E572"/>
+      </a:accent6>
+      <a:hlink>
+        <a:srgbClr val="2200CC"/>
+      </a:hlink>
+      <a:folHlink>
+        <a:srgbClr val="551A8B"/>
+      </a:folHlink>
+    </a:clrScheme>
+    <a:fontScheme name="Office">
+      <a:majorFont>
+        <a:latin typeface="Arial"/>
+        <a:ea typeface=""/>
+        <a:cs typeface=""/>
+        <a:font script="Jpan" typeface="ＭＳ Ｐゴシック"/>
+        <a:font script="Hang" typeface="맑은 고딕"/>
+        <a:font script="Hans" typeface="宋体"/>
+        <a:font script="Hant" typeface="新細明體"/>
+        <a:font script="Arab" typeface="Times New Roman"/>
+        <a:font script="Hebr" typeface="Times New Roman"/>
+        <a:font script="Thai" typeface="Angsana New"/>
+        <a:font script="Ethi" typeface="Nyala"/>
+        <a:font script="Beng" typeface="Vrinda"/>
+        <a:font script="Gujr" typeface="Shruti"/>
+        <a:font script="Khmr" typeface="MoolBoran"/>
+        <a:font script="Knda" typeface="Tunga"/>
+        <a:font script="Guru" typeface="Raavi"/>
+        <a:font script="Cans" typeface="Euphemia"/>
+        <a:font script="Cher" typeface="Plantagenet Cherokee"/>
+        <a:font script="Yiii" typeface="Microsoft Yi Baiti"/>
+        <a:font script="Tibt" typeface="Microsoft Himalaya"/>
+        <a:font script="Thaa" typeface="MV Boli"/>
+        <a:font script="Deva" typeface="Mangal"/>
+        <a:font script="Telu" typeface="Gautami"/>
+        <a:font script="Taml" typeface="Latha"/>
+        <a:font script="Syrc" typeface="Estrangelo Edessa"/>
+        <a:font script="Orya" typeface="Kalinga"/>
+        <a:font script="Mlym" typeface="Kartika"/>
+        <a:font script="Laoo" typeface="DokChampa"/>
+        <a:font script="Sinh" typeface="Iskoola Pota"/>
+        <a:font script="Mong" typeface="Mongolian Baiti"/>
+        <a:font script="Viet" typeface="Times New Roman"/>
+        <a:font script="Uigh" typeface="Microsoft Uighur"/>
+        <a:font script="Geor" typeface="Sylfaen"/>
+      </a:majorFont>
+      <a:minorFont>
+        <a:latin typeface="Arial"/>
+        <a:ea typeface=""/>
+        <a:cs typeface=""/>
+        <a:font script="Jpan" typeface="ＭＳ Ｐゴシック"/>
+        <a:font script="Hang" typeface="맑은 고딕"/>
+        <a:font script="Hans" typeface="宋体"/>
+        <a:font script="Hant" typeface="新細明體"/>
+        <a:font script="Arab" typeface="Arial"/>
+        <a:font script="Hebr" typeface="Arial"/>
+        <a:font script="Thai" typeface="Cordia New"/>
+        <a:font script="Ethi" typeface="Nyala"/>
+        <a:font script="Beng" typeface="Vrinda"/>
+        <a:font script="Gujr" typeface="Shruti"/>
+        <a:font script="Khmr" typeface="DaunPenh"/>
+        <a:font script="Knda" typeface="Tunga"/>
+        <a:font script="Guru" typeface="Raavi"/>
+        <a:font script="Cans" typeface="Euphemia"/>
+        <a:font script="Cher" typeface="Plantagenet Cherokee"/>
+        <a:font script="Yiii" typeface="Microsoft Yi Baiti"/>
+        <a:font script="Tibt" typeface="Microsoft Himalaya"/>
+        <a:font script="Thaa" typeface="MV Boli"/>
+        <a:font script="Deva" typeface="Mangal"/>
+        <a:font script="Telu" typeface="Gautami"/>
+        <a:font script="Taml" typeface="Latha"/>
+        <a:font script="Syrc" typeface="Estrangelo Edessa"/>
+        <a:font script="Orya" typeface="Kalinga"/>
+        <a:font script="Mlym" typeface="Kartika"/>
+        <a:font script="Laoo" typeface="DokChampa"/>
+        <a:font script="Sinh" typeface="Iskoola Pota"/>
+        <a:font script="Mong" typeface="Mongolian Baiti"/>
+        <a:font script="Viet" typeface="Arial"/>
+        <a:font script="Uigh" typeface="Microsoft Uighur"/>
+        <a:font script="Geor" typeface="Sylfaen"/>
+      </a:minorFont>
+    </a:fontScheme>
+    <a:fmtScheme name="Office">
+      <a:fillStyleLst>
+        <a:solidFill>
+          <a:schemeClr val="phClr"/>
+        </a:solidFill>
+        <a:gradFill rotWithShape="1">
+          <a:gsLst>
+            <a:gs pos="0">
+              <a:schemeClr val="phClr">
+                <a:tint val="50000"/>
+                <a:satMod val="300000"/>
+              </a:schemeClr>
+            </a:gs>
+            <a:gs pos="35000">
+              <a:schemeClr val="phClr">
+                <a:tint val="37000"/>
+                <a:satMod val="300000"/>
+              </a:schemeClr>
+            </a:gs>
+            <a:gs pos="100000">
+              <a:schemeClr val="phClr">
+                <a:tint val="15000"/>
+                <a:satMod val="350000"/>
+              </a:schemeClr>
+            </a:gs>
+          </a:gsLst>
+          <a:lin ang="16200000" scaled="1"/>
+        </a:gradFill>
+        <a:gradFill rotWithShape="1">
+          <a:gsLst>
+            <a:gs pos="0">
+              <a:schemeClr val="phClr">
+                <a:tint val="100000"/>
+                <a:shade val="100000"/>
+                <a:satMod val="130000"/>
+              </a:schemeClr>
+            </a:gs>
+            <a:gs pos="100000">
+              <a:schemeClr val="phClr">
+                <a:tint val="50000"/>
+                <a:shade val="100000"/>
+                <a:satMod val="350000"/>
+              </a:schemeClr>
+            </a:gs>
+          </a:gsLst>
+          <a:lin ang="16200000" scaled="0"/>
+        </a:gradFill>
+      </a:fillStyleLst>
+      <a:lnStyleLst>
+        <a:ln w="9525" cap="flat" cmpd="sng" algn="ctr">
+          <a:solidFill>
+            <a:schemeClr val="phClr">
+              <a:shade val="95000"/>
+              <a:satMod val="105000"/>
+            </a:schemeClr>
+          </a:solidFill>
+          <a:prstDash val="solid"/>
+        </a:ln>
+        <a:ln w="25400" cap="flat" cmpd="sng" algn="ctr">
+          <a:solidFill>
+            <a:schemeClr val="phClr"/>
+          </a:solidFill>
+          <a:prstDash val="solid"/>
+        </a:ln>
+        <a:ln w="38100" cap="flat" cmpd="sng" algn="ctr">
+          <a:solidFill>
+            <a:schemeClr val="phClr"/>
+          </a:solidFill>
+          <a:prstDash val="solid"/>
+        </a:ln>
+      </a:lnStyleLst>
+      <a:effectStyleLst>
+        <a:effectStyle>
+          <a:effectLst>
+            <a:outerShdw blurRad="40000" dist="20000" dir="5400000" rotWithShape="0">
+              <a:srgbClr val="000000">
+                <a:alpha val="38000"/>
+              </a:srgbClr>
+            </a:outerShdw>
+          </a:effectLst>
+        </a:effectStyle>
+        <a:effectStyle>
+          <a:effectLst>
+            <a:outerShdw blurRad="40000" dist="23000" dir="5400000" rotWithShape="0">
+              <a:srgbClr val="000000">
+                <a:alpha val="35000"/>
+              </a:srgbClr>
+            </a:outerShdw>
+          </a:effectLst>
+        </a:effectStyle>
+        <a:effectStyle>
+          <a:effectLst>
+            <a:outerShdw blurRad="40000" dist="23000" dir="5400000" rotWithShape="0">
+              <a:srgbClr val="000000">
+                <a:alpha val="35000"/>
+              </a:srgbClr>
+            </a:outerShdw>
+          </a:effectLst>
+          <a:scene3d>
+            <a:camera prst="orthographicFront">
+              <a:rot lat="0" lon="0" rev="0"/>
+            </a:camera>
+            <a:lightRig rig="threePt" dir="t">
+              <a:rot lat="0" lon="0" rev="1200000"/>
+            </a:lightRig>
+          </a:scene3d>
+          <a:sp3d>
+            <a:bevelT w="63500" h="25400"/>
+          </a:sp3d>
+        </a:effectStyle>
+      </a:effectStyleLst>
+      <a:bgFillStyleLst>
+        <a:solidFill>
+          <a:schemeClr val="phClr"/>
+        </a:solidFill>
+        <a:gradFill rotWithShape="1">
+          <a:gsLst>
+            <a:gs pos="0">
+              <a:schemeClr val="phClr">
+                <a:tint val="40000"/>
+                <a:satMod val="350000"/>
+              </a:schemeClr>
+            </a:gs>
+            <a:gs pos="40000">
+              <a:schemeClr val="phClr">
+                <a:tint val="45000"/>
+                <a:shade val="99000"/>
+                <a:satMod val="350000"/>
+              </a:schemeClr>
+            </a:gs>
+            <a:gs pos="100000">
+              <a:schemeClr val="phClr">
+                <a:shade val="20000"/>
+                <a:satMod val="255000"/>
+              </a:schemeClr>
+            </a:gs>
+          </a:gsLst>
+          <a:path path="circle">
+            <a:fillToRect l="50000" t="-80000" r="50000" b="180000"/>
+          </a:path>
+        </a:gradFill>
+        <a:gradFill rotWithShape="1">
+          <a:gsLst>
+            <a:gs pos="0">
+              <a:schemeClr val="phClr">
+                <a:tint val="80000"/>
+                <a:satMod val="300000"/>
+              </a:schemeClr>
+            </a:gs>
+            <a:gs pos="100000">
+              <a:schemeClr val="phClr">
+                <a:shade val="30000"/>
+                <a:satMod val="200000"/>
+              </a:schemeClr>
+            </a:gs>
+          </a:gsLst>
+          <a:path path="circle">
+            <a:fillToRect l="50000" t="50000" r="50000" b="50000"/>
+          </a:path>
+        </a:gradFill>
+      </a:bgFillStyleLst>
+    </a:fmtScheme>
+  </a:themeElements>
+</a:theme>
+</file>
+
+<file path=ppt/theme/theme2.xml><?xml version="1.0" encoding="utf-8"?>
 <a:theme xmlns:a="http://schemas.openxmlformats.org/drawingml/2006/main" xmlns:r="http://schemas.openxmlformats.org/officeDocument/2006/relationships" name="Paradigm">
   <a:themeElements>
     <a:clrScheme name="Paradigm">
@@ -15900,283 +16928,4 @@
     </a:fmtScheme>
   </a:themeElements>
 </a:theme>
-</file>
-
-<file path=ppt/theme/theme2.xml><?xml version="1.0" encoding="utf-8"?>
-<a:theme xmlns:a="http://schemas.openxmlformats.org/drawingml/2006/main" xmlns:r="http://schemas.openxmlformats.org/officeDocument/2006/relationships">
-  <a:themeElements>
-    <a:clrScheme name="Default">
-      <a:dk1>
-        <a:srgbClr val="000000"/>
-      </a:dk1>
-      <a:lt1>
-        <a:srgbClr val="FFFFFF"/>
-      </a:lt1>
-      <a:dk2>
-        <a:srgbClr val="158158"/>
-      </a:dk2>
-      <a:lt2>
-        <a:srgbClr val="F3F3F3"/>
-      </a:lt2>
-      <a:accent1>
-        <a:srgbClr val="058DC7"/>
-      </a:accent1>
-      <a:accent2>
-        <a:srgbClr val="50B432"/>
-      </a:accent2>
-      <a:accent3>
-        <a:srgbClr val="ED561B"/>
-      </a:accent3>
-      <a:accent4>
-        <a:srgbClr val="EDEF00"/>
-      </a:accent4>
-      <a:accent5>
-        <a:srgbClr val="24CBE5"/>
-      </a:accent5>
-      <a:accent6>
-        <a:srgbClr val="64E572"/>
-      </a:accent6>
-      <a:hlink>
-        <a:srgbClr val="2200CC"/>
-      </a:hlink>
-      <a:folHlink>
-        <a:srgbClr val="551A8B"/>
-      </a:folHlink>
-    </a:clrScheme>
-    <a:fontScheme name="Office">
-      <a:majorFont>
-        <a:latin typeface="Arial"/>
-        <a:ea typeface=""/>
-        <a:cs typeface=""/>
-        <a:font script="Jpan" typeface="ＭＳ Ｐゴシック"/>
-        <a:font script="Hang" typeface="맑은 고딕"/>
-        <a:font script="Hans" typeface="宋体"/>
-        <a:font script="Hant" typeface="新細明體"/>
-        <a:font script="Arab" typeface="Times New Roman"/>
-        <a:font script="Hebr" typeface="Times New Roman"/>
-        <a:font script="Thai" typeface="Angsana New"/>
-        <a:font script="Ethi" typeface="Nyala"/>
-        <a:font script="Beng" typeface="Vrinda"/>
-        <a:font script="Gujr" typeface="Shruti"/>
-        <a:font script="Khmr" typeface="MoolBoran"/>
-        <a:font script="Knda" typeface="Tunga"/>
-        <a:font script="Guru" typeface="Raavi"/>
-        <a:font script="Cans" typeface="Euphemia"/>
-        <a:font script="Cher" typeface="Plantagenet Cherokee"/>
-        <a:font script="Yiii" typeface="Microsoft Yi Baiti"/>
-        <a:font script="Tibt" typeface="Microsoft Himalaya"/>
-        <a:font script="Thaa" typeface="MV Boli"/>
-        <a:font script="Deva" typeface="Mangal"/>
-        <a:font script="Telu" typeface="Gautami"/>
-        <a:font script="Taml" typeface="Latha"/>
-        <a:font script="Syrc" typeface="Estrangelo Edessa"/>
-        <a:font script="Orya" typeface="Kalinga"/>
-        <a:font script="Mlym" typeface="Kartika"/>
-        <a:font script="Laoo" typeface="DokChampa"/>
-        <a:font script="Sinh" typeface="Iskoola Pota"/>
-        <a:font script="Mong" typeface="Mongolian Baiti"/>
-        <a:font script="Viet" typeface="Times New Roman"/>
-        <a:font script="Uigh" typeface="Microsoft Uighur"/>
-        <a:font script="Geor" typeface="Sylfaen"/>
-      </a:majorFont>
-      <a:minorFont>
-        <a:latin typeface="Arial"/>
-        <a:ea typeface=""/>
-        <a:cs typeface=""/>
-        <a:font script="Jpan" typeface="ＭＳ Ｐゴシック"/>
-        <a:font script="Hang" typeface="맑은 고딕"/>
-        <a:font script="Hans" typeface="宋体"/>
-        <a:font script="Hant" typeface="新細明體"/>
-        <a:font script="Arab" typeface="Arial"/>
-        <a:font script="Hebr" typeface="Arial"/>
-        <a:font script="Thai" typeface="Cordia New"/>
-        <a:font script="Ethi" typeface="Nyala"/>
-        <a:font script="Beng" typeface="Vrinda"/>
-        <a:font script="Gujr" typeface="Shruti"/>
-        <a:font script="Khmr" typeface="DaunPenh"/>
-        <a:font script="Knda" typeface="Tunga"/>
-        <a:font script="Guru" typeface="Raavi"/>
-        <a:font script="Cans" typeface="Euphemia"/>
-        <a:font script="Cher" typeface="Plantagenet Cherokee"/>
-        <a:font script="Yiii" typeface="Microsoft Yi Baiti"/>
-        <a:font script="Tibt" typeface="Microsoft Himalaya"/>
-        <a:font script="Thaa" typeface="MV Boli"/>
-        <a:font script="Deva" typeface="Mangal"/>
-        <a:font script="Telu" typeface="Gautami"/>
-        <a:font script="Taml" typeface="Latha"/>
-        <a:font script="Syrc" typeface="Estrangelo Edessa"/>
-        <a:font script="Orya" typeface="Kalinga"/>
-        <a:font script="Mlym" typeface="Kartika"/>
-        <a:font script="Laoo" typeface="DokChampa"/>
-        <a:font script="Sinh" typeface="Iskoola Pota"/>
-        <a:font script="Mong" typeface="Mongolian Baiti"/>
-        <a:font script="Viet" typeface="Arial"/>
-        <a:font script="Uigh" typeface="Microsoft Uighur"/>
-        <a:font script="Geor" typeface="Sylfaen"/>
-      </a:minorFont>
-    </a:fontScheme>
-    <a:fmtScheme name="Office">
-      <a:fillStyleLst>
-        <a:solidFill>
-          <a:schemeClr val="phClr"/>
-        </a:solidFill>
-        <a:gradFill rotWithShape="1">
-          <a:gsLst>
-            <a:gs pos="0">
-              <a:schemeClr val="phClr">
-                <a:tint val="50000"/>
-                <a:satMod val="300000"/>
-              </a:schemeClr>
-            </a:gs>
-            <a:gs pos="35000">
-              <a:schemeClr val="phClr">
-                <a:tint val="37000"/>
-                <a:satMod val="300000"/>
-              </a:schemeClr>
-            </a:gs>
-            <a:gs pos="100000">
-              <a:schemeClr val="phClr">
-                <a:tint val="15000"/>
-                <a:satMod val="350000"/>
-              </a:schemeClr>
-            </a:gs>
-          </a:gsLst>
-          <a:lin ang="16200000" scaled="1"/>
-        </a:gradFill>
-        <a:gradFill rotWithShape="1">
-          <a:gsLst>
-            <a:gs pos="0">
-              <a:schemeClr val="phClr">
-                <a:tint val="100000"/>
-                <a:shade val="100000"/>
-                <a:satMod val="130000"/>
-              </a:schemeClr>
-            </a:gs>
-            <a:gs pos="100000">
-              <a:schemeClr val="phClr">
-                <a:tint val="50000"/>
-                <a:shade val="100000"/>
-                <a:satMod val="350000"/>
-              </a:schemeClr>
-            </a:gs>
-          </a:gsLst>
-          <a:lin ang="16200000" scaled="0"/>
-        </a:gradFill>
-      </a:fillStyleLst>
-      <a:lnStyleLst>
-        <a:ln w="9525" cap="flat" cmpd="sng" algn="ctr">
-          <a:solidFill>
-            <a:schemeClr val="phClr">
-              <a:shade val="95000"/>
-              <a:satMod val="105000"/>
-            </a:schemeClr>
-          </a:solidFill>
-          <a:prstDash val="solid"/>
-        </a:ln>
-        <a:ln w="25400" cap="flat" cmpd="sng" algn="ctr">
-          <a:solidFill>
-            <a:schemeClr val="phClr"/>
-          </a:solidFill>
-          <a:prstDash val="solid"/>
-        </a:ln>
-        <a:ln w="38100" cap="flat" cmpd="sng" algn="ctr">
-          <a:solidFill>
-            <a:schemeClr val="phClr"/>
-          </a:solidFill>
-          <a:prstDash val="solid"/>
-        </a:ln>
-      </a:lnStyleLst>
-      <a:effectStyleLst>
-        <a:effectStyle>
-          <a:effectLst>
-            <a:outerShdw blurRad="40000" dist="20000" dir="5400000" rotWithShape="0">
-              <a:srgbClr val="000000">
-                <a:alpha val="38000"/>
-              </a:srgbClr>
-            </a:outerShdw>
-          </a:effectLst>
-        </a:effectStyle>
-        <a:effectStyle>
-          <a:effectLst>
-            <a:outerShdw blurRad="40000" dist="23000" dir="5400000" rotWithShape="0">
-              <a:srgbClr val="000000">
-                <a:alpha val="35000"/>
-              </a:srgbClr>
-            </a:outerShdw>
-          </a:effectLst>
-        </a:effectStyle>
-        <a:effectStyle>
-          <a:effectLst>
-            <a:outerShdw blurRad="40000" dist="23000" dir="5400000" rotWithShape="0">
-              <a:srgbClr val="000000">
-                <a:alpha val="35000"/>
-              </a:srgbClr>
-            </a:outerShdw>
-          </a:effectLst>
-          <a:scene3d>
-            <a:camera prst="orthographicFront">
-              <a:rot lat="0" lon="0" rev="0"/>
-            </a:camera>
-            <a:lightRig rig="threePt" dir="t">
-              <a:rot lat="0" lon="0" rev="1200000"/>
-            </a:lightRig>
-          </a:scene3d>
-          <a:sp3d>
-            <a:bevelT w="63500" h="25400"/>
-          </a:sp3d>
-        </a:effectStyle>
-      </a:effectStyleLst>
-      <a:bgFillStyleLst>
-        <a:solidFill>
-          <a:schemeClr val="phClr"/>
-        </a:solidFill>
-        <a:gradFill rotWithShape="1">
-          <a:gsLst>
-            <a:gs pos="0">
-              <a:schemeClr val="phClr">
-                <a:tint val="40000"/>
-                <a:satMod val="350000"/>
-              </a:schemeClr>
-            </a:gs>
-            <a:gs pos="40000">
-              <a:schemeClr val="phClr">
-                <a:tint val="45000"/>
-                <a:shade val="99000"/>
-                <a:satMod val="350000"/>
-              </a:schemeClr>
-            </a:gs>
-            <a:gs pos="100000">
-              <a:schemeClr val="phClr">
-                <a:shade val="20000"/>
-                <a:satMod val="255000"/>
-              </a:schemeClr>
-            </a:gs>
-          </a:gsLst>
-          <a:path path="circle">
-            <a:fillToRect l="50000" t="-80000" r="50000" b="180000"/>
-          </a:path>
-        </a:gradFill>
-        <a:gradFill rotWithShape="1">
-          <a:gsLst>
-            <a:gs pos="0">
-              <a:schemeClr val="phClr">
-                <a:tint val="80000"/>
-                <a:satMod val="300000"/>
-              </a:schemeClr>
-            </a:gs>
-            <a:gs pos="100000">
-              <a:schemeClr val="phClr">
-                <a:shade val="30000"/>
-                <a:satMod val="200000"/>
-              </a:schemeClr>
-            </a:gs>
-          </a:gsLst>
-          <a:path path="circle">
-            <a:fillToRect l="50000" t="50000" r="50000" b="50000"/>
-          </a:path>
-        </a:gradFill>
-      </a:bgFillStyleLst>
-    </a:fmtScheme>
-  </a:themeElements>
-</a:theme>
 </file>
</xml_diff>

<commit_message>
adicionando informações em justificativas
</commit_message>
<xml_diff>
--- a/docs/Hackaton-TechMedicos.pptx
+++ b/docs/Hackaton-TechMedicos.pptx
@@ -12379,7 +12379,7 @@
         </p:spPr>
         <p:txBody>
           <a:bodyPr anchorCtr="0" anchor="t" bIns="91425" lIns="91425" spcFirstLastPara="1" rIns="91425" wrap="square" tIns="91425">
-            <a:normAutofit/>
+            <a:normAutofit lnSpcReduction="10000"/>
           </a:bodyPr>
           <a:lstStyle/>
           <a:p>
@@ -12606,6 +12606,66 @@
             <a:r>
               <a:rPr lang="pt-BR"/>
               <a:t>HTTP/S &amp; AMQP</a:t>
+            </a:r>
+            <a:endParaRPr/>
+          </a:p>
+          <a:p>
+            <a:pPr indent="-311150" lvl="0" marL="457200" rtl="0" algn="l">
+              <a:lnSpc>
+                <a:spcPct val="115000"/>
+              </a:lnSpc>
+              <a:spcBef>
+                <a:spcPts val="0"/>
+              </a:spcBef>
+              <a:spcAft>
+                <a:spcPts val="0"/>
+              </a:spcAft>
+              <a:buSzPts val="1300"/>
+              <a:buChar char="●"/>
+            </a:pPr>
+            <a:r>
+              <a:rPr lang="pt-BR"/>
+              <a:t>Retry Policy</a:t>
+            </a:r>
+            <a:endParaRPr/>
+          </a:p>
+          <a:p>
+            <a:pPr indent="-311150" lvl="0" marL="457200" rtl="0" algn="l">
+              <a:lnSpc>
+                <a:spcPct val="115000"/>
+              </a:lnSpc>
+              <a:spcBef>
+                <a:spcPts val="0"/>
+              </a:spcBef>
+              <a:spcAft>
+                <a:spcPts val="0"/>
+              </a:spcAft>
+              <a:buSzPts val="1300"/>
+              <a:buChar char="●"/>
+            </a:pPr>
+            <a:r>
+              <a:rPr lang="pt-BR"/>
+              <a:t>Outbox</a:t>
+            </a:r>
+            <a:endParaRPr/>
+          </a:p>
+          <a:p>
+            <a:pPr indent="-311150" lvl="0" marL="457200" rtl="0" algn="l">
+              <a:lnSpc>
+                <a:spcPct val="115000"/>
+              </a:lnSpc>
+              <a:spcBef>
+                <a:spcPts val="0"/>
+              </a:spcBef>
+              <a:spcAft>
+                <a:spcPts val="0"/>
+              </a:spcAft>
+              <a:buSzPts val="1300"/>
+              <a:buChar char="●"/>
+            </a:pPr>
+            <a:r>
+              <a:rPr lang="pt-BR"/>
+              <a:t>SAGA</a:t>
             </a:r>
             <a:endParaRPr/>
           </a:p>
@@ -12991,7 +13051,7 @@
         </p:spPr>
         <p:txBody>
           <a:bodyPr anchorCtr="0" anchor="t" bIns="91425" lIns="91425" spcFirstLastPara="1" rIns="91425" wrap="square" tIns="91425">
-            <a:normAutofit lnSpcReduction="20000"/>
+            <a:normAutofit fontScale="92500" lnSpcReduction="20000"/>
           </a:bodyPr>
           <a:lstStyle/>
           <a:p>
@@ -13005,7 +13065,7 @@
               <a:spcAft>
                 <a:spcPts val="0"/>
               </a:spcAft>
-              <a:buSzPts val="1300"/>
+              <a:buSzPct val="100000"/>
               <a:buNone/>
             </a:pPr>
             <a:r>
@@ -13015,17 +13075,17 @@
             <a:endParaRPr/>
           </a:p>
           <a:p>
-            <a:pPr indent="-311150" lvl="0" marL="457200" rtl="0" algn="l">
-              <a:lnSpc>
-                <a:spcPct val="115000"/>
-              </a:lnSpc>
-              <a:spcBef>
-                <a:spcPts val="0"/>
-              </a:spcBef>
-              <a:spcAft>
-                <a:spcPts val="0"/>
-              </a:spcAft>
-              <a:buSzPts val="1300"/>
+            <a:pPr indent="-304958" lvl="0" marL="457200" rtl="0" algn="l">
+              <a:lnSpc>
+                <a:spcPct val="115000"/>
+              </a:lnSpc>
+              <a:spcBef>
+                <a:spcPts val="0"/>
+              </a:spcBef>
+              <a:spcAft>
+                <a:spcPts val="0"/>
+              </a:spcAft>
+              <a:buSzPct val="100000"/>
               <a:buChar char="●"/>
             </a:pPr>
             <a:r>
@@ -13035,17 +13095,17 @@
             <a:endParaRPr/>
           </a:p>
           <a:p>
-            <a:pPr indent="-311150" lvl="0" marL="457200" rtl="0" algn="l">
-              <a:lnSpc>
-                <a:spcPct val="115000"/>
-              </a:lnSpc>
-              <a:spcBef>
-                <a:spcPts val="0"/>
-              </a:spcBef>
-              <a:spcAft>
-                <a:spcPts val="0"/>
-              </a:spcAft>
-              <a:buSzPts val="1300"/>
+            <a:pPr indent="-304958" lvl="0" marL="457200" rtl="0" algn="l">
+              <a:lnSpc>
+                <a:spcPct val="115000"/>
+              </a:lnSpc>
+              <a:spcBef>
+                <a:spcPts val="0"/>
+              </a:spcBef>
+              <a:spcAft>
+                <a:spcPts val="0"/>
+              </a:spcAft>
+              <a:buSzPct val="100000"/>
               <a:buChar char="●"/>
             </a:pPr>
             <a:r>
@@ -13055,17 +13115,17 @@
             <a:endParaRPr/>
           </a:p>
           <a:p>
-            <a:pPr indent="-311150" lvl="0" marL="457200" rtl="0" algn="l">
-              <a:lnSpc>
-                <a:spcPct val="115000"/>
-              </a:lnSpc>
-              <a:spcBef>
-                <a:spcPts val="0"/>
-              </a:spcBef>
-              <a:spcAft>
-                <a:spcPts val="0"/>
-              </a:spcAft>
-              <a:buSzPts val="1300"/>
+            <a:pPr indent="-304958" lvl="0" marL="457200" rtl="0" algn="l">
+              <a:lnSpc>
+                <a:spcPct val="115000"/>
+              </a:lnSpc>
+              <a:spcBef>
+                <a:spcPts val="0"/>
+              </a:spcBef>
+              <a:spcAft>
+                <a:spcPts val="0"/>
+              </a:spcAft>
+              <a:buSzPct val="100000"/>
               <a:buChar char="●"/>
             </a:pPr>
             <a:r>
@@ -13075,18 +13135,18 @@
             <a:endParaRPr/>
           </a:p>
           <a:p>
-            <a:pPr indent="-311150" lvl="0" marL="457200" marR="0" rtl="0" algn="l">
-              <a:lnSpc>
-                <a:spcPct val="115000"/>
-              </a:lnSpc>
-              <a:spcBef>
-                <a:spcPts val="0"/>
-              </a:spcBef>
-              <a:spcAft>
-                <a:spcPts val="0"/>
-              </a:spcAft>
-              <a:buSzPts val="1300"/>
-              <a:buChar char="●"/>
+            <a:pPr indent="-293211" lvl="1" marL="914400" marR="0" rtl="0" algn="l">
+              <a:lnSpc>
+                <a:spcPct val="115000"/>
+              </a:lnSpc>
+              <a:spcBef>
+                <a:spcPts val="0"/>
+              </a:spcBef>
+              <a:spcAft>
+                <a:spcPts val="0"/>
+              </a:spcAft>
+              <a:buSzPct val="84615"/>
+              <a:buChar char="○"/>
             </a:pPr>
             <a:r>
               <a:rPr lang="pt-BR" sz="1300"/>
@@ -13095,18 +13155,38 @@
             <a:endParaRPr sz="1300"/>
           </a:p>
           <a:p>
-            <a:pPr indent="-311150" lvl="0" marL="457200" marR="0" rtl="0" algn="l">
-              <a:lnSpc>
-                <a:spcPct val="115000"/>
-              </a:lnSpc>
-              <a:spcBef>
-                <a:spcPts val="0"/>
-              </a:spcBef>
-              <a:spcAft>
-                <a:spcPts val="0"/>
-              </a:spcAft>
-              <a:buSzPts val="1300"/>
-              <a:buChar char="●"/>
+            <a:pPr indent="-304958" lvl="1" marL="914400" marR="0" rtl="0" algn="l">
+              <a:lnSpc>
+                <a:spcPct val="115000"/>
+              </a:lnSpc>
+              <a:spcBef>
+                <a:spcPts val="0"/>
+              </a:spcBef>
+              <a:spcAft>
+                <a:spcPts val="0"/>
+              </a:spcAft>
+              <a:buSzPct val="100000"/>
+              <a:buChar char="○"/>
+            </a:pPr>
+            <a:r>
+              <a:rPr lang="pt-BR" sz="1300"/>
+              <a:t>DynamoDB DAX</a:t>
+            </a:r>
+            <a:endParaRPr sz="1300"/>
+          </a:p>
+          <a:p>
+            <a:pPr indent="-293211" lvl="1" marL="914400" marR="0" rtl="0" algn="l">
+              <a:lnSpc>
+                <a:spcPct val="115000"/>
+              </a:lnSpc>
+              <a:spcBef>
+                <a:spcPts val="0"/>
+              </a:spcBef>
+              <a:spcAft>
+                <a:spcPts val="0"/>
+              </a:spcAft>
+              <a:buSzPct val="84615"/>
+              <a:buChar char="○"/>
             </a:pPr>
             <a:r>
               <a:rPr lang="pt-BR" sz="1300"/>
@@ -13115,18 +13195,18 @@
             <a:endParaRPr sz="1300"/>
           </a:p>
           <a:p>
-            <a:pPr indent="-311150" lvl="0" marL="457200" marR="0" rtl="0" algn="l">
-              <a:lnSpc>
-                <a:spcPct val="115000"/>
-              </a:lnSpc>
-              <a:spcBef>
-                <a:spcPts val="0"/>
-              </a:spcBef>
-              <a:spcAft>
-                <a:spcPts val="0"/>
-              </a:spcAft>
-              <a:buSzPts val="1300"/>
-              <a:buChar char="●"/>
+            <a:pPr indent="-293211" lvl="1" marL="914400" marR="0" rtl="0" algn="l">
+              <a:lnSpc>
+                <a:spcPct val="115000"/>
+              </a:lnSpc>
+              <a:spcBef>
+                <a:spcPts val="0"/>
+              </a:spcBef>
+              <a:spcAft>
+                <a:spcPts val="0"/>
+              </a:spcAft>
+              <a:buSzPct val="84615"/>
+              <a:buChar char="○"/>
             </a:pPr>
             <a:r>
               <a:rPr lang="pt-BR" sz="1300"/>
@@ -13135,18 +13215,18 @@
             <a:endParaRPr sz="1300"/>
           </a:p>
           <a:p>
-            <a:pPr indent="-311150" lvl="0" marL="457200" marR="0" rtl="0" algn="l">
-              <a:lnSpc>
-                <a:spcPct val="115000"/>
-              </a:lnSpc>
-              <a:spcBef>
-                <a:spcPts val="0"/>
-              </a:spcBef>
-              <a:spcAft>
-                <a:spcPts val="0"/>
-              </a:spcAft>
-              <a:buSzPts val="1300"/>
-              <a:buChar char="●"/>
+            <a:pPr indent="-293211" lvl="1" marL="914400" marR="0" rtl="0" algn="l">
+              <a:lnSpc>
+                <a:spcPct val="115000"/>
+              </a:lnSpc>
+              <a:spcBef>
+                <a:spcPts val="0"/>
+              </a:spcBef>
+              <a:spcAft>
+                <a:spcPts val="0"/>
+              </a:spcAft>
+              <a:buSzPct val="84615"/>
+              <a:buChar char="○"/>
             </a:pPr>
             <a:r>
               <a:rPr lang="pt-BR" sz="1300"/>
@@ -13155,18 +13235,18 @@
             <a:endParaRPr sz="1300"/>
           </a:p>
           <a:p>
-            <a:pPr indent="-311150" lvl="0" marL="457200" marR="0" rtl="0" algn="l">
-              <a:lnSpc>
-                <a:spcPct val="115000"/>
-              </a:lnSpc>
-              <a:spcBef>
-                <a:spcPts val="0"/>
-              </a:spcBef>
-              <a:spcAft>
-                <a:spcPts val="0"/>
-              </a:spcAft>
-              <a:buSzPts val="1300"/>
-              <a:buChar char="●"/>
+            <a:pPr indent="-293211" lvl="1" marL="914400" marR="0" rtl="0" algn="l">
+              <a:lnSpc>
+                <a:spcPct val="115000"/>
+              </a:lnSpc>
+              <a:spcBef>
+                <a:spcPts val="0"/>
+              </a:spcBef>
+              <a:spcAft>
+                <a:spcPts val="0"/>
+              </a:spcAft>
+              <a:buSzPct val="84615"/>
+              <a:buChar char="○"/>
             </a:pPr>
             <a:r>
               <a:rPr lang="pt-BR" sz="1300"/>
@@ -13175,18 +13255,18 @@
             <a:endParaRPr sz="1300"/>
           </a:p>
           <a:p>
-            <a:pPr indent="-311150" lvl="0" marL="457200" marR="0" rtl="0" algn="l">
-              <a:lnSpc>
-                <a:spcPct val="115000"/>
-              </a:lnSpc>
-              <a:spcBef>
-                <a:spcPts val="0"/>
-              </a:spcBef>
-              <a:spcAft>
-                <a:spcPts val="0"/>
-              </a:spcAft>
-              <a:buSzPts val="1300"/>
-              <a:buChar char="●"/>
+            <a:pPr indent="-293211" lvl="1" marL="914400" marR="0" rtl="0" algn="l">
+              <a:lnSpc>
+                <a:spcPct val="115000"/>
+              </a:lnSpc>
+              <a:spcBef>
+                <a:spcPts val="0"/>
+              </a:spcBef>
+              <a:spcAft>
+                <a:spcPts val="0"/>
+              </a:spcAft>
+              <a:buSzPct val="84615"/>
+              <a:buChar char="○"/>
             </a:pPr>
             <a:r>
               <a:rPr lang="pt-BR" sz="1300"/>
@@ -13195,18 +13275,18 @@
             <a:endParaRPr sz="1300"/>
           </a:p>
           <a:p>
-            <a:pPr indent="-311150" lvl="0" marL="457200" marR="0" rtl="0" algn="l">
-              <a:lnSpc>
-                <a:spcPct val="115000"/>
-              </a:lnSpc>
-              <a:spcBef>
-                <a:spcPts val="0"/>
-              </a:spcBef>
-              <a:spcAft>
-                <a:spcPts val="0"/>
-              </a:spcAft>
-              <a:buSzPts val="1300"/>
-              <a:buChar char="●"/>
+            <a:pPr indent="-293211" lvl="1" marL="914400" marR="0" rtl="0" algn="l">
+              <a:lnSpc>
+                <a:spcPct val="115000"/>
+              </a:lnSpc>
+              <a:spcBef>
+                <a:spcPts val="0"/>
+              </a:spcBef>
+              <a:spcAft>
+                <a:spcPts val="0"/>
+              </a:spcAft>
+              <a:buSzPct val="84615"/>
+              <a:buChar char="○"/>
             </a:pPr>
             <a:r>
               <a:rPr lang="pt-BR" sz="1300"/>
@@ -13215,18 +13295,18 @@
             <a:endParaRPr sz="1300"/>
           </a:p>
           <a:p>
-            <a:pPr indent="-311150" lvl="0" marL="457200" marR="0" rtl="0" algn="l">
-              <a:lnSpc>
-                <a:spcPct val="115000"/>
-              </a:lnSpc>
-              <a:spcBef>
-                <a:spcPts val="0"/>
-              </a:spcBef>
-              <a:spcAft>
-                <a:spcPts val="0"/>
-              </a:spcAft>
-              <a:buSzPts val="1300"/>
-              <a:buChar char="●"/>
+            <a:pPr indent="-293211" lvl="1" marL="914400" marR="0" rtl="0" algn="l">
+              <a:lnSpc>
+                <a:spcPct val="115000"/>
+              </a:lnSpc>
+              <a:spcBef>
+                <a:spcPts val="0"/>
+              </a:spcBef>
+              <a:spcAft>
+                <a:spcPts val="0"/>
+              </a:spcAft>
+              <a:buSzPct val="84615"/>
+              <a:buChar char="○"/>
             </a:pPr>
             <a:r>
               <a:rPr lang="pt-BR" sz="1300"/>
@@ -13235,18 +13315,18 @@
             <a:endParaRPr sz="1300"/>
           </a:p>
           <a:p>
-            <a:pPr indent="-311150" lvl="0" marL="457200" marR="0" rtl="0" algn="l">
-              <a:lnSpc>
-                <a:spcPct val="115000"/>
-              </a:lnSpc>
-              <a:spcBef>
-                <a:spcPts val="0"/>
-              </a:spcBef>
-              <a:spcAft>
-                <a:spcPts val="0"/>
-              </a:spcAft>
-              <a:buSzPts val="1300"/>
-              <a:buChar char="●"/>
+            <a:pPr indent="-293211" lvl="1" marL="914400" marR="0" rtl="0" algn="l">
+              <a:lnSpc>
+                <a:spcPct val="115000"/>
+              </a:lnSpc>
+              <a:spcBef>
+                <a:spcPts val="0"/>
+              </a:spcBef>
+              <a:spcAft>
+                <a:spcPts val="0"/>
+              </a:spcAft>
+              <a:buSzPct val="84615"/>
+              <a:buChar char="○"/>
             </a:pPr>
             <a:r>
               <a:rPr lang="pt-BR" sz="1300"/>
@@ -13255,18 +13335,18 @@
             <a:endParaRPr sz="1300"/>
           </a:p>
           <a:p>
-            <a:pPr indent="-311150" lvl="0" marL="457200" marR="0" rtl="0" algn="l">
-              <a:lnSpc>
-                <a:spcPct val="115000"/>
-              </a:lnSpc>
-              <a:spcBef>
-                <a:spcPts val="0"/>
-              </a:spcBef>
-              <a:spcAft>
-                <a:spcPts val="0"/>
-              </a:spcAft>
-              <a:buSzPts val="1300"/>
-              <a:buChar char="●"/>
+            <a:pPr indent="-293211" lvl="1" marL="914400" marR="0" rtl="0" algn="l">
+              <a:lnSpc>
+                <a:spcPct val="115000"/>
+              </a:lnSpc>
+              <a:spcBef>
+                <a:spcPts val="0"/>
+              </a:spcBef>
+              <a:spcAft>
+                <a:spcPts val="0"/>
+              </a:spcAft>
+              <a:buSzPct val="84615"/>
+              <a:buChar char="○"/>
             </a:pPr>
             <a:r>
               <a:rPr lang="pt-BR" sz="1300"/>
@@ -13275,18 +13355,18 @@
             <a:endParaRPr sz="1300"/>
           </a:p>
           <a:p>
-            <a:pPr indent="-311150" lvl="0" marL="457200" marR="0" rtl="0" algn="l">
-              <a:lnSpc>
-                <a:spcPct val="115000"/>
-              </a:lnSpc>
-              <a:spcBef>
-                <a:spcPts val="0"/>
-              </a:spcBef>
-              <a:spcAft>
-                <a:spcPts val="0"/>
-              </a:spcAft>
-              <a:buSzPts val="1300"/>
-              <a:buChar char="●"/>
+            <a:pPr indent="-293211" lvl="1" marL="914400" marR="0" rtl="0" algn="l">
+              <a:lnSpc>
+                <a:spcPct val="115000"/>
+              </a:lnSpc>
+              <a:spcBef>
+                <a:spcPts val="0"/>
+              </a:spcBef>
+              <a:spcAft>
+                <a:spcPts val="0"/>
+              </a:spcAft>
+              <a:buSzPct val="84615"/>
+              <a:buChar char="○"/>
             </a:pPr>
             <a:r>
               <a:rPr lang="pt-BR" sz="1300"/>
@@ -16373,6 +16453,285 @@
 </file>
 
 <file path=ppt/theme/theme1.xml><?xml version="1.0" encoding="utf-8"?>
+<a:theme xmlns:a="http://schemas.openxmlformats.org/drawingml/2006/main" xmlns:r="http://schemas.openxmlformats.org/officeDocument/2006/relationships" name="Paradigm">
+  <a:themeElements>
+    <a:clrScheme name="Paradigm">
+      <a:dk1>
+        <a:srgbClr val="31394D"/>
+      </a:dk1>
+      <a:lt1>
+        <a:srgbClr val="FFFFFF"/>
+      </a:lt1>
+      <a:dk2>
+        <a:srgbClr val="666666"/>
+      </a:dk2>
+      <a:lt2>
+        <a:srgbClr val="626B73"/>
+      </a:lt2>
+      <a:accent1>
+        <a:srgbClr val="002F4A"/>
+      </a:accent1>
+      <a:accent2>
+        <a:srgbClr val="D9C4B1"/>
+      </a:accent2>
+      <a:accent3>
+        <a:srgbClr val="EDE3DA"/>
+      </a:accent3>
+      <a:accent4>
+        <a:srgbClr val="B85741"/>
+      </a:accent4>
+      <a:accent5>
+        <a:srgbClr val="009384"/>
+      </a:accent5>
+      <a:accent6>
+        <a:srgbClr val="D0F6FF"/>
+      </a:accent6>
+      <a:hlink>
+        <a:srgbClr val="009384"/>
+      </a:hlink>
+      <a:folHlink>
+        <a:srgbClr val="009384"/>
+      </a:folHlink>
+    </a:clrScheme>
+    <a:fontScheme name="Office">
+      <a:majorFont>
+        <a:latin typeface="Arial"/>
+        <a:ea typeface=""/>
+        <a:cs typeface=""/>
+        <a:font script="Jpan" typeface="ＭＳ Ｐゴシック"/>
+        <a:font script="Hang" typeface="맑은 고딕"/>
+        <a:font script="Hans" typeface="宋体"/>
+        <a:font script="Hant" typeface="新細明體"/>
+        <a:font script="Arab" typeface="Times New Roman"/>
+        <a:font script="Hebr" typeface="Times New Roman"/>
+        <a:font script="Thai" typeface="Angsana New"/>
+        <a:font script="Ethi" typeface="Nyala"/>
+        <a:font script="Beng" typeface="Vrinda"/>
+        <a:font script="Gujr" typeface="Shruti"/>
+        <a:font script="Khmr" typeface="MoolBoran"/>
+        <a:font script="Knda" typeface="Tunga"/>
+        <a:font script="Guru" typeface="Raavi"/>
+        <a:font script="Cans" typeface="Euphemia"/>
+        <a:font script="Cher" typeface="Plantagenet Cherokee"/>
+        <a:font script="Yiii" typeface="Microsoft Yi Baiti"/>
+        <a:font script="Tibt" typeface="Microsoft Himalaya"/>
+        <a:font script="Thaa" typeface="MV Boli"/>
+        <a:font script="Deva" typeface="Mangal"/>
+        <a:font script="Telu" typeface="Gautami"/>
+        <a:font script="Taml" typeface="Latha"/>
+        <a:font script="Syrc" typeface="Estrangelo Edessa"/>
+        <a:font script="Orya" typeface="Kalinga"/>
+        <a:font script="Mlym" typeface="Kartika"/>
+        <a:font script="Laoo" typeface="DokChampa"/>
+        <a:font script="Sinh" typeface="Iskoola Pota"/>
+        <a:font script="Mong" typeface="Mongolian Baiti"/>
+        <a:font script="Viet" typeface="Times New Roman"/>
+        <a:font script="Uigh" typeface="Microsoft Uighur"/>
+        <a:font script="Geor" typeface="Sylfaen"/>
+      </a:majorFont>
+      <a:minorFont>
+        <a:latin typeface="Arial"/>
+        <a:ea typeface=""/>
+        <a:cs typeface=""/>
+        <a:font script="Jpan" typeface="ＭＳ Ｐゴシック"/>
+        <a:font script="Hang" typeface="맑은 고딕"/>
+        <a:font script="Hans" typeface="宋体"/>
+        <a:font script="Hant" typeface="新細明體"/>
+        <a:font script="Arab" typeface="Arial"/>
+        <a:font script="Hebr" typeface="Arial"/>
+        <a:font script="Thai" typeface="Cordia New"/>
+        <a:font script="Ethi" typeface="Nyala"/>
+        <a:font script="Beng" typeface="Vrinda"/>
+        <a:font script="Gujr" typeface="Shruti"/>
+        <a:font script="Khmr" typeface="DaunPenh"/>
+        <a:font script="Knda" typeface="Tunga"/>
+        <a:font script="Guru" typeface="Raavi"/>
+        <a:font script="Cans" typeface="Euphemia"/>
+        <a:font script="Cher" typeface="Plantagenet Cherokee"/>
+        <a:font script="Yiii" typeface="Microsoft Yi Baiti"/>
+        <a:font script="Tibt" typeface="Microsoft Himalaya"/>
+        <a:font script="Thaa" typeface="MV Boli"/>
+        <a:font script="Deva" typeface="Mangal"/>
+        <a:font script="Telu" typeface="Gautami"/>
+        <a:font script="Taml" typeface="Latha"/>
+        <a:font script="Syrc" typeface="Estrangelo Edessa"/>
+        <a:font script="Orya" typeface="Kalinga"/>
+        <a:font script="Mlym" typeface="Kartika"/>
+        <a:font script="Laoo" typeface="DokChampa"/>
+        <a:font script="Sinh" typeface="Iskoola Pota"/>
+        <a:font script="Mong" typeface="Mongolian Baiti"/>
+        <a:font script="Viet" typeface="Arial"/>
+        <a:font script="Uigh" typeface="Microsoft Uighur"/>
+        <a:font script="Geor" typeface="Sylfaen"/>
+      </a:minorFont>
+    </a:fontScheme>
+    <a:fmtScheme name="Office">
+      <a:fillStyleLst>
+        <a:solidFill>
+          <a:schemeClr val="phClr"/>
+        </a:solidFill>
+        <a:gradFill rotWithShape="1">
+          <a:gsLst>
+            <a:gs pos="0">
+              <a:schemeClr val="phClr">
+                <a:tint val="50000"/>
+                <a:satMod val="300000"/>
+              </a:schemeClr>
+            </a:gs>
+            <a:gs pos="35000">
+              <a:schemeClr val="phClr">
+                <a:tint val="37000"/>
+                <a:satMod val="300000"/>
+              </a:schemeClr>
+            </a:gs>
+            <a:gs pos="100000">
+              <a:schemeClr val="phClr">
+                <a:tint val="15000"/>
+                <a:satMod val="350000"/>
+              </a:schemeClr>
+            </a:gs>
+          </a:gsLst>
+          <a:lin ang="16200000" scaled="1"/>
+        </a:gradFill>
+        <a:gradFill rotWithShape="1">
+          <a:gsLst>
+            <a:gs pos="0">
+              <a:schemeClr val="phClr">
+                <a:tint val="100000"/>
+                <a:shade val="100000"/>
+                <a:satMod val="130000"/>
+              </a:schemeClr>
+            </a:gs>
+            <a:gs pos="100000">
+              <a:schemeClr val="phClr">
+                <a:tint val="50000"/>
+                <a:shade val="100000"/>
+                <a:satMod val="350000"/>
+              </a:schemeClr>
+            </a:gs>
+          </a:gsLst>
+          <a:lin ang="16200000" scaled="0"/>
+        </a:gradFill>
+      </a:fillStyleLst>
+      <a:lnStyleLst>
+        <a:ln w="9525" cap="flat" cmpd="sng" algn="ctr">
+          <a:solidFill>
+            <a:schemeClr val="phClr">
+              <a:shade val="95000"/>
+              <a:satMod val="105000"/>
+            </a:schemeClr>
+          </a:solidFill>
+          <a:prstDash val="solid"/>
+        </a:ln>
+        <a:ln w="25400" cap="flat" cmpd="sng" algn="ctr">
+          <a:solidFill>
+            <a:schemeClr val="phClr"/>
+          </a:solidFill>
+          <a:prstDash val="solid"/>
+        </a:ln>
+        <a:ln w="38100" cap="flat" cmpd="sng" algn="ctr">
+          <a:solidFill>
+            <a:schemeClr val="phClr"/>
+          </a:solidFill>
+          <a:prstDash val="solid"/>
+        </a:ln>
+      </a:lnStyleLst>
+      <a:effectStyleLst>
+        <a:effectStyle>
+          <a:effectLst>
+            <a:outerShdw blurRad="40000" dist="20000" dir="5400000" rotWithShape="0">
+              <a:srgbClr val="000000">
+                <a:alpha val="38000"/>
+              </a:srgbClr>
+            </a:outerShdw>
+          </a:effectLst>
+        </a:effectStyle>
+        <a:effectStyle>
+          <a:effectLst>
+            <a:outerShdw blurRad="40000" dist="23000" dir="5400000" rotWithShape="0">
+              <a:srgbClr val="000000">
+                <a:alpha val="35000"/>
+              </a:srgbClr>
+            </a:outerShdw>
+          </a:effectLst>
+        </a:effectStyle>
+        <a:effectStyle>
+          <a:effectLst>
+            <a:outerShdw blurRad="40000" dist="23000" dir="5400000" rotWithShape="0">
+              <a:srgbClr val="000000">
+                <a:alpha val="35000"/>
+              </a:srgbClr>
+            </a:outerShdw>
+          </a:effectLst>
+          <a:scene3d>
+            <a:camera prst="orthographicFront">
+              <a:rot lat="0" lon="0" rev="0"/>
+            </a:camera>
+            <a:lightRig rig="threePt" dir="t">
+              <a:rot lat="0" lon="0" rev="1200000"/>
+            </a:lightRig>
+          </a:scene3d>
+          <a:sp3d>
+            <a:bevelT w="63500" h="25400"/>
+          </a:sp3d>
+        </a:effectStyle>
+      </a:effectStyleLst>
+      <a:bgFillStyleLst>
+        <a:solidFill>
+          <a:schemeClr val="phClr"/>
+        </a:solidFill>
+        <a:gradFill rotWithShape="1">
+          <a:gsLst>
+            <a:gs pos="0">
+              <a:schemeClr val="phClr">
+                <a:tint val="40000"/>
+                <a:satMod val="350000"/>
+              </a:schemeClr>
+            </a:gs>
+            <a:gs pos="40000">
+              <a:schemeClr val="phClr">
+                <a:tint val="45000"/>
+                <a:shade val="99000"/>
+                <a:satMod val="350000"/>
+              </a:schemeClr>
+            </a:gs>
+            <a:gs pos="100000">
+              <a:schemeClr val="phClr">
+                <a:shade val="20000"/>
+                <a:satMod val="255000"/>
+              </a:schemeClr>
+            </a:gs>
+          </a:gsLst>
+          <a:path path="circle">
+            <a:fillToRect l="50000" t="-80000" r="50000" b="180000"/>
+          </a:path>
+        </a:gradFill>
+        <a:gradFill rotWithShape="1">
+          <a:gsLst>
+            <a:gs pos="0">
+              <a:schemeClr val="phClr">
+                <a:tint val="80000"/>
+                <a:satMod val="300000"/>
+              </a:schemeClr>
+            </a:gs>
+            <a:gs pos="100000">
+              <a:schemeClr val="phClr">
+                <a:shade val="30000"/>
+                <a:satMod val="200000"/>
+              </a:schemeClr>
+            </a:gs>
+          </a:gsLst>
+          <a:path path="circle">
+            <a:fillToRect l="50000" t="50000" r="50000" b="50000"/>
+          </a:path>
+        </a:gradFill>
+      </a:bgFillStyleLst>
+    </a:fmtScheme>
+  </a:themeElements>
+</a:theme>
+</file>
+
+<file path=ppt/theme/theme2.xml><?xml version="1.0" encoding="utf-8"?>
 <a:theme xmlns:a="http://schemas.openxmlformats.org/drawingml/2006/main" xmlns:r="http://schemas.openxmlformats.org/officeDocument/2006/relationships">
   <a:themeElements>
     <a:clrScheme name="Default">
@@ -16649,283 +17008,4 @@
     </a:fmtScheme>
   </a:themeElements>
 </a:theme>
-</file>
-
-<file path=ppt/theme/theme2.xml><?xml version="1.0" encoding="utf-8"?>
-<a:theme xmlns:a="http://schemas.openxmlformats.org/drawingml/2006/main" xmlns:r="http://schemas.openxmlformats.org/officeDocument/2006/relationships" name="Paradigm">
-  <a:themeElements>
-    <a:clrScheme name="Paradigm">
-      <a:dk1>
-        <a:srgbClr val="31394D"/>
-      </a:dk1>
-      <a:lt1>
-        <a:srgbClr val="FFFFFF"/>
-      </a:lt1>
-      <a:dk2>
-        <a:srgbClr val="666666"/>
-      </a:dk2>
-      <a:lt2>
-        <a:srgbClr val="626B73"/>
-      </a:lt2>
-      <a:accent1>
-        <a:srgbClr val="002F4A"/>
-      </a:accent1>
-      <a:accent2>
-        <a:srgbClr val="D9C4B1"/>
-      </a:accent2>
-      <a:accent3>
-        <a:srgbClr val="EDE3DA"/>
-      </a:accent3>
-      <a:accent4>
-        <a:srgbClr val="B85741"/>
-      </a:accent4>
-      <a:accent5>
-        <a:srgbClr val="009384"/>
-      </a:accent5>
-      <a:accent6>
-        <a:srgbClr val="D0F6FF"/>
-      </a:accent6>
-      <a:hlink>
-        <a:srgbClr val="009384"/>
-      </a:hlink>
-      <a:folHlink>
-        <a:srgbClr val="009384"/>
-      </a:folHlink>
-    </a:clrScheme>
-    <a:fontScheme name="Office">
-      <a:majorFont>
-        <a:latin typeface="Arial"/>
-        <a:ea typeface=""/>
-        <a:cs typeface=""/>
-        <a:font script="Jpan" typeface="ＭＳ Ｐゴシック"/>
-        <a:font script="Hang" typeface="맑은 고딕"/>
-        <a:font script="Hans" typeface="宋体"/>
-        <a:font script="Hant" typeface="新細明體"/>
-        <a:font script="Arab" typeface="Times New Roman"/>
-        <a:font script="Hebr" typeface="Times New Roman"/>
-        <a:font script="Thai" typeface="Angsana New"/>
-        <a:font script="Ethi" typeface="Nyala"/>
-        <a:font script="Beng" typeface="Vrinda"/>
-        <a:font script="Gujr" typeface="Shruti"/>
-        <a:font script="Khmr" typeface="MoolBoran"/>
-        <a:font script="Knda" typeface="Tunga"/>
-        <a:font script="Guru" typeface="Raavi"/>
-        <a:font script="Cans" typeface="Euphemia"/>
-        <a:font script="Cher" typeface="Plantagenet Cherokee"/>
-        <a:font script="Yiii" typeface="Microsoft Yi Baiti"/>
-        <a:font script="Tibt" typeface="Microsoft Himalaya"/>
-        <a:font script="Thaa" typeface="MV Boli"/>
-        <a:font script="Deva" typeface="Mangal"/>
-        <a:font script="Telu" typeface="Gautami"/>
-        <a:font script="Taml" typeface="Latha"/>
-        <a:font script="Syrc" typeface="Estrangelo Edessa"/>
-        <a:font script="Orya" typeface="Kalinga"/>
-        <a:font script="Mlym" typeface="Kartika"/>
-        <a:font script="Laoo" typeface="DokChampa"/>
-        <a:font script="Sinh" typeface="Iskoola Pota"/>
-        <a:font script="Mong" typeface="Mongolian Baiti"/>
-        <a:font script="Viet" typeface="Times New Roman"/>
-        <a:font script="Uigh" typeface="Microsoft Uighur"/>
-        <a:font script="Geor" typeface="Sylfaen"/>
-      </a:majorFont>
-      <a:minorFont>
-        <a:latin typeface="Arial"/>
-        <a:ea typeface=""/>
-        <a:cs typeface=""/>
-        <a:font script="Jpan" typeface="ＭＳ Ｐゴシック"/>
-        <a:font script="Hang" typeface="맑은 고딕"/>
-        <a:font script="Hans" typeface="宋体"/>
-        <a:font script="Hant" typeface="新細明體"/>
-        <a:font script="Arab" typeface="Arial"/>
-        <a:font script="Hebr" typeface="Arial"/>
-        <a:font script="Thai" typeface="Cordia New"/>
-        <a:font script="Ethi" typeface="Nyala"/>
-        <a:font script="Beng" typeface="Vrinda"/>
-        <a:font script="Gujr" typeface="Shruti"/>
-        <a:font script="Khmr" typeface="DaunPenh"/>
-        <a:font script="Knda" typeface="Tunga"/>
-        <a:font script="Guru" typeface="Raavi"/>
-        <a:font script="Cans" typeface="Euphemia"/>
-        <a:font script="Cher" typeface="Plantagenet Cherokee"/>
-        <a:font script="Yiii" typeface="Microsoft Yi Baiti"/>
-        <a:font script="Tibt" typeface="Microsoft Himalaya"/>
-        <a:font script="Thaa" typeface="MV Boli"/>
-        <a:font script="Deva" typeface="Mangal"/>
-        <a:font script="Telu" typeface="Gautami"/>
-        <a:font script="Taml" typeface="Latha"/>
-        <a:font script="Syrc" typeface="Estrangelo Edessa"/>
-        <a:font script="Orya" typeface="Kalinga"/>
-        <a:font script="Mlym" typeface="Kartika"/>
-        <a:font script="Laoo" typeface="DokChampa"/>
-        <a:font script="Sinh" typeface="Iskoola Pota"/>
-        <a:font script="Mong" typeface="Mongolian Baiti"/>
-        <a:font script="Viet" typeface="Arial"/>
-        <a:font script="Uigh" typeface="Microsoft Uighur"/>
-        <a:font script="Geor" typeface="Sylfaen"/>
-      </a:minorFont>
-    </a:fontScheme>
-    <a:fmtScheme name="Office">
-      <a:fillStyleLst>
-        <a:solidFill>
-          <a:schemeClr val="phClr"/>
-        </a:solidFill>
-        <a:gradFill rotWithShape="1">
-          <a:gsLst>
-            <a:gs pos="0">
-              <a:schemeClr val="phClr">
-                <a:tint val="50000"/>
-                <a:satMod val="300000"/>
-              </a:schemeClr>
-            </a:gs>
-            <a:gs pos="35000">
-              <a:schemeClr val="phClr">
-                <a:tint val="37000"/>
-                <a:satMod val="300000"/>
-              </a:schemeClr>
-            </a:gs>
-            <a:gs pos="100000">
-              <a:schemeClr val="phClr">
-                <a:tint val="15000"/>
-                <a:satMod val="350000"/>
-              </a:schemeClr>
-            </a:gs>
-          </a:gsLst>
-          <a:lin ang="16200000" scaled="1"/>
-        </a:gradFill>
-        <a:gradFill rotWithShape="1">
-          <a:gsLst>
-            <a:gs pos="0">
-              <a:schemeClr val="phClr">
-                <a:tint val="100000"/>
-                <a:shade val="100000"/>
-                <a:satMod val="130000"/>
-              </a:schemeClr>
-            </a:gs>
-            <a:gs pos="100000">
-              <a:schemeClr val="phClr">
-                <a:tint val="50000"/>
-                <a:shade val="100000"/>
-                <a:satMod val="350000"/>
-              </a:schemeClr>
-            </a:gs>
-          </a:gsLst>
-          <a:lin ang="16200000" scaled="0"/>
-        </a:gradFill>
-      </a:fillStyleLst>
-      <a:lnStyleLst>
-        <a:ln w="9525" cap="flat" cmpd="sng" algn="ctr">
-          <a:solidFill>
-            <a:schemeClr val="phClr">
-              <a:shade val="95000"/>
-              <a:satMod val="105000"/>
-            </a:schemeClr>
-          </a:solidFill>
-          <a:prstDash val="solid"/>
-        </a:ln>
-        <a:ln w="25400" cap="flat" cmpd="sng" algn="ctr">
-          <a:solidFill>
-            <a:schemeClr val="phClr"/>
-          </a:solidFill>
-          <a:prstDash val="solid"/>
-        </a:ln>
-        <a:ln w="38100" cap="flat" cmpd="sng" algn="ctr">
-          <a:solidFill>
-            <a:schemeClr val="phClr"/>
-          </a:solidFill>
-          <a:prstDash val="solid"/>
-        </a:ln>
-      </a:lnStyleLst>
-      <a:effectStyleLst>
-        <a:effectStyle>
-          <a:effectLst>
-            <a:outerShdw blurRad="40000" dist="20000" dir="5400000" rotWithShape="0">
-              <a:srgbClr val="000000">
-                <a:alpha val="38000"/>
-              </a:srgbClr>
-            </a:outerShdw>
-          </a:effectLst>
-        </a:effectStyle>
-        <a:effectStyle>
-          <a:effectLst>
-            <a:outerShdw blurRad="40000" dist="23000" dir="5400000" rotWithShape="0">
-              <a:srgbClr val="000000">
-                <a:alpha val="35000"/>
-              </a:srgbClr>
-            </a:outerShdw>
-          </a:effectLst>
-        </a:effectStyle>
-        <a:effectStyle>
-          <a:effectLst>
-            <a:outerShdw blurRad="40000" dist="23000" dir="5400000" rotWithShape="0">
-              <a:srgbClr val="000000">
-                <a:alpha val="35000"/>
-              </a:srgbClr>
-            </a:outerShdw>
-          </a:effectLst>
-          <a:scene3d>
-            <a:camera prst="orthographicFront">
-              <a:rot lat="0" lon="0" rev="0"/>
-            </a:camera>
-            <a:lightRig rig="threePt" dir="t">
-              <a:rot lat="0" lon="0" rev="1200000"/>
-            </a:lightRig>
-          </a:scene3d>
-          <a:sp3d>
-            <a:bevelT w="63500" h="25400"/>
-          </a:sp3d>
-        </a:effectStyle>
-      </a:effectStyleLst>
-      <a:bgFillStyleLst>
-        <a:solidFill>
-          <a:schemeClr val="phClr"/>
-        </a:solidFill>
-        <a:gradFill rotWithShape="1">
-          <a:gsLst>
-            <a:gs pos="0">
-              <a:schemeClr val="phClr">
-                <a:tint val="40000"/>
-                <a:satMod val="350000"/>
-              </a:schemeClr>
-            </a:gs>
-            <a:gs pos="40000">
-              <a:schemeClr val="phClr">
-                <a:tint val="45000"/>
-                <a:shade val="99000"/>
-                <a:satMod val="350000"/>
-              </a:schemeClr>
-            </a:gs>
-            <a:gs pos="100000">
-              <a:schemeClr val="phClr">
-                <a:shade val="20000"/>
-                <a:satMod val="255000"/>
-              </a:schemeClr>
-            </a:gs>
-          </a:gsLst>
-          <a:path path="circle">
-            <a:fillToRect l="50000" t="-80000" r="50000" b="180000"/>
-          </a:path>
-        </a:gradFill>
-        <a:gradFill rotWithShape="1">
-          <a:gsLst>
-            <a:gs pos="0">
-              <a:schemeClr val="phClr">
-                <a:tint val="80000"/>
-                <a:satMod val="300000"/>
-              </a:schemeClr>
-            </a:gs>
-            <a:gs pos="100000">
-              <a:schemeClr val="phClr">
-                <a:shade val="30000"/>
-                <a:satMod val="200000"/>
-              </a:schemeClr>
-            </a:gs>
-          </a:gsLst>
-          <a:path path="circle">
-            <a:fillToRect l="50000" t="50000" r="50000" b="50000"/>
-          </a:path>
-        </a:gradFill>
-      </a:bgFillStyleLst>
-    </a:fmtScheme>
-  </a:themeElements>
-</a:theme>
 </file>
</xml_diff>

<commit_message>
adicionando o calculos da aws
</commit_message>
<xml_diff>
--- a/docs/Hackaton-TechMedicos.pptx
+++ b/docs/Hackaton-TechMedicos.pptx
@@ -23,23 +23,26 @@
     <p:sldId id="268" r:id="rId18"/>
     <p:sldId id="269" r:id="rId19"/>
     <p:sldId id="270" r:id="rId20"/>
+    <p:sldId id="271" r:id="rId21"/>
+    <p:sldId id="272" r:id="rId22"/>
+    <p:sldId id="273" r:id="rId23"/>
   </p:sldIdLst>
   <p:sldSz cy="5143500" cx="9144000"/>
   <p:notesSz cx="6858000" cy="9144000"/>
   <p:embeddedFontLst>
     <p:embeddedFont>
       <p:font typeface="Roboto"/>
-      <p:regular r:id="rId21"/>
-      <p:bold r:id="rId22"/>
-      <p:italic r:id="rId23"/>
-      <p:boldItalic r:id="rId24"/>
+      <p:regular r:id="rId24"/>
+      <p:bold r:id="rId25"/>
+      <p:italic r:id="rId26"/>
+      <p:boldItalic r:id="rId27"/>
     </p:embeddedFont>
     <p:embeddedFont>
       <p:font typeface="Merriweather"/>
-      <p:regular r:id="rId25"/>
-      <p:bold r:id="rId26"/>
-      <p:italic r:id="rId27"/>
-      <p:boldItalic r:id="rId28"/>
+      <p:regular r:id="rId28"/>
+      <p:bold r:id="rId29"/>
+      <p:italic r:id="rId30"/>
+      <p:boldItalic r:id="rId31"/>
     </p:embeddedFont>
   </p:embeddedFontLst>
   <p:defaultTextStyle>
@@ -980,7 +983,7 @@
   <p:cSld>
     <p:spTree>
       <p:nvGrpSpPr>
-        <p:cNvPr id="121" name="Shape 121"/>
+        <p:cNvPr id="123" name="Shape 123"/>
         <p:cNvGrpSpPr/>
         <p:nvPr/>
       </p:nvGrpSpPr>
@@ -994,7 +997,7 @@
       </p:grpSpPr>
       <p:sp>
         <p:nvSpPr>
-          <p:cNvPr id="122" name="Google Shape;122;p10:notes"/>
+          <p:cNvPr id="124" name="Google Shape;124;p9:notes"/>
           <p:cNvSpPr/>
           <p:nvPr>
             <p:ph idx="2" type="sldImg"/>
@@ -1039,7 +1042,7 @@
       </p:sp>
       <p:sp>
         <p:nvSpPr>
-          <p:cNvPr id="123" name="Google Shape;123;p10:notes"/>
+          <p:cNvPr id="125" name="Google Shape;125;p9:notes"/>
           <p:cNvSpPr txBox="1"/>
           <p:nvPr>
             <p:ph idx="1" type="body"/>
@@ -1097,7 +1100,7 @@
   <p:cSld>
     <p:spTree>
       <p:nvGrpSpPr>
-        <p:cNvPr id="127" name="Shape 127"/>
+        <p:cNvPr id="129" name="Shape 129"/>
         <p:cNvGrpSpPr/>
         <p:nvPr/>
       </p:nvGrpSpPr>
@@ -1111,7 +1114,124 @@
       </p:grpSpPr>
       <p:sp>
         <p:nvSpPr>
-          <p:cNvPr id="128" name="Google Shape;128;p11:notes"/>
+          <p:cNvPr id="130" name="Google Shape;130;p10:notes"/>
+          <p:cNvSpPr/>
+          <p:nvPr>
+            <p:ph idx="2" type="sldImg"/>
+          </p:nvPr>
+        </p:nvSpPr>
+        <p:spPr>
+          <a:xfrm>
+            <a:off x="381000" y="685800"/>
+            <a:ext cx="6096000" cy="3429000"/>
+          </a:xfrm>
+          <a:custGeom>
+            <a:rect b="b" l="l" r="r" t="t"/>
+            <a:pathLst>
+              <a:path extrusionOk="0" h="120000" w="120000">
+                <a:moveTo>
+                  <a:pt x="0" y="0"/>
+                </a:moveTo>
+                <a:lnTo>
+                  <a:pt x="120000" y="0"/>
+                </a:lnTo>
+                <a:lnTo>
+                  <a:pt x="120000" y="120000"/>
+                </a:lnTo>
+                <a:lnTo>
+                  <a:pt x="0" y="120000"/>
+                </a:lnTo>
+                <a:close/>
+              </a:path>
+            </a:pathLst>
+          </a:custGeom>
+          <a:noFill/>
+          <a:ln cap="flat" cmpd="sng" w="9525">
+            <a:solidFill>
+              <a:srgbClr val="000000"/>
+            </a:solidFill>
+            <a:prstDash val="solid"/>
+            <a:round/>
+            <a:headEnd len="sm" w="sm" type="none"/>
+            <a:tailEnd len="sm" w="sm" type="none"/>
+          </a:ln>
+        </p:spPr>
+      </p:sp>
+      <p:sp>
+        <p:nvSpPr>
+          <p:cNvPr id="131" name="Google Shape;131;p10:notes"/>
+          <p:cNvSpPr txBox="1"/>
+          <p:nvPr>
+            <p:ph idx="1" type="body"/>
+          </p:nvPr>
+        </p:nvSpPr>
+        <p:spPr>
+          <a:xfrm>
+            <a:off x="685800" y="4343400"/>
+            <a:ext cx="5486400" cy="4114800"/>
+          </a:xfrm>
+          <a:prstGeom prst="rect">
+            <a:avLst/>
+          </a:prstGeom>
+          <a:noFill/>
+          <a:ln>
+            <a:noFill/>
+          </a:ln>
+        </p:spPr>
+        <p:txBody>
+          <a:bodyPr anchorCtr="0" anchor="t" bIns="91425" lIns="91425" spcFirstLastPara="1" rIns="91425" wrap="square" tIns="91425">
+            <a:noAutofit/>
+          </a:bodyPr>
+          <a:lstStyle/>
+          <a:p>
+            <a:pPr indent="0" lvl="0" marL="0" rtl="0" algn="l">
+              <a:lnSpc>
+                <a:spcPct val="100000"/>
+              </a:lnSpc>
+              <a:spcBef>
+                <a:spcPts val="0"/>
+              </a:spcBef>
+              <a:spcAft>
+                <a:spcPts val="0"/>
+              </a:spcAft>
+              <a:buSzPts val="1100"/>
+              <a:buNone/>
+            </a:pPr>
+            <a:r>
+              <a:t/>
+            </a:r>
+            <a:endParaRPr/>
+          </a:p>
+        </p:txBody>
+      </p:sp>
+    </p:spTree>
+  </p:cSld>
+  <p:clrMapOvr>
+    <a:masterClrMapping/>
+  </p:clrMapOvr>
+</p:notes>
+</file>
+
+<file path=ppt/notesSlides/notesSlide12.xml><?xml version="1.0" encoding="utf-8"?>
+<p:notes xmlns:a="http://schemas.openxmlformats.org/drawingml/2006/main" xmlns:r="http://schemas.openxmlformats.org/officeDocument/2006/relationships" xmlns:mc="http://schemas.openxmlformats.org/markup-compatibility/2006" xmlns:mv="urn:schemas-microsoft-com:mac:vml" xmlns:p="http://schemas.openxmlformats.org/presentationml/2006/main" xmlns:c="http://schemas.openxmlformats.org/drawingml/2006/chart" xmlns:dgm="http://schemas.openxmlformats.org/drawingml/2006/diagram" xmlns:o="urn:schemas-microsoft-com:office:office" xmlns:v="urn:schemas-microsoft-com:vml" xmlns:pvml="urn:schemas-microsoft-com:office:powerpoint" xmlns:com="http://schemas.openxmlformats.org/drawingml/2006/compatibility" xmlns:p14="http://schemas.microsoft.com/office/powerpoint/2010/main" xmlns:p15="http://schemas.microsoft.com/office/powerpoint/2012/main" xmlns:ahyp="http://schemas.microsoft.com/office/drawing/2018/hyperlinkcolor" showMasterPhAnim="0" showMasterSp="0">
+  <p:cSld>
+    <p:spTree>
+      <p:nvGrpSpPr>
+        <p:cNvPr id="135" name="Shape 135"/>
+        <p:cNvGrpSpPr/>
+        <p:nvPr/>
+      </p:nvGrpSpPr>
+      <p:grpSpPr>
+        <a:xfrm>
+          <a:off x="0" y="0"/>
+          <a:ext cx="0" cy="0"/>
+          <a:chOff x="0" y="0"/>
+          <a:chExt cx="0" cy="0"/>
+        </a:xfrm>
+      </p:grpSpPr>
+      <p:sp>
+        <p:nvSpPr>
+          <p:cNvPr id="136" name="Google Shape;136;p11:notes"/>
           <p:cNvSpPr/>
           <p:nvPr>
             <p:ph idx="2" type="sldImg"/>
@@ -1156,7 +1276,7 @@
       </p:sp>
       <p:sp>
         <p:nvSpPr>
-          <p:cNvPr id="129" name="Google Shape;129;p11:notes"/>
+          <p:cNvPr id="137" name="Google Shape;137;p11:notes"/>
           <p:cNvSpPr txBox="1"/>
           <p:nvPr>
             <p:ph idx="1" type="body"/>
@@ -1209,12 +1329,12 @@
 </p:notes>
 </file>
 
-<file path=ppt/notesSlides/notesSlide12.xml><?xml version="1.0" encoding="utf-8"?>
+<file path=ppt/notesSlides/notesSlide13.xml><?xml version="1.0" encoding="utf-8"?>
 <p:notes xmlns:a="http://schemas.openxmlformats.org/drawingml/2006/main" xmlns:r="http://schemas.openxmlformats.org/officeDocument/2006/relationships" xmlns:mc="http://schemas.openxmlformats.org/markup-compatibility/2006" xmlns:mv="urn:schemas-microsoft-com:mac:vml" xmlns:p="http://schemas.openxmlformats.org/presentationml/2006/main" xmlns:c="http://schemas.openxmlformats.org/drawingml/2006/chart" xmlns:dgm="http://schemas.openxmlformats.org/drawingml/2006/diagram" xmlns:o="urn:schemas-microsoft-com:office:office" xmlns:v="urn:schemas-microsoft-com:vml" xmlns:pvml="urn:schemas-microsoft-com:office:powerpoint" xmlns:com="http://schemas.openxmlformats.org/drawingml/2006/compatibility" xmlns:p14="http://schemas.microsoft.com/office/powerpoint/2010/main" xmlns:p15="http://schemas.microsoft.com/office/powerpoint/2012/main" xmlns:ahyp="http://schemas.microsoft.com/office/drawing/2018/hyperlinkcolor" showMasterPhAnim="0" showMasterSp="0">
   <p:cSld>
     <p:spTree>
       <p:nvGrpSpPr>
-        <p:cNvPr id="133" name="Shape 133"/>
+        <p:cNvPr id="141" name="Shape 141"/>
         <p:cNvGrpSpPr/>
         <p:nvPr/>
       </p:nvGrpSpPr>
@@ -1228,7 +1348,7 @@
       </p:grpSpPr>
       <p:sp>
         <p:nvSpPr>
-          <p:cNvPr id="134" name="Google Shape;134;p12:notes"/>
+          <p:cNvPr id="142" name="Google Shape;142;p12:notes"/>
           <p:cNvSpPr/>
           <p:nvPr>
             <p:ph idx="2" type="sldImg"/>
@@ -1273,7 +1393,7 @@
       </p:sp>
       <p:sp>
         <p:nvSpPr>
-          <p:cNvPr id="135" name="Google Shape;135;p12:notes"/>
+          <p:cNvPr id="143" name="Google Shape;143;p12:notes"/>
           <p:cNvSpPr txBox="1"/>
           <p:nvPr>
             <p:ph idx="1" type="body"/>
@@ -1326,12 +1446,12 @@
 </p:notes>
 </file>
 
-<file path=ppt/notesSlides/notesSlide13.xml><?xml version="1.0" encoding="utf-8"?>
+<file path=ppt/notesSlides/notesSlide14.xml><?xml version="1.0" encoding="utf-8"?>
 <p:notes xmlns:a="http://schemas.openxmlformats.org/drawingml/2006/main" xmlns:r="http://schemas.openxmlformats.org/officeDocument/2006/relationships" xmlns:mc="http://schemas.openxmlformats.org/markup-compatibility/2006" xmlns:mv="urn:schemas-microsoft-com:mac:vml" xmlns:p="http://schemas.openxmlformats.org/presentationml/2006/main" xmlns:c="http://schemas.openxmlformats.org/drawingml/2006/chart" xmlns:dgm="http://schemas.openxmlformats.org/drawingml/2006/diagram" xmlns:o="urn:schemas-microsoft-com:office:office" xmlns:v="urn:schemas-microsoft-com:vml" xmlns:pvml="urn:schemas-microsoft-com:office:powerpoint" xmlns:com="http://schemas.openxmlformats.org/drawingml/2006/compatibility" xmlns:p14="http://schemas.microsoft.com/office/powerpoint/2010/main" xmlns:p15="http://schemas.microsoft.com/office/powerpoint/2012/main" xmlns:ahyp="http://schemas.microsoft.com/office/drawing/2018/hyperlinkcolor" showMasterPhAnim="0" showMasterSp="0">
   <p:cSld>
     <p:spTree>
       <p:nvGrpSpPr>
-        <p:cNvPr id="139" name="Shape 139"/>
+        <p:cNvPr id="147" name="Shape 147"/>
         <p:cNvGrpSpPr/>
         <p:nvPr/>
       </p:nvGrpSpPr>
@@ -1345,7 +1465,7 @@
       </p:grpSpPr>
       <p:sp>
         <p:nvSpPr>
-          <p:cNvPr id="140" name="Google Shape;140;p13:notes"/>
+          <p:cNvPr id="148" name="Google Shape;148;g2ee89ec689b_0_20:notes"/>
           <p:cNvSpPr/>
           <p:nvPr>
             <p:ph idx="2" type="sldImg"/>
@@ -1390,7 +1510,7 @@
       </p:sp>
       <p:sp>
         <p:nvSpPr>
-          <p:cNvPr id="141" name="Google Shape;141;p13:notes"/>
+          <p:cNvPr id="149" name="Google Shape;149;g2ee89ec689b_0_20:notes"/>
           <p:cNvSpPr txBox="1"/>
           <p:nvPr>
             <p:ph idx="1" type="body"/>
@@ -1443,12 +1563,12 @@
 </p:notes>
 </file>
 
-<file path=ppt/notesSlides/notesSlide14.xml><?xml version="1.0" encoding="utf-8"?>
+<file path=ppt/notesSlides/notesSlide15.xml><?xml version="1.0" encoding="utf-8"?>
 <p:notes xmlns:a="http://schemas.openxmlformats.org/drawingml/2006/main" xmlns:r="http://schemas.openxmlformats.org/officeDocument/2006/relationships" xmlns:mc="http://schemas.openxmlformats.org/markup-compatibility/2006" xmlns:mv="urn:schemas-microsoft-com:mac:vml" xmlns:p="http://schemas.openxmlformats.org/presentationml/2006/main" xmlns:c="http://schemas.openxmlformats.org/drawingml/2006/chart" xmlns:dgm="http://schemas.openxmlformats.org/drawingml/2006/diagram" xmlns:o="urn:schemas-microsoft-com:office:office" xmlns:v="urn:schemas-microsoft-com:vml" xmlns:pvml="urn:schemas-microsoft-com:office:powerpoint" xmlns:com="http://schemas.openxmlformats.org/drawingml/2006/compatibility" xmlns:p14="http://schemas.microsoft.com/office/powerpoint/2010/main" xmlns:p15="http://schemas.microsoft.com/office/powerpoint/2012/main" xmlns:ahyp="http://schemas.microsoft.com/office/drawing/2018/hyperlinkcolor" showMasterPhAnim="0" showMasterSp="0">
   <p:cSld>
     <p:spTree>
       <p:nvGrpSpPr>
-        <p:cNvPr id="145" name="Shape 145"/>
+        <p:cNvPr id="153" name="Shape 153"/>
         <p:cNvGrpSpPr/>
         <p:nvPr/>
       </p:nvGrpSpPr>
@@ -1462,7 +1582,7 @@
       </p:grpSpPr>
       <p:sp>
         <p:nvSpPr>
-          <p:cNvPr id="146" name="Google Shape;146;p14:notes"/>
+          <p:cNvPr id="154" name="Google Shape;154;g2ee89ec689b_0_7:notes"/>
           <p:cNvSpPr/>
           <p:nvPr>
             <p:ph idx="2" type="sldImg"/>
@@ -1507,7 +1627,7 @@
       </p:sp>
       <p:sp>
         <p:nvSpPr>
-          <p:cNvPr id="147" name="Google Shape;147;p14:notes"/>
+          <p:cNvPr id="155" name="Google Shape;155;g2ee89ec689b_0_7:notes"/>
           <p:cNvSpPr txBox="1"/>
           <p:nvPr>
             <p:ph idx="1" type="body"/>
@@ -1560,12 +1680,12 @@
 </p:notes>
 </file>
 
-<file path=ppt/notesSlides/notesSlide15.xml><?xml version="1.0" encoding="utf-8"?>
+<file path=ppt/notesSlides/notesSlide16.xml><?xml version="1.0" encoding="utf-8"?>
 <p:notes xmlns:a="http://schemas.openxmlformats.org/drawingml/2006/main" xmlns:r="http://schemas.openxmlformats.org/officeDocument/2006/relationships" xmlns:mc="http://schemas.openxmlformats.org/markup-compatibility/2006" xmlns:mv="urn:schemas-microsoft-com:mac:vml" xmlns:p="http://schemas.openxmlformats.org/presentationml/2006/main" xmlns:c="http://schemas.openxmlformats.org/drawingml/2006/chart" xmlns:dgm="http://schemas.openxmlformats.org/drawingml/2006/diagram" xmlns:o="urn:schemas-microsoft-com:office:office" xmlns:v="urn:schemas-microsoft-com:vml" xmlns:pvml="urn:schemas-microsoft-com:office:powerpoint" xmlns:com="http://schemas.openxmlformats.org/drawingml/2006/compatibility" xmlns:p14="http://schemas.microsoft.com/office/powerpoint/2010/main" xmlns:p15="http://schemas.microsoft.com/office/powerpoint/2012/main" xmlns:ahyp="http://schemas.microsoft.com/office/drawing/2018/hyperlinkcolor" showMasterPhAnim="0" showMasterSp="0">
   <p:cSld>
     <p:spTree>
       <p:nvGrpSpPr>
-        <p:cNvPr id="152" name="Shape 152"/>
+        <p:cNvPr id="161" name="Shape 161"/>
         <p:cNvGrpSpPr/>
         <p:nvPr/>
       </p:nvGrpSpPr>
@@ -1579,7 +1699,241 @@
       </p:grpSpPr>
       <p:sp>
         <p:nvSpPr>
-          <p:cNvPr id="153" name="Google Shape;153;p15:notes"/>
+          <p:cNvPr id="162" name="Google Shape;162;p13:notes"/>
+          <p:cNvSpPr/>
+          <p:nvPr>
+            <p:ph idx="2" type="sldImg"/>
+          </p:nvPr>
+        </p:nvSpPr>
+        <p:spPr>
+          <a:xfrm>
+            <a:off x="381300" y="685800"/>
+            <a:ext cx="6096000" cy="3429000"/>
+          </a:xfrm>
+          <a:custGeom>
+            <a:rect b="b" l="l" r="r" t="t"/>
+            <a:pathLst>
+              <a:path extrusionOk="0" h="120000" w="120000">
+                <a:moveTo>
+                  <a:pt x="0" y="0"/>
+                </a:moveTo>
+                <a:lnTo>
+                  <a:pt x="120000" y="0"/>
+                </a:lnTo>
+                <a:lnTo>
+                  <a:pt x="120000" y="120000"/>
+                </a:lnTo>
+                <a:lnTo>
+                  <a:pt x="0" y="120000"/>
+                </a:lnTo>
+                <a:close/>
+              </a:path>
+            </a:pathLst>
+          </a:custGeom>
+          <a:noFill/>
+          <a:ln cap="flat" cmpd="sng" w="9525">
+            <a:solidFill>
+              <a:srgbClr val="000000"/>
+            </a:solidFill>
+            <a:prstDash val="solid"/>
+            <a:round/>
+            <a:headEnd len="sm" w="sm" type="none"/>
+            <a:tailEnd len="sm" w="sm" type="none"/>
+          </a:ln>
+        </p:spPr>
+      </p:sp>
+      <p:sp>
+        <p:nvSpPr>
+          <p:cNvPr id="163" name="Google Shape;163;p13:notes"/>
+          <p:cNvSpPr txBox="1"/>
+          <p:nvPr>
+            <p:ph idx="1" type="body"/>
+          </p:nvPr>
+        </p:nvSpPr>
+        <p:spPr>
+          <a:xfrm>
+            <a:off x="685800" y="4343400"/>
+            <a:ext cx="5486400" cy="4114800"/>
+          </a:xfrm>
+          <a:prstGeom prst="rect">
+            <a:avLst/>
+          </a:prstGeom>
+          <a:noFill/>
+          <a:ln>
+            <a:noFill/>
+          </a:ln>
+        </p:spPr>
+        <p:txBody>
+          <a:bodyPr anchorCtr="0" anchor="t" bIns="91425" lIns="91425" spcFirstLastPara="1" rIns="91425" wrap="square" tIns="91425">
+            <a:noAutofit/>
+          </a:bodyPr>
+          <a:lstStyle/>
+          <a:p>
+            <a:pPr indent="0" lvl="0" marL="0" rtl="0" algn="l">
+              <a:lnSpc>
+                <a:spcPct val="100000"/>
+              </a:lnSpc>
+              <a:spcBef>
+                <a:spcPts val="0"/>
+              </a:spcBef>
+              <a:spcAft>
+                <a:spcPts val="0"/>
+              </a:spcAft>
+              <a:buSzPts val="1100"/>
+              <a:buNone/>
+            </a:pPr>
+            <a:r>
+              <a:t/>
+            </a:r>
+            <a:endParaRPr/>
+          </a:p>
+        </p:txBody>
+      </p:sp>
+    </p:spTree>
+  </p:cSld>
+  <p:clrMapOvr>
+    <a:masterClrMapping/>
+  </p:clrMapOvr>
+</p:notes>
+</file>
+
+<file path=ppt/notesSlides/notesSlide17.xml><?xml version="1.0" encoding="utf-8"?>
+<p:notes xmlns:a="http://schemas.openxmlformats.org/drawingml/2006/main" xmlns:r="http://schemas.openxmlformats.org/officeDocument/2006/relationships" xmlns:mc="http://schemas.openxmlformats.org/markup-compatibility/2006" xmlns:mv="urn:schemas-microsoft-com:mac:vml" xmlns:p="http://schemas.openxmlformats.org/presentationml/2006/main" xmlns:c="http://schemas.openxmlformats.org/drawingml/2006/chart" xmlns:dgm="http://schemas.openxmlformats.org/drawingml/2006/diagram" xmlns:o="urn:schemas-microsoft-com:office:office" xmlns:v="urn:schemas-microsoft-com:vml" xmlns:pvml="urn:schemas-microsoft-com:office:powerpoint" xmlns:com="http://schemas.openxmlformats.org/drawingml/2006/compatibility" xmlns:p14="http://schemas.microsoft.com/office/powerpoint/2010/main" xmlns:p15="http://schemas.microsoft.com/office/powerpoint/2012/main" xmlns:ahyp="http://schemas.microsoft.com/office/drawing/2018/hyperlinkcolor" showMasterPhAnim="0" showMasterSp="0">
+  <p:cSld>
+    <p:spTree>
+      <p:nvGrpSpPr>
+        <p:cNvPr id="167" name="Shape 167"/>
+        <p:cNvGrpSpPr/>
+        <p:nvPr/>
+      </p:nvGrpSpPr>
+      <p:grpSpPr>
+        <a:xfrm>
+          <a:off x="0" y="0"/>
+          <a:ext cx="0" cy="0"/>
+          <a:chOff x="0" y="0"/>
+          <a:chExt cx="0" cy="0"/>
+        </a:xfrm>
+      </p:grpSpPr>
+      <p:sp>
+        <p:nvSpPr>
+          <p:cNvPr id="168" name="Google Shape;168;p14:notes"/>
+          <p:cNvSpPr/>
+          <p:nvPr>
+            <p:ph idx="2" type="sldImg"/>
+          </p:nvPr>
+        </p:nvSpPr>
+        <p:spPr>
+          <a:xfrm>
+            <a:off x="381300" y="685800"/>
+            <a:ext cx="6096000" cy="3429000"/>
+          </a:xfrm>
+          <a:custGeom>
+            <a:rect b="b" l="l" r="r" t="t"/>
+            <a:pathLst>
+              <a:path extrusionOk="0" h="120000" w="120000">
+                <a:moveTo>
+                  <a:pt x="0" y="0"/>
+                </a:moveTo>
+                <a:lnTo>
+                  <a:pt x="120000" y="0"/>
+                </a:lnTo>
+                <a:lnTo>
+                  <a:pt x="120000" y="120000"/>
+                </a:lnTo>
+                <a:lnTo>
+                  <a:pt x="0" y="120000"/>
+                </a:lnTo>
+                <a:close/>
+              </a:path>
+            </a:pathLst>
+          </a:custGeom>
+          <a:noFill/>
+          <a:ln cap="flat" cmpd="sng" w="9525">
+            <a:solidFill>
+              <a:srgbClr val="000000"/>
+            </a:solidFill>
+            <a:prstDash val="solid"/>
+            <a:round/>
+            <a:headEnd len="sm" w="sm" type="none"/>
+            <a:tailEnd len="sm" w="sm" type="none"/>
+          </a:ln>
+        </p:spPr>
+      </p:sp>
+      <p:sp>
+        <p:nvSpPr>
+          <p:cNvPr id="169" name="Google Shape;169;p14:notes"/>
+          <p:cNvSpPr txBox="1"/>
+          <p:nvPr>
+            <p:ph idx="1" type="body"/>
+          </p:nvPr>
+        </p:nvSpPr>
+        <p:spPr>
+          <a:xfrm>
+            <a:off x="685800" y="4343400"/>
+            <a:ext cx="5486400" cy="4114800"/>
+          </a:xfrm>
+          <a:prstGeom prst="rect">
+            <a:avLst/>
+          </a:prstGeom>
+          <a:noFill/>
+          <a:ln>
+            <a:noFill/>
+          </a:ln>
+        </p:spPr>
+        <p:txBody>
+          <a:bodyPr anchorCtr="0" anchor="t" bIns="91425" lIns="91425" spcFirstLastPara="1" rIns="91425" wrap="square" tIns="91425">
+            <a:noAutofit/>
+          </a:bodyPr>
+          <a:lstStyle/>
+          <a:p>
+            <a:pPr indent="0" lvl="0" marL="0" rtl="0" algn="l">
+              <a:lnSpc>
+                <a:spcPct val="100000"/>
+              </a:lnSpc>
+              <a:spcBef>
+                <a:spcPts val="0"/>
+              </a:spcBef>
+              <a:spcAft>
+                <a:spcPts val="0"/>
+              </a:spcAft>
+              <a:buSzPts val="1100"/>
+              <a:buNone/>
+            </a:pPr>
+            <a:r>
+              <a:t/>
+            </a:r>
+            <a:endParaRPr/>
+          </a:p>
+        </p:txBody>
+      </p:sp>
+    </p:spTree>
+  </p:cSld>
+  <p:clrMapOvr>
+    <a:masterClrMapping/>
+  </p:clrMapOvr>
+</p:notes>
+</file>
+
+<file path=ppt/notesSlides/notesSlide18.xml><?xml version="1.0" encoding="utf-8"?>
+<p:notes xmlns:a="http://schemas.openxmlformats.org/drawingml/2006/main" xmlns:r="http://schemas.openxmlformats.org/officeDocument/2006/relationships" xmlns:mc="http://schemas.openxmlformats.org/markup-compatibility/2006" xmlns:mv="urn:schemas-microsoft-com:mac:vml" xmlns:p="http://schemas.openxmlformats.org/presentationml/2006/main" xmlns:c="http://schemas.openxmlformats.org/drawingml/2006/chart" xmlns:dgm="http://schemas.openxmlformats.org/drawingml/2006/diagram" xmlns:o="urn:schemas-microsoft-com:office:office" xmlns:v="urn:schemas-microsoft-com:vml" xmlns:pvml="urn:schemas-microsoft-com:office:powerpoint" xmlns:com="http://schemas.openxmlformats.org/drawingml/2006/compatibility" xmlns:p14="http://schemas.microsoft.com/office/powerpoint/2010/main" xmlns:p15="http://schemas.microsoft.com/office/powerpoint/2012/main" xmlns:ahyp="http://schemas.microsoft.com/office/drawing/2018/hyperlinkcolor" showMasterPhAnim="0" showMasterSp="0">
+  <p:cSld>
+    <p:spTree>
+      <p:nvGrpSpPr>
+        <p:cNvPr id="174" name="Shape 174"/>
+        <p:cNvGrpSpPr/>
+        <p:nvPr/>
+      </p:nvGrpSpPr>
+      <p:grpSpPr>
+        <a:xfrm>
+          <a:off x="0" y="0"/>
+          <a:ext cx="0" cy="0"/>
+          <a:chOff x="0" y="0"/>
+          <a:chExt cx="0" cy="0"/>
+        </a:xfrm>
+      </p:grpSpPr>
+      <p:sp>
+        <p:nvSpPr>
+          <p:cNvPr id="175" name="Google Shape;175;p15:notes"/>
           <p:cNvSpPr/>
           <p:nvPr>
             <p:ph idx="2" type="sldImg"/>
@@ -1624,7 +1978,7 @@
       </p:sp>
       <p:sp>
         <p:nvSpPr>
-          <p:cNvPr id="154" name="Google Shape;154;p15:notes"/>
+          <p:cNvPr id="176" name="Google Shape;176;p15:notes"/>
           <p:cNvSpPr txBox="1"/>
           <p:nvPr>
             <p:ph idx="1" type="body"/>
@@ -2515,7 +2869,7 @@
       </p:grpSpPr>
       <p:sp>
         <p:nvSpPr>
-          <p:cNvPr id="116" name="Google Shape;116;p9:notes"/>
+          <p:cNvPr id="116" name="Google Shape;116;g2ee89ec689b_0_0:notes"/>
           <p:cNvSpPr/>
           <p:nvPr>
             <p:ph idx="2" type="sldImg"/>
@@ -2523,7 +2877,7 @@
         </p:nvSpPr>
         <p:spPr>
           <a:xfrm>
-            <a:off x="381000" y="685800"/>
+            <a:off x="381300" y="685800"/>
             <a:ext cx="6096000" cy="3429000"/>
           </a:xfrm>
           <a:custGeom>
@@ -2560,7 +2914,7 @@
       </p:sp>
       <p:sp>
         <p:nvSpPr>
-          <p:cNvPr id="117" name="Google Shape;117;p9:notes"/>
+          <p:cNvPr id="117" name="Google Shape;117;g2ee89ec689b_0_0:notes"/>
           <p:cNvSpPr txBox="1"/>
           <p:nvPr>
             <p:ph idx="1" type="body"/>
@@ -11957,7 +12311,7 @@
   <p:cSld>
     <p:spTree>
       <p:nvGrpSpPr>
-        <p:cNvPr id="124" name="Shape 124"/>
+        <p:cNvPr id="126" name="Shape 126"/>
         <p:cNvGrpSpPr/>
         <p:nvPr/>
       </p:nvGrpSpPr>
@@ -11971,7 +12325,7 @@
       </p:grpSpPr>
       <p:sp>
         <p:nvSpPr>
-          <p:cNvPr id="125" name="Google Shape;125;p22"/>
+          <p:cNvPr id="127" name="Google Shape;127;p22"/>
           <p:cNvSpPr txBox="1"/>
           <p:nvPr>
             <p:ph type="ctrTitle"/>
@@ -11992,7 +12346,7 @@
         </p:spPr>
         <p:txBody>
           <a:bodyPr anchorCtr="0" anchor="t" bIns="91425" lIns="91425" spcFirstLastPara="1" rIns="91425" wrap="square" tIns="91425">
-            <a:normAutofit/>
+            <a:normAutofit fontScale="90000"/>
           </a:bodyPr>
           <a:lstStyle/>
           <a:p>
@@ -12006,24 +12360,47 @@
               <a:spcAft>
                 <a:spcPts val="0"/>
               </a:spcAft>
-              <a:buSzPts val="4000"/>
-              <a:buNone/>
-            </a:pPr>
-            <a:r>
-              <a:rPr b="1" lang="pt-BR" sz="3200">
-                <a:solidFill>
-                  <a:srgbClr val="002F4A"/>
-                </a:solidFill>
-              </a:rPr>
-              <a:t>O Projeto MVP</a:t>
-            </a:r>
-            <a:endParaRPr b="1"/>
+              <a:buSzPct val="111111"/>
+              <a:buNone/>
+            </a:pPr>
+            <a:r>
+              <a:rPr b="1" lang="pt-BR"/>
+              <a:t>Repositórios &amp; Pipelines CI/CD</a:t>
+            </a:r>
+            <a:endParaRPr b="1">
+              <a:highlight>
+                <a:schemeClr val="accent1"/>
+              </a:highlight>
+            </a:endParaRPr>
+          </a:p>
+          <a:p>
+            <a:pPr indent="0" lvl="0" marL="0" rtl="0" algn="l">
+              <a:lnSpc>
+                <a:spcPct val="100000"/>
+              </a:lnSpc>
+              <a:spcBef>
+                <a:spcPts val="0"/>
+              </a:spcBef>
+              <a:spcAft>
+                <a:spcPts val="0"/>
+              </a:spcAft>
+              <a:buSzPct val="125000"/>
+              <a:buNone/>
+            </a:pPr>
+            <a:r>
+              <a:t/>
+            </a:r>
+            <a:endParaRPr b="1" sz="3200">
+              <a:solidFill>
+                <a:srgbClr val="002F4A"/>
+              </a:solidFill>
+            </a:endParaRPr>
           </a:p>
         </p:txBody>
       </p:sp>
       <p:pic>
         <p:nvPicPr>
-          <p:cNvPr descr="Interface gráfica do usuário, Aplicativo&#10;&#10;Descrição gerada automaticamente" id="126" name="Google Shape;126;p22"/>
+          <p:cNvPr descr="Interface gráfica do usuário, Aplicativo&#10;&#10;Descrição gerada automaticamente" id="128" name="Google Shape;128;p22"/>
           <p:cNvPicPr preferRelativeResize="0"/>
           <p:nvPr/>
         </p:nvPicPr>
@@ -12059,16 +12436,9 @@
 <file path=ppt/slides/slide11.xml><?xml version="1.0" encoding="utf-8"?>
 <p:sld xmlns:a="http://schemas.openxmlformats.org/drawingml/2006/main" xmlns:r="http://schemas.openxmlformats.org/officeDocument/2006/relationships" xmlns:mc="http://schemas.openxmlformats.org/markup-compatibility/2006" xmlns:mv="urn:schemas-microsoft-com:mac:vml" xmlns:p="http://schemas.openxmlformats.org/presentationml/2006/main" xmlns:c="http://schemas.openxmlformats.org/drawingml/2006/chart" xmlns:dgm="http://schemas.openxmlformats.org/drawingml/2006/diagram" xmlns:o="urn:schemas-microsoft-com:office:office" xmlns:v="urn:schemas-microsoft-com:vml" xmlns:pvml="urn:schemas-microsoft-com:office:powerpoint" xmlns:com="http://schemas.openxmlformats.org/drawingml/2006/compatibility" xmlns:p14="http://schemas.microsoft.com/office/powerpoint/2010/main" xmlns:p15="http://schemas.microsoft.com/office/powerpoint/2012/main" xmlns:ahyp="http://schemas.microsoft.com/office/drawing/2018/hyperlinkcolor">
   <p:cSld>
-    <p:bg>
-      <p:bgPr>
-        <a:solidFill>
-          <a:schemeClr val="lt1"/>
-        </a:solidFill>
-      </p:bgPr>
-    </p:bg>
     <p:spTree>
       <p:nvGrpSpPr>
-        <p:cNvPr id="130" name="Shape 130"/>
+        <p:cNvPr id="132" name="Shape 132"/>
         <p:cNvGrpSpPr/>
         <p:nvPr/>
       </p:nvGrpSpPr>
@@ -12082,16 +12452,16 @@
       </p:grpSpPr>
       <p:sp>
         <p:nvSpPr>
-          <p:cNvPr id="131" name="Google Shape;131;p23"/>
+          <p:cNvPr id="133" name="Google Shape;133;p23"/>
           <p:cNvSpPr txBox="1"/>
           <p:nvPr>
-            <p:ph type="title"/>
+            <p:ph type="ctrTitle"/>
           </p:nvPr>
         </p:nvSpPr>
         <p:spPr>
           <a:xfrm>
-            <a:off x="311700" y="381300"/>
-            <a:ext cx="8520600" cy="623700"/>
+            <a:off x="311700" y="539725"/>
+            <a:ext cx="6561900" cy="702900"/>
           </a:xfrm>
           <a:prstGeom prst="rect">
             <a:avLst/>
@@ -12117,39 +12487,38 @@
               <a:spcAft>
                 <a:spcPts val="0"/>
               </a:spcAft>
-              <a:buSzPts val="2800"/>
-              <a:buNone/>
-            </a:pPr>
-            <a:r>
-              <a:rPr b="1" lang="pt-BR"/>
-              <a:t>Solução Completa - Arquitetura Cloud</a:t>
-            </a:r>
-            <a:endParaRPr b="1">
-              <a:highlight>
-                <a:schemeClr val="accent1"/>
-              </a:highlight>
-            </a:endParaRPr>
+              <a:buSzPts val="4000"/>
+              <a:buNone/>
+            </a:pPr>
+            <a:r>
+              <a:rPr b="1" lang="pt-BR" sz="3200">
+                <a:solidFill>
+                  <a:srgbClr val="002F4A"/>
+                </a:solidFill>
+              </a:rPr>
+              <a:t>O Projeto MVP</a:t>
+            </a:r>
+            <a:endParaRPr b="1"/>
           </a:p>
         </p:txBody>
       </p:sp>
       <p:pic>
         <p:nvPicPr>
-          <p:cNvPr id="132" name="Google Shape;132;p23"/>
+          <p:cNvPr descr="Interface gráfica do usuário, Aplicativo&#10;&#10;Descrição gerada automaticamente" id="134" name="Google Shape;134;p23"/>
           <p:cNvPicPr preferRelativeResize="0"/>
           <p:nvPr/>
         </p:nvPicPr>
-        <p:blipFill>
+        <p:blipFill rotWithShape="1">
           <a:blip r:embed="rId3">
             <a:alphaModFix/>
           </a:blip>
-          <a:stretch>
-            <a:fillRect/>
-          </a:stretch>
+          <a:srcRect b="0" l="0" r="0" t="0"/>
+          <a:stretch/>
         </p:blipFill>
         <p:spPr>
           <a:xfrm>
-            <a:off x="0" y="1278475"/>
-            <a:ext cx="9144003" cy="3865024"/>
+            <a:off x="6963325" y="-97200"/>
+            <a:ext cx="2814625" cy="1759150"/>
           </a:xfrm>
           <a:prstGeom prst="rect">
             <a:avLst/>
@@ -12180,7 +12549,7 @@
     </p:bg>
     <p:spTree>
       <p:nvGrpSpPr>
-        <p:cNvPr id="136" name="Shape 136"/>
+        <p:cNvPr id="138" name="Shape 138"/>
         <p:cNvGrpSpPr/>
         <p:nvPr/>
       </p:nvGrpSpPr>
@@ -12194,7 +12563,7 @@
       </p:grpSpPr>
       <p:sp>
         <p:nvSpPr>
-          <p:cNvPr id="137" name="Google Shape;137;p24"/>
+          <p:cNvPr id="139" name="Google Shape;139;p24"/>
           <p:cNvSpPr txBox="1"/>
           <p:nvPr>
             <p:ph type="title"/>
@@ -12234,7 +12603,7 @@
             </a:pPr>
             <a:r>
               <a:rPr b="1" lang="pt-BR"/>
-              <a:t>Solução Completa - Arquitetura Sistêmica</a:t>
+              <a:t>Solução Completa - Arquitetura Cloud</a:t>
             </a:r>
             <a:endParaRPr b="1">
               <a:highlight>
@@ -12246,7 +12615,7 @@
       </p:sp>
       <p:pic>
         <p:nvPicPr>
-          <p:cNvPr id="138" name="Google Shape;138;p24"/>
+          <p:cNvPr id="140" name="Google Shape;140;p24"/>
           <p:cNvPicPr preferRelativeResize="0"/>
           <p:nvPr/>
         </p:nvPicPr>
@@ -12260,8 +12629,8 @@
         </p:blipFill>
         <p:spPr>
           <a:xfrm>
-            <a:off x="2421150" y="1309800"/>
-            <a:ext cx="4648095" cy="3833698"/>
+            <a:off x="0" y="1290425"/>
+            <a:ext cx="9144003" cy="3853075"/>
           </a:xfrm>
           <a:prstGeom prst="rect">
             <a:avLst/>
@@ -12292,7 +12661,7 @@
     </p:bg>
     <p:spTree>
       <p:nvGrpSpPr>
-        <p:cNvPr id="142" name="Shape 142"/>
+        <p:cNvPr id="144" name="Shape 144"/>
         <p:cNvGrpSpPr/>
         <p:nvPr/>
       </p:nvGrpSpPr>
@@ -12306,7 +12675,7 @@
       </p:grpSpPr>
       <p:sp>
         <p:nvSpPr>
-          <p:cNvPr id="143" name="Google Shape;143;p25"/>
+          <p:cNvPr id="145" name="Google Shape;145;p25"/>
           <p:cNvSpPr txBox="1"/>
           <p:nvPr>
             <p:ph type="title"/>
@@ -12346,7 +12715,7 @@
             </a:pPr>
             <a:r>
               <a:rPr b="1" lang="pt-BR"/>
-              <a:t>Justificativas</a:t>
+              <a:t>Solução Completa - Arquitetura Sistêmica</a:t>
             </a:r>
             <a:endParaRPr b="1">
               <a:highlight>
@@ -12356,18 +12725,24 @@
           </a:p>
         </p:txBody>
       </p:sp>
-      <p:sp>
-        <p:nvSpPr>
-          <p:cNvPr id="144" name="Google Shape;144;p25"/>
-          <p:cNvSpPr txBox="1"/>
-          <p:nvPr>
-            <p:ph idx="1" type="body"/>
-          </p:nvPr>
-        </p:nvSpPr>
+      <p:pic>
+        <p:nvPicPr>
+          <p:cNvPr id="146" name="Google Shape;146;p25"/>
+          <p:cNvPicPr preferRelativeResize="0"/>
+          <p:nvPr/>
+        </p:nvPicPr>
+        <p:blipFill>
+          <a:blip r:embed="rId3">
+            <a:alphaModFix/>
+          </a:blip>
+          <a:stretch>
+            <a:fillRect/>
+          </a:stretch>
+        </p:blipFill>
         <p:spPr>
           <a:xfrm>
-            <a:off x="311700" y="1505700"/>
-            <a:ext cx="8520600" cy="3413400"/>
+            <a:off x="2341225" y="1272850"/>
+            <a:ext cx="4372849" cy="3870649"/>
           </a:xfrm>
           <a:prstGeom prst="rect">
             <a:avLst/>
@@ -12377,319 +12752,7 @@
             <a:noFill/>
           </a:ln>
         </p:spPr>
-        <p:txBody>
-          <a:bodyPr anchorCtr="0" anchor="t" bIns="91425" lIns="91425" spcFirstLastPara="1" rIns="91425" wrap="square" tIns="91425">
-            <a:normAutofit lnSpcReduction="10000"/>
-          </a:bodyPr>
-          <a:lstStyle/>
-          <a:p>
-            <a:pPr indent="0" lvl="0" marL="0" rtl="0" algn="l">
-              <a:lnSpc>
-                <a:spcPct val="115000"/>
-              </a:lnSpc>
-              <a:spcBef>
-                <a:spcPts val="0"/>
-              </a:spcBef>
-              <a:spcAft>
-                <a:spcPts val="0"/>
-              </a:spcAft>
-              <a:buSzPts val="1300"/>
-              <a:buNone/>
-            </a:pPr>
-            <a:r>
-              <a:rPr lang="pt-BR"/>
-              <a:t>Brainstorm no Miro - </a:t>
-            </a:r>
-            <a:r>
-              <a:rPr lang="pt-BR" u="sng">
-                <a:solidFill>
-                  <a:schemeClr val="hlink"/>
-                </a:solidFill>
-                <a:hlinkClick r:id="rId3"/>
-              </a:rPr>
-              <a:t>https://miro.com/app/board/uXjVKy9CWhY=/?share_link_id=426747425774</a:t>
-            </a:r>
-            <a:endParaRPr/>
-          </a:p>
-          <a:p>
-            <a:pPr indent="0" lvl="0" marL="0" rtl="0" algn="l">
-              <a:lnSpc>
-                <a:spcPct val="115000"/>
-              </a:lnSpc>
-              <a:spcBef>
-                <a:spcPts val="0"/>
-              </a:spcBef>
-              <a:spcAft>
-                <a:spcPts val="0"/>
-              </a:spcAft>
-              <a:buSzPts val="1300"/>
-              <a:buNone/>
-            </a:pPr>
-            <a:r>
-              <a:t/>
-            </a:r>
-            <a:endParaRPr/>
-          </a:p>
-          <a:p>
-            <a:pPr indent="0" lvl="0" marL="0" rtl="0" algn="l">
-              <a:lnSpc>
-                <a:spcPct val="115000"/>
-              </a:lnSpc>
-              <a:spcBef>
-                <a:spcPts val="0"/>
-              </a:spcBef>
-              <a:spcAft>
-                <a:spcPts val="0"/>
-              </a:spcAft>
-              <a:buSzPts val="1300"/>
-              <a:buNone/>
-            </a:pPr>
-            <a:r>
-              <a:rPr lang="pt-BR"/>
-              <a:t>Solução MVP vs Solução Completa</a:t>
-            </a:r>
-            <a:endParaRPr/>
-          </a:p>
-          <a:p>
-            <a:pPr indent="-311150" lvl="0" marL="457200" rtl="0" algn="l">
-              <a:lnSpc>
-                <a:spcPct val="115000"/>
-              </a:lnSpc>
-              <a:spcBef>
-                <a:spcPts val="0"/>
-              </a:spcBef>
-              <a:spcAft>
-                <a:spcPts val="0"/>
-              </a:spcAft>
-              <a:buSzPts val="1300"/>
-              <a:buChar char="●"/>
-            </a:pPr>
-            <a:r>
-              <a:rPr lang="pt-BR"/>
-              <a:t>Arquitetura monolito modular vs micro-serviços</a:t>
-            </a:r>
-            <a:endParaRPr/>
-          </a:p>
-          <a:p>
-            <a:pPr indent="0" lvl="0" marL="0" rtl="0" algn="l">
-              <a:lnSpc>
-                <a:spcPct val="115000"/>
-              </a:lnSpc>
-              <a:spcBef>
-                <a:spcPts val="0"/>
-              </a:spcBef>
-              <a:spcAft>
-                <a:spcPts val="0"/>
-              </a:spcAft>
-              <a:buSzPts val="1300"/>
-              <a:buNone/>
-            </a:pPr>
-            <a:r>
-              <a:t/>
-            </a:r>
-            <a:endParaRPr/>
-          </a:p>
-          <a:p>
-            <a:pPr indent="0" lvl="0" marL="0" rtl="0" algn="l">
-              <a:lnSpc>
-                <a:spcPct val="115000"/>
-              </a:lnSpc>
-              <a:spcBef>
-                <a:spcPts val="0"/>
-              </a:spcBef>
-              <a:spcAft>
-                <a:spcPts val="0"/>
-              </a:spcAft>
-              <a:buSzPts val="1300"/>
-              <a:buNone/>
-            </a:pPr>
-            <a:r>
-              <a:rPr lang="pt-BR"/>
-              <a:t>Abordagens, Padrões e estilos arquiteturais usados</a:t>
-            </a:r>
-            <a:endParaRPr/>
-          </a:p>
-          <a:p>
-            <a:pPr indent="-311150" lvl="0" marL="457200" rtl="0" algn="l">
-              <a:lnSpc>
-                <a:spcPct val="115000"/>
-              </a:lnSpc>
-              <a:spcBef>
-                <a:spcPts val="0"/>
-              </a:spcBef>
-              <a:spcAft>
-                <a:spcPts val="0"/>
-              </a:spcAft>
-              <a:buSzPts val="1300"/>
-              <a:buChar char="●"/>
-            </a:pPr>
-            <a:r>
-              <a:rPr lang="pt-BR"/>
-              <a:t>DDD</a:t>
-            </a:r>
-            <a:endParaRPr/>
-          </a:p>
-          <a:p>
-            <a:pPr indent="-311150" lvl="0" marL="457200" rtl="0" algn="l">
-              <a:lnSpc>
-                <a:spcPct val="115000"/>
-              </a:lnSpc>
-              <a:spcBef>
-                <a:spcPts val="0"/>
-              </a:spcBef>
-              <a:spcAft>
-                <a:spcPts val="0"/>
-              </a:spcAft>
-              <a:buSzPts val="1300"/>
-              <a:buChar char="●"/>
-            </a:pPr>
-            <a:r>
-              <a:rPr lang="pt-BR"/>
-              <a:t>TDD</a:t>
-            </a:r>
-            <a:endParaRPr/>
-          </a:p>
-          <a:p>
-            <a:pPr indent="-311150" lvl="0" marL="457200" rtl="0" algn="l">
-              <a:lnSpc>
-                <a:spcPct val="115000"/>
-              </a:lnSpc>
-              <a:spcBef>
-                <a:spcPts val="0"/>
-              </a:spcBef>
-              <a:spcAft>
-                <a:spcPts val="0"/>
-              </a:spcAft>
-              <a:buSzPts val="1300"/>
-              <a:buChar char="●"/>
-            </a:pPr>
-            <a:r>
-              <a:rPr lang="pt-BR"/>
-              <a:t>Clean Architecture</a:t>
-            </a:r>
-            <a:endParaRPr/>
-          </a:p>
-          <a:p>
-            <a:pPr indent="-311150" lvl="0" marL="457200" rtl="0" algn="l">
-              <a:lnSpc>
-                <a:spcPct val="115000"/>
-              </a:lnSpc>
-              <a:spcBef>
-                <a:spcPts val="0"/>
-              </a:spcBef>
-              <a:spcAft>
-                <a:spcPts val="0"/>
-              </a:spcAft>
-              <a:buSzPts val="1300"/>
-              <a:buChar char="●"/>
-            </a:pPr>
-            <a:r>
-              <a:rPr lang="pt-BR"/>
-              <a:t>Hexagonal Architecture (Ports &amp; Adapters)</a:t>
-            </a:r>
-            <a:endParaRPr/>
-          </a:p>
-          <a:p>
-            <a:pPr indent="-311150" lvl="0" marL="457200" rtl="0" algn="l">
-              <a:lnSpc>
-                <a:spcPct val="115000"/>
-              </a:lnSpc>
-              <a:spcBef>
-                <a:spcPts val="0"/>
-              </a:spcBef>
-              <a:spcAft>
-                <a:spcPts val="0"/>
-              </a:spcAft>
-              <a:buSzPts val="1300"/>
-              <a:buChar char="●"/>
-            </a:pPr>
-            <a:r>
-              <a:rPr lang="pt-BR"/>
-              <a:t>HTTP/S &amp; AMQP</a:t>
-            </a:r>
-            <a:endParaRPr/>
-          </a:p>
-          <a:p>
-            <a:pPr indent="-311150" lvl="0" marL="457200" rtl="0" algn="l">
-              <a:lnSpc>
-                <a:spcPct val="115000"/>
-              </a:lnSpc>
-              <a:spcBef>
-                <a:spcPts val="0"/>
-              </a:spcBef>
-              <a:spcAft>
-                <a:spcPts val="0"/>
-              </a:spcAft>
-              <a:buSzPts val="1300"/>
-              <a:buChar char="●"/>
-            </a:pPr>
-            <a:r>
-              <a:rPr lang="pt-BR"/>
-              <a:t>Retry Policy</a:t>
-            </a:r>
-            <a:endParaRPr/>
-          </a:p>
-          <a:p>
-            <a:pPr indent="-311150" lvl="0" marL="457200" rtl="0" algn="l">
-              <a:lnSpc>
-                <a:spcPct val="115000"/>
-              </a:lnSpc>
-              <a:spcBef>
-                <a:spcPts val="0"/>
-              </a:spcBef>
-              <a:spcAft>
-                <a:spcPts val="0"/>
-              </a:spcAft>
-              <a:buSzPts val="1300"/>
-              <a:buChar char="●"/>
-            </a:pPr>
-            <a:r>
-              <a:rPr lang="pt-BR"/>
-              <a:t>Outbox</a:t>
-            </a:r>
-            <a:endParaRPr/>
-          </a:p>
-          <a:p>
-            <a:pPr indent="-311150" lvl="0" marL="457200" rtl="0" algn="l">
-              <a:lnSpc>
-                <a:spcPct val="115000"/>
-              </a:lnSpc>
-              <a:spcBef>
-                <a:spcPts val="0"/>
-              </a:spcBef>
-              <a:spcAft>
-                <a:spcPts val="0"/>
-              </a:spcAft>
-              <a:buSzPts val="1300"/>
-              <a:buChar char="●"/>
-            </a:pPr>
-            <a:r>
-              <a:rPr lang="pt-BR"/>
-              <a:t>SAGA</a:t>
-            </a:r>
-            <a:endParaRPr/>
-          </a:p>
-          <a:p>
-            <a:pPr indent="0" lvl="0" marL="0" rtl="0" algn="l">
-              <a:lnSpc>
-                <a:spcPct val="115000"/>
-              </a:lnSpc>
-              <a:spcBef>
-                <a:spcPts val="0"/>
-              </a:spcBef>
-              <a:spcAft>
-                <a:spcPts val="0"/>
-              </a:spcAft>
-              <a:buSzPts val="1300"/>
-              <a:buNone/>
-            </a:pPr>
-            <a:r>
-              <a:t/>
-            </a:r>
-            <a:endParaRPr/>
-          </a:p>
-        </p:txBody>
-      </p:sp>
+      </p:pic>
     </p:spTree>
   </p:cSld>
   <p:clrMapOvr>
@@ -12710,7 +12773,7 @@
     </p:bg>
     <p:spTree>
       <p:nvGrpSpPr>
-        <p:cNvPr id="148" name="Shape 148"/>
+        <p:cNvPr id="150" name="Shape 150"/>
         <p:cNvGrpSpPr/>
         <p:nvPr/>
       </p:nvGrpSpPr>
@@ -12722,660 +12785,6 @@
           <a:chExt cx="0" cy="0"/>
         </a:xfrm>
       </p:grpSpPr>
-      <p:sp>
-        <p:nvSpPr>
-          <p:cNvPr id="149" name="Google Shape;149;p26"/>
-          <p:cNvSpPr txBox="1"/>
-          <p:nvPr>
-            <p:ph idx="1" type="body"/>
-          </p:nvPr>
-        </p:nvSpPr>
-        <p:spPr>
-          <a:xfrm>
-            <a:off x="311700" y="1505700"/>
-            <a:ext cx="3999900" cy="3076200"/>
-          </a:xfrm>
-          <a:prstGeom prst="rect">
-            <a:avLst/>
-          </a:prstGeom>
-          <a:noFill/>
-          <a:ln>
-            <a:noFill/>
-          </a:ln>
-        </p:spPr>
-        <p:txBody>
-          <a:bodyPr anchorCtr="0" anchor="t" bIns="91425" lIns="91425" spcFirstLastPara="1" rIns="91425" wrap="square" tIns="91425">
-            <a:normAutofit lnSpcReduction="20000"/>
-          </a:bodyPr>
-          <a:lstStyle/>
-          <a:p>
-            <a:pPr indent="0" lvl="0" marL="0" rtl="0" algn="l">
-              <a:lnSpc>
-                <a:spcPct val="115000"/>
-              </a:lnSpc>
-              <a:spcBef>
-                <a:spcPts val="0"/>
-              </a:spcBef>
-              <a:spcAft>
-                <a:spcPts val="0"/>
-              </a:spcAft>
-              <a:buSzPts val="1300"/>
-              <a:buNone/>
-            </a:pPr>
-            <a:r>
-              <a:rPr lang="pt-BR"/>
-              <a:t>Escalabilidade</a:t>
-            </a:r>
-            <a:endParaRPr/>
-          </a:p>
-          <a:p>
-            <a:pPr indent="-311150" lvl="0" marL="457200" rtl="0" algn="l">
-              <a:lnSpc>
-                <a:spcPct val="115000"/>
-              </a:lnSpc>
-              <a:spcBef>
-                <a:spcPts val="0"/>
-              </a:spcBef>
-              <a:spcAft>
-                <a:spcPts val="0"/>
-              </a:spcAft>
-              <a:buSzPts val="1300"/>
-              <a:buChar char="●"/>
-            </a:pPr>
-            <a:r>
-              <a:rPr lang="pt-BR"/>
-              <a:t>Micro-serviços</a:t>
-            </a:r>
-            <a:endParaRPr/>
-          </a:p>
-          <a:p>
-            <a:pPr indent="-311150" lvl="0" marL="457200" rtl="0" algn="l">
-              <a:lnSpc>
-                <a:spcPct val="115000"/>
-              </a:lnSpc>
-              <a:spcBef>
-                <a:spcPts val="0"/>
-              </a:spcBef>
-              <a:spcAft>
-                <a:spcPts val="0"/>
-              </a:spcAft>
-              <a:buSzPts val="1300"/>
-              <a:buChar char="●"/>
-            </a:pPr>
-            <a:r>
-              <a:rPr lang="pt-BR"/>
-              <a:t>Kubernetes</a:t>
-            </a:r>
-            <a:endParaRPr/>
-          </a:p>
-          <a:p>
-            <a:pPr indent="-311150" lvl="0" marL="457200" rtl="0" algn="l">
-              <a:lnSpc>
-                <a:spcPct val="115000"/>
-              </a:lnSpc>
-              <a:spcBef>
-                <a:spcPts val="0"/>
-              </a:spcBef>
-              <a:spcAft>
-                <a:spcPts val="0"/>
-              </a:spcAft>
-              <a:buSzPts val="1300"/>
-              <a:buChar char="●"/>
-            </a:pPr>
-            <a:r>
-              <a:rPr lang="pt-BR"/>
-              <a:t>Mensageria</a:t>
-            </a:r>
-            <a:endParaRPr/>
-          </a:p>
-          <a:p>
-            <a:pPr indent="0" lvl="0" marL="0" rtl="0" algn="l">
-              <a:lnSpc>
-                <a:spcPct val="115000"/>
-              </a:lnSpc>
-              <a:spcBef>
-                <a:spcPts val="0"/>
-              </a:spcBef>
-              <a:spcAft>
-                <a:spcPts val="0"/>
-              </a:spcAft>
-              <a:buSzPts val="1300"/>
-              <a:buNone/>
-            </a:pPr>
-            <a:r>
-              <a:t/>
-            </a:r>
-            <a:endParaRPr/>
-          </a:p>
-          <a:p>
-            <a:pPr indent="0" lvl="0" marL="0" rtl="0" algn="l">
-              <a:lnSpc>
-                <a:spcPct val="115000"/>
-              </a:lnSpc>
-              <a:spcBef>
-                <a:spcPts val="0"/>
-              </a:spcBef>
-              <a:spcAft>
-                <a:spcPts val="0"/>
-              </a:spcAft>
-              <a:buSzPts val="1300"/>
-              <a:buNone/>
-            </a:pPr>
-            <a:r>
-              <a:rPr lang="pt-BR"/>
-              <a:t>Segurança</a:t>
-            </a:r>
-            <a:endParaRPr/>
-          </a:p>
-          <a:p>
-            <a:pPr indent="-311150" lvl="0" marL="457200" rtl="0" algn="l">
-              <a:lnSpc>
-                <a:spcPct val="115000"/>
-              </a:lnSpc>
-              <a:spcBef>
-                <a:spcPts val="0"/>
-              </a:spcBef>
-              <a:spcAft>
-                <a:spcPts val="0"/>
-              </a:spcAft>
-              <a:buSzPts val="1300"/>
-              <a:buChar char="●"/>
-            </a:pPr>
-            <a:r>
-              <a:rPr lang="pt-BR"/>
-              <a:t>Tokens JWT</a:t>
-            </a:r>
-            <a:endParaRPr/>
-          </a:p>
-          <a:p>
-            <a:pPr indent="-311150" lvl="0" marL="457200" rtl="0" algn="l">
-              <a:lnSpc>
-                <a:spcPct val="115000"/>
-              </a:lnSpc>
-              <a:spcBef>
-                <a:spcPts val="0"/>
-              </a:spcBef>
-              <a:spcAft>
-                <a:spcPts val="0"/>
-              </a:spcAft>
-              <a:buSzPts val="1300"/>
-              <a:buChar char="●"/>
-            </a:pPr>
-            <a:r>
-              <a:rPr lang="pt-BR"/>
-              <a:t>MFA/2FA</a:t>
-            </a:r>
-            <a:endParaRPr/>
-          </a:p>
-          <a:p>
-            <a:pPr indent="0" lvl="0" marL="0" rtl="0" algn="l">
-              <a:lnSpc>
-                <a:spcPct val="115000"/>
-              </a:lnSpc>
-              <a:spcBef>
-                <a:spcPts val="0"/>
-              </a:spcBef>
-              <a:spcAft>
-                <a:spcPts val="0"/>
-              </a:spcAft>
-              <a:buSzPts val="1300"/>
-              <a:buNone/>
-            </a:pPr>
-            <a:r>
-              <a:t/>
-            </a:r>
-            <a:endParaRPr/>
-          </a:p>
-          <a:p>
-            <a:pPr indent="0" lvl="0" marL="0" rtl="0" algn="l">
-              <a:lnSpc>
-                <a:spcPct val="115000"/>
-              </a:lnSpc>
-              <a:spcBef>
-                <a:spcPts val="0"/>
-              </a:spcBef>
-              <a:spcAft>
-                <a:spcPts val="0"/>
-              </a:spcAft>
-              <a:buSzPts val="1300"/>
-              <a:buNone/>
-            </a:pPr>
-            <a:r>
-              <a:rPr lang="pt-BR"/>
-              <a:t>Qualidade e Automação</a:t>
-            </a:r>
-            <a:endParaRPr/>
-          </a:p>
-          <a:p>
-            <a:pPr indent="-311150" lvl="0" marL="457200" rtl="0" algn="l">
-              <a:lnSpc>
-                <a:spcPct val="115000"/>
-              </a:lnSpc>
-              <a:spcBef>
-                <a:spcPts val="0"/>
-              </a:spcBef>
-              <a:spcAft>
-                <a:spcPts val="0"/>
-              </a:spcAft>
-              <a:buSzPts val="1300"/>
-              <a:buChar char="●"/>
-            </a:pPr>
-            <a:r>
-              <a:rPr lang="pt-BR"/>
-              <a:t>Pipelines GitHub Actions</a:t>
-            </a:r>
-            <a:endParaRPr/>
-          </a:p>
-          <a:p>
-            <a:pPr indent="-311150" lvl="0" marL="457200" rtl="0" algn="l">
-              <a:lnSpc>
-                <a:spcPct val="115000"/>
-              </a:lnSpc>
-              <a:spcBef>
-                <a:spcPts val="0"/>
-              </a:spcBef>
-              <a:spcAft>
-                <a:spcPts val="0"/>
-              </a:spcAft>
-              <a:buSzPts val="1300"/>
-              <a:buChar char="●"/>
-            </a:pPr>
-            <a:r>
-              <a:rPr lang="pt-BR"/>
-              <a:t>Scripts Terraform</a:t>
-            </a:r>
-            <a:endParaRPr/>
-          </a:p>
-          <a:p>
-            <a:pPr indent="-311150" lvl="0" marL="457200" rtl="0" algn="l">
-              <a:lnSpc>
-                <a:spcPct val="115000"/>
-              </a:lnSpc>
-              <a:spcBef>
-                <a:spcPts val="0"/>
-              </a:spcBef>
-              <a:spcAft>
-                <a:spcPts val="0"/>
-              </a:spcAft>
-              <a:buSzPts val="1300"/>
-              <a:buChar char="●"/>
-            </a:pPr>
-            <a:r>
-              <a:rPr lang="pt-BR"/>
-              <a:t>SonarCloud</a:t>
-            </a:r>
-            <a:endParaRPr/>
-          </a:p>
-          <a:p>
-            <a:pPr indent="-311150" lvl="0" marL="457200" rtl="0" algn="l">
-              <a:lnSpc>
-                <a:spcPct val="115000"/>
-              </a:lnSpc>
-              <a:spcBef>
-                <a:spcPts val="0"/>
-              </a:spcBef>
-              <a:spcAft>
-                <a:spcPts val="0"/>
-              </a:spcAft>
-              <a:buSzPts val="1300"/>
-              <a:buChar char="●"/>
-            </a:pPr>
-            <a:r>
-              <a:rPr lang="pt-BR"/>
-              <a:t>OWASP Zap</a:t>
-            </a:r>
-            <a:endParaRPr/>
-          </a:p>
-        </p:txBody>
-      </p:sp>
-      <p:sp>
-        <p:nvSpPr>
-          <p:cNvPr id="150" name="Google Shape;150;p26"/>
-          <p:cNvSpPr txBox="1"/>
-          <p:nvPr>
-            <p:ph idx="2" type="body"/>
-          </p:nvPr>
-        </p:nvSpPr>
-        <p:spPr>
-          <a:xfrm>
-            <a:off x="4832400" y="1505700"/>
-            <a:ext cx="3999900" cy="3076200"/>
-          </a:xfrm>
-          <a:prstGeom prst="rect">
-            <a:avLst/>
-          </a:prstGeom>
-          <a:noFill/>
-          <a:ln>
-            <a:noFill/>
-          </a:ln>
-        </p:spPr>
-        <p:txBody>
-          <a:bodyPr anchorCtr="0" anchor="t" bIns="91425" lIns="91425" spcFirstLastPara="1" rIns="91425" wrap="square" tIns="91425">
-            <a:normAutofit fontScale="92500" lnSpcReduction="20000"/>
-          </a:bodyPr>
-          <a:lstStyle/>
-          <a:p>
-            <a:pPr indent="0" lvl="0" marL="0" rtl="0" algn="l">
-              <a:lnSpc>
-                <a:spcPct val="115000"/>
-              </a:lnSpc>
-              <a:spcBef>
-                <a:spcPts val="0"/>
-              </a:spcBef>
-              <a:spcAft>
-                <a:spcPts val="0"/>
-              </a:spcAft>
-              <a:buSzPct val="100000"/>
-              <a:buNone/>
-            </a:pPr>
-            <a:r>
-              <a:rPr lang="pt-BR"/>
-              <a:t>Tecnologias usadas</a:t>
-            </a:r>
-            <a:endParaRPr/>
-          </a:p>
-          <a:p>
-            <a:pPr indent="-304958" lvl="0" marL="457200" rtl="0" algn="l">
-              <a:lnSpc>
-                <a:spcPct val="115000"/>
-              </a:lnSpc>
-              <a:spcBef>
-                <a:spcPts val="0"/>
-              </a:spcBef>
-              <a:spcAft>
-                <a:spcPts val="0"/>
-              </a:spcAft>
-              <a:buSzPct val="100000"/>
-              <a:buChar char="●"/>
-            </a:pPr>
-            <a:r>
-              <a:rPr lang="pt-BR"/>
-              <a:t>C#/.NET</a:t>
-            </a:r>
-            <a:endParaRPr/>
-          </a:p>
-          <a:p>
-            <a:pPr indent="-304958" lvl="0" marL="457200" rtl="0" algn="l">
-              <a:lnSpc>
-                <a:spcPct val="115000"/>
-              </a:lnSpc>
-              <a:spcBef>
-                <a:spcPts val="0"/>
-              </a:spcBef>
-              <a:spcAft>
-                <a:spcPts val="0"/>
-              </a:spcAft>
-              <a:buSzPct val="100000"/>
-              <a:buChar char="●"/>
-            </a:pPr>
-            <a:r>
-              <a:rPr lang="pt-BR"/>
-              <a:t>DockerHub</a:t>
-            </a:r>
-            <a:endParaRPr/>
-          </a:p>
-          <a:p>
-            <a:pPr indent="-304958" lvl="0" marL="457200" rtl="0" algn="l">
-              <a:lnSpc>
-                <a:spcPct val="115000"/>
-              </a:lnSpc>
-              <a:spcBef>
-                <a:spcPts val="0"/>
-              </a:spcBef>
-              <a:spcAft>
-                <a:spcPts val="0"/>
-              </a:spcAft>
-              <a:buSzPct val="100000"/>
-              <a:buChar char="●"/>
-            </a:pPr>
-            <a:r>
-              <a:rPr lang="pt-BR"/>
-              <a:t>AWS</a:t>
-            </a:r>
-            <a:endParaRPr/>
-          </a:p>
-          <a:p>
-            <a:pPr indent="-293211" lvl="1" marL="914400" marR="0" rtl="0" algn="l">
-              <a:lnSpc>
-                <a:spcPct val="115000"/>
-              </a:lnSpc>
-              <a:spcBef>
-                <a:spcPts val="0"/>
-              </a:spcBef>
-              <a:spcAft>
-                <a:spcPts val="0"/>
-              </a:spcAft>
-              <a:buSzPct val="84615"/>
-              <a:buChar char="○"/>
-            </a:pPr>
-            <a:r>
-              <a:rPr lang="pt-BR" sz="1300"/>
-              <a:t>DynamoDB</a:t>
-            </a:r>
-            <a:endParaRPr sz="1300"/>
-          </a:p>
-          <a:p>
-            <a:pPr indent="-304958" lvl="1" marL="914400" marR="0" rtl="0" algn="l">
-              <a:lnSpc>
-                <a:spcPct val="115000"/>
-              </a:lnSpc>
-              <a:spcBef>
-                <a:spcPts val="0"/>
-              </a:spcBef>
-              <a:spcAft>
-                <a:spcPts val="0"/>
-              </a:spcAft>
-              <a:buSzPct val="100000"/>
-              <a:buChar char="○"/>
-            </a:pPr>
-            <a:r>
-              <a:rPr lang="pt-BR" sz="1300"/>
-              <a:t>DynamoDB DAX</a:t>
-            </a:r>
-            <a:endParaRPr sz="1300"/>
-          </a:p>
-          <a:p>
-            <a:pPr indent="-293211" lvl="1" marL="914400" marR="0" rtl="0" algn="l">
-              <a:lnSpc>
-                <a:spcPct val="115000"/>
-              </a:lnSpc>
-              <a:spcBef>
-                <a:spcPts val="0"/>
-              </a:spcBef>
-              <a:spcAft>
-                <a:spcPts val="0"/>
-              </a:spcAft>
-              <a:buSzPct val="84615"/>
-              <a:buChar char="○"/>
-            </a:pPr>
-            <a:r>
-              <a:rPr lang="pt-BR" sz="1300"/>
-              <a:t>EKS / Kubernetes</a:t>
-            </a:r>
-            <a:endParaRPr sz="1300"/>
-          </a:p>
-          <a:p>
-            <a:pPr indent="-293211" lvl="1" marL="914400" marR="0" rtl="0" algn="l">
-              <a:lnSpc>
-                <a:spcPct val="115000"/>
-              </a:lnSpc>
-              <a:spcBef>
-                <a:spcPts val="0"/>
-              </a:spcBef>
-              <a:spcAft>
-                <a:spcPts val="0"/>
-              </a:spcAft>
-              <a:buSzPct val="84615"/>
-              <a:buChar char="○"/>
-            </a:pPr>
-            <a:r>
-              <a:rPr lang="pt-BR" sz="1300"/>
-              <a:t>AWS Lambda</a:t>
-            </a:r>
-            <a:endParaRPr sz="1300"/>
-          </a:p>
-          <a:p>
-            <a:pPr indent="-293211" lvl="1" marL="914400" marR="0" rtl="0" algn="l">
-              <a:lnSpc>
-                <a:spcPct val="115000"/>
-              </a:lnSpc>
-              <a:spcBef>
-                <a:spcPts val="0"/>
-              </a:spcBef>
-              <a:spcAft>
-                <a:spcPts val="0"/>
-              </a:spcAft>
-              <a:buSzPct val="84615"/>
-              <a:buChar char="○"/>
-            </a:pPr>
-            <a:r>
-              <a:rPr lang="pt-BR" sz="1300"/>
-              <a:t>API Gateway</a:t>
-            </a:r>
-            <a:endParaRPr sz="1300"/>
-          </a:p>
-          <a:p>
-            <a:pPr indent="-293211" lvl="1" marL="914400" marR="0" rtl="0" algn="l">
-              <a:lnSpc>
-                <a:spcPct val="115000"/>
-              </a:lnSpc>
-              <a:spcBef>
-                <a:spcPts val="0"/>
-              </a:spcBef>
-              <a:spcAft>
-                <a:spcPts val="0"/>
-              </a:spcAft>
-              <a:buSzPct val="84615"/>
-              <a:buChar char="○"/>
-            </a:pPr>
-            <a:r>
-              <a:rPr lang="pt-BR" sz="1300"/>
-              <a:t>S3 Bucket</a:t>
-            </a:r>
-            <a:endParaRPr sz="1300"/>
-          </a:p>
-          <a:p>
-            <a:pPr indent="-293211" lvl="1" marL="914400" marR="0" rtl="0" algn="l">
-              <a:lnSpc>
-                <a:spcPct val="115000"/>
-              </a:lnSpc>
-              <a:spcBef>
-                <a:spcPts val="0"/>
-              </a:spcBef>
-              <a:spcAft>
-                <a:spcPts val="0"/>
-              </a:spcAft>
-              <a:buSzPct val="84615"/>
-              <a:buChar char="○"/>
-            </a:pPr>
-            <a:r>
-              <a:rPr lang="pt-BR" sz="1300"/>
-              <a:t>WAF</a:t>
-            </a:r>
-            <a:endParaRPr sz="1300"/>
-          </a:p>
-          <a:p>
-            <a:pPr indent="-293211" lvl="1" marL="914400" marR="0" rtl="0" algn="l">
-              <a:lnSpc>
-                <a:spcPct val="115000"/>
-              </a:lnSpc>
-              <a:spcBef>
-                <a:spcPts val="0"/>
-              </a:spcBef>
-              <a:spcAft>
-                <a:spcPts val="0"/>
-              </a:spcAft>
-              <a:buSzPct val="84615"/>
-              <a:buChar char="○"/>
-            </a:pPr>
-            <a:r>
-              <a:rPr lang="pt-BR" sz="1300"/>
-              <a:t>Route53</a:t>
-            </a:r>
-            <a:endParaRPr sz="1300"/>
-          </a:p>
-          <a:p>
-            <a:pPr indent="-293211" lvl="1" marL="914400" marR="0" rtl="0" algn="l">
-              <a:lnSpc>
-                <a:spcPct val="115000"/>
-              </a:lnSpc>
-              <a:spcBef>
-                <a:spcPts val="0"/>
-              </a:spcBef>
-              <a:spcAft>
-                <a:spcPts val="0"/>
-              </a:spcAft>
-              <a:buSzPct val="84615"/>
-              <a:buChar char="○"/>
-            </a:pPr>
-            <a:r>
-              <a:rPr lang="pt-BR" sz="1300"/>
-              <a:t>AWS Shield</a:t>
-            </a:r>
-            <a:endParaRPr sz="1300"/>
-          </a:p>
-          <a:p>
-            <a:pPr indent="-293211" lvl="1" marL="914400" marR="0" rtl="0" algn="l">
-              <a:lnSpc>
-                <a:spcPct val="115000"/>
-              </a:lnSpc>
-              <a:spcBef>
-                <a:spcPts val="0"/>
-              </a:spcBef>
-              <a:spcAft>
-                <a:spcPts val="0"/>
-              </a:spcAft>
-              <a:buSzPct val="84615"/>
-              <a:buChar char="○"/>
-            </a:pPr>
-            <a:r>
-              <a:rPr lang="pt-BR" sz="1300"/>
-              <a:t>CloudFront</a:t>
-            </a:r>
-            <a:endParaRPr sz="1300"/>
-          </a:p>
-          <a:p>
-            <a:pPr indent="-293211" lvl="1" marL="914400" marR="0" rtl="0" algn="l">
-              <a:lnSpc>
-                <a:spcPct val="115000"/>
-              </a:lnSpc>
-              <a:spcBef>
-                <a:spcPts val="0"/>
-              </a:spcBef>
-              <a:spcAft>
-                <a:spcPts val="0"/>
-              </a:spcAft>
-              <a:buSzPct val="84615"/>
-              <a:buChar char="○"/>
-            </a:pPr>
-            <a:r>
-              <a:rPr lang="pt-BR" sz="1300"/>
-              <a:t>NLB (Network Load Balancer)</a:t>
-            </a:r>
-            <a:endParaRPr sz="1300"/>
-          </a:p>
-          <a:p>
-            <a:pPr indent="-293211" lvl="1" marL="914400" marR="0" rtl="0" algn="l">
-              <a:lnSpc>
-                <a:spcPct val="115000"/>
-              </a:lnSpc>
-              <a:spcBef>
-                <a:spcPts val="0"/>
-              </a:spcBef>
-              <a:spcAft>
-                <a:spcPts val="0"/>
-              </a:spcAft>
-              <a:buSzPct val="84615"/>
-              <a:buChar char="○"/>
-            </a:pPr>
-            <a:r>
-              <a:rPr lang="pt-BR" sz="1300"/>
-              <a:t>VPC Link</a:t>
-            </a:r>
-            <a:endParaRPr/>
-          </a:p>
-        </p:txBody>
-      </p:sp>
       <p:sp>
         <p:nvSpPr>
           <p:cNvPr id="151" name="Google Shape;151;p26"/>
@@ -13418,7 +12827,7 @@
             </a:pPr>
             <a:r>
               <a:rPr b="1" lang="pt-BR"/>
-              <a:t>Justificativas</a:t>
+              <a:t>Solução Completa - SAGA Usuários</a:t>
             </a:r>
             <a:endParaRPr b="1">
               <a:highlight>
@@ -13428,6 +12837,34 @@
           </a:p>
         </p:txBody>
       </p:sp>
+      <p:pic>
+        <p:nvPicPr>
+          <p:cNvPr id="152" name="Google Shape;152;p26"/>
+          <p:cNvPicPr preferRelativeResize="0"/>
+          <p:nvPr/>
+        </p:nvPicPr>
+        <p:blipFill>
+          <a:blip r:embed="rId3">
+            <a:alphaModFix/>
+          </a:blip>
+          <a:stretch>
+            <a:fillRect/>
+          </a:stretch>
+        </p:blipFill>
+        <p:spPr>
+          <a:xfrm>
+            <a:off x="2286900" y="1278475"/>
+            <a:ext cx="4570199" cy="3865024"/>
+          </a:xfrm>
+          <a:prstGeom prst="rect">
+            <a:avLst/>
+          </a:prstGeom>
+          <a:noFill/>
+          <a:ln>
+            <a:noFill/>
+          </a:ln>
+        </p:spPr>
+      </p:pic>
     </p:spTree>
   </p:cSld>
   <p:clrMapOvr>
@@ -13439,9 +12876,16 @@
 <file path=ppt/slides/slide15.xml><?xml version="1.0" encoding="utf-8"?>
 <p:sld xmlns:a="http://schemas.openxmlformats.org/drawingml/2006/main" xmlns:r="http://schemas.openxmlformats.org/officeDocument/2006/relationships" xmlns:mc="http://schemas.openxmlformats.org/markup-compatibility/2006" xmlns:mv="urn:schemas-microsoft-com:mac:vml" xmlns:p="http://schemas.openxmlformats.org/presentationml/2006/main" xmlns:c="http://schemas.openxmlformats.org/drawingml/2006/chart" xmlns:dgm="http://schemas.openxmlformats.org/drawingml/2006/diagram" xmlns:o="urn:schemas-microsoft-com:office:office" xmlns:v="urn:schemas-microsoft-com:vml" xmlns:pvml="urn:schemas-microsoft-com:office:powerpoint" xmlns:com="http://schemas.openxmlformats.org/drawingml/2006/compatibility" xmlns:p14="http://schemas.microsoft.com/office/powerpoint/2010/main" xmlns:p15="http://schemas.microsoft.com/office/powerpoint/2012/main" xmlns:ahyp="http://schemas.microsoft.com/office/drawing/2018/hyperlinkcolor">
   <p:cSld>
+    <p:bg>
+      <p:bgPr>
+        <a:solidFill>
+          <a:schemeClr val="lt1"/>
+        </a:solidFill>
+      </p:bgPr>
+    </p:bg>
     <p:spTree>
       <p:nvGrpSpPr>
-        <p:cNvPr id="155" name="Shape 155"/>
+        <p:cNvPr id="156" name="Shape 156"/>
         <p:cNvGrpSpPr/>
         <p:nvPr/>
       </p:nvGrpSpPr>
@@ -13455,7 +12899,1381 @@
       </p:grpSpPr>
       <p:sp>
         <p:nvSpPr>
-          <p:cNvPr id="156" name="Google Shape;156;p27"/>
+          <p:cNvPr id="157" name="Google Shape;157;p27"/>
+          <p:cNvSpPr txBox="1"/>
+          <p:nvPr>
+            <p:ph type="title"/>
+          </p:nvPr>
+        </p:nvSpPr>
+        <p:spPr>
+          <a:xfrm>
+            <a:off x="311700" y="381300"/>
+            <a:ext cx="8520600" cy="623700"/>
+          </a:xfrm>
+          <a:prstGeom prst="rect">
+            <a:avLst/>
+          </a:prstGeom>
+          <a:noFill/>
+          <a:ln>
+            <a:noFill/>
+          </a:ln>
+        </p:spPr>
+        <p:txBody>
+          <a:bodyPr anchorCtr="0" anchor="t" bIns="91425" lIns="91425" spcFirstLastPara="1" rIns="91425" wrap="square" tIns="91425">
+            <a:normAutofit/>
+          </a:bodyPr>
+          <a:lstStyle/>
+          <a:p>
+            <a:pPr indent="0" lvl="0" marL="0" rtl="0" algn="l">
+              <a:lnSpc>
+                <a:spcPct val="100000"/>
+              </a:lnSpc>
+              <a:spcBef>
+                <a:spcPts val="0"/>
+              </a:spcBef>
+              <a:spcAft>
+                <a:spcPts val="0"/>
+              </a:spcAft>
+              <a:buSzPts val="2800"/>
+              <a:buNone/>
+            </a:pPr>
+            <a:r>
+              <a:rPr b="1" lang="pt-BR"/>
+              <a:t>Solução Completa - Estimativa de custos</a:t>
+            </a:r>
+            <a:endParaRPr b="1">
+              <a:highlight>
+                <a:schemeClr val="accent1"/>
+              </a:highlight>
+            </a:endParaRPr>
+          </a:p>
+        </p:txBody>
+      </p:sp>
+      <p:sp>
+        <p:nvSpPr>
+          <p:cNvPr id="158" name="Google Shape;158;p27"/>
+          <p:cNvSpPr txBox="1"/>
+          <p:nvPr/>
+        </p:nvSpPr>
+        <p:spPr>
+          <a:xfrm>
+            <a:off x="7390100" y="2817025"/>
+            <a:ext cx="1625700" cy="785100"/>
+          </a:xfrm>
+          <a:prstGeom prst="rect">
+            <a:avLst/>
+          </a:prstGeom>
+          <a:noFill/>
+          <a:ln>
+            <a:noFill/>
+          </a:ln>
+        </p:spPr>
+        <p:txBody>
+          <a:bodyPr anchorCtr="0" anchor="t" bIns="91425" lIns="91425" spcFirstLastPara="1" rIns="91425" wrap="square" tIns="91425">
+            <a:spAutoFit/>
+          </a:bodyPr>
+          <a:lstStyle/>
+          <a:p>
+            <a:pPr indent="0" lvl="0" marL="0" rtl="0" algn="l">
+              <a:spcBef>
+                <a:spcPts val="0"/>
+              </a:spcBef>
+              <a:spcAft>
+                <a:spcPts val="0"/>
+              </a:spcAft>
+              <a:buNone/>
+            </a:pPr>
+            <a:r>
+              <a:rPr b="1" lang="pt-BR" sz="1300">
+                <a:solidFill>
+                  <a:schemeClr val="dk2"/>
+                </a:solidFill>
+                <a:latin typeface="Roboto"/>
+                <a:ea typeface="Roboto"/>
+                <a:cs typeface="Roboto"/>
+                <a:sym typeface="Roboto"/>
+              </a:rPr>
+              <a:t>Dólar Hoje (25/07/2024): R$5,64</a:t>
+            </a:r>
+            <a:endParaRPr b="1" sz="1300">
+              <a:solidFill>
+                <a:schemeClr val="dk2"/>
+              </a:solidFill>
+              <a:latin typeface="Roboto"/>
+              <a:ea typeface="Roboto"/>
+              <a:cs typeface="Roboto"/>
+              <a:sym typeface="Roboto"/>
+            </a:endParaRPr>
+          </a:p>
+        </p:txBody>
+      </p:sp>
+      <p:pic>
+        <p:nvPicPr>
+          <p:cNvPr id="159" name="Google Shape;159;p27"/>
+          <p:cNvPicPr preferRelativeResize="0"/>
+          <p:nvPr/>
+        </p:nvPicPr>
+        <p:blipFill>
+          <a:blip r:embed="rId3">
+            <a:alphaModFix/>
+          </a:blip>
+          <a:stretch>
+            <a:fillRect/>
+          </a:stretch>
+        </p:blipFill>
+        <p:spPr>
+          <a:xfrm>
+            <a:off x="0" y="1293075"/>
+            <a:ext cx="7085300" cy="3850425"/>
+          </a:xfrm>
+          <a:prstGeom prst="rect">
+            <a:avLst/>
+          </a:prstGeom>
+          <a:noFill/>
+          <a:ln>
+            <a:noFill/>
+          </a:ln>
+        </p:spPr>
+      </p:pic>
+      <p:sp>
+        <p:nvSpPr>
+          <p:cNvPr id="160" name="Google Shape;160;p27"/>
+          <p:cNvSpPr txBox="1"/>
+          <p:nvPr/>
+        </p:nvSpPr>
+        <p:spPr>
+          <a:xfrm>
+            <a:off x="620750" y="4820400"/>
+            <a:ext cx="6954000" cy="323100"/>
+          </a:xfrm>
+          <a:prstGeom prst="rect">
+            <a:avLst/>
+          </a:prstGeom>
+          <a:noFill/>
+          <a:ln>
+            <a:noFill/>
+          </a:ln>
+        </p:spPr>
+        <p:txBody>
+          <a:bodyPr anchorCtr="0" anchor="t" bIns="91425" lIns="91425" spcFirstLastPara="1" rIns="91425" wrap="square" tIns="91425">
+            <a:spAutoFit/>
+          </a:bodyPr>
+          <a:lstStyle/>
+          <a:p>
+            <a:pPr indent="0" lvl="0" marL="0" rtl="0" algn="l">
+              <a:spcBef>
+                <a:spcPts val="0"/>
+              </a:spcBef>
+              <a:spcAft>
+                <a:spcPts val="0"/>
+              </a:spcAft>
+              <a:buNone/>
+            </a:pPr>
+            <a:r>
+              <a:rPr lang="pt-BR" sz="900" u="sng">
+                <a:solidFill>
+                  <a:schemeClr val="hlink"/>
+                </a:solidFill>
+                <a:hlinkClick r:id="rId4"/>
+              </a:rPr>
+              <a:t>https://calculator.aws/#/estimate?id=74746dd5c028eb530acc5167e1161cce3d2c8d11</a:t>
+            </a:r>
+            <a:endParaRPr sz="600">
+              <a:solidFill>
+                <a:schemeClr val="dk2"/>
+              </a:solidFill>
+              <a:latin typeface="Roboto"/>
+              <a:ea typeface="Roboto"/>
+              <a:cs typeface="Roboto"/>
+              <a:sym typeface="Roboto"/>
+            </a:endParaRPr>
+          </a:p>
+        </p:txBody>
+      </p:sp>
+    </p:spTree>
+  </p:cSld>
+  <p:clrMapOvr>
+    <a:masterClrMapping/>
+  </p:clrMapOvr>
+</p:sld>
+</file>
+
+<file path=ppt/slides/slide16.xml><?xml version="1.0" encoding="utf-8"?>
+<p:sld xmlns:a="http://schemas.openxmlformats.org/drawingml/2006/main" xmlns:r="http://schemas.openxmlformats.org/officeDocument/2006/relationships" xmlns:mc="http://schemas.openxmlformats.org/markup-compatibility/2006" xmlns:mv="urn:schemas-microsoft-com:mac:vml" xmlns:p="http://schemas.openxmlformats.org/presentationml/2006/main" xmlns:c="http://schemas.openxmlformats.org/drawingml/2006/chart" xmlns:dgm="http://schemas.openxmlformats.org/drawingml/2006/diagram" xmlns:o="urn:schemas-microsoft-com:office:office" xmlns:v="urn:schemas-microsoft-com:vml" xmlns:pvml="urn:schemas-microsoft-com:office:powerpoint" xmlns:com="http://schemas.openxmlformats.org/drawingml/2006/compatibility" xmlns:p14="http://schemas.microsoft.com/office/powerpoint/2010/main" xmlns:p15="http://schemas.microsoft.com/office/powerpoint/2012/main" xmlns:ahyp="http://schemas.microsoft.com/office/drawing/2018/hyperlinkcolor">
+  <p:cSld>
+    <p:bg>
+      <p:bgPr>
+        <a:solidFill>
+          <a:schemeClr val="lt1"/>
+        </a:solidFill>
+      </p:bgPr>
+    </p:bg>
+    <p:spTree>
+      <p:nvGrpSpPr>
+        <p:cNvPr id="164" name="Shape 164"/>
+        <p:cNvGrpSpPr/>
+        <p:nvPr/>
+      </p:nvGrpSpPr>
+      <p:grpSpPr>
+        <a:xfrm>
+          <a:off x="0" y="0"/>
+          <a:ext cx="0" cy="0"/>
+          <a:chOff x="0" y="0"/>
+          <a:chExt cx="0" cy="0"/>
+        </a:xfrm>
+      </p:grpSpPr>
+      <p:sp>
+        <p:nvSpPr>
+          <p:cNvPr id="165" name="Google Shape;165;p28"/>
+          <p:cNvSpPr txBox="1"/>
+          <p:nvPr>
+            <p:ph type="title"/>
+          </p:nvPr>
+        </p:nvSpPr>
+        <p:spPr>
+          <a:xfrm>
+            <a:off x="311700" y="381300"/>
+            <a:ext cx="8520600" cy="623700"/>
+          </a:xfrm>
+          <a:prstGeom prst="rect">
+            <a:avLst/>
+          </a:prstGeom>
+          <a:noFill/>
+          <a:ln>
+            <a:noFill/>
+          </a:ln>
+        </p:spPr>
+        <p:txBody>
+          <a:bodyPr anchorCtr="0" anchor="t" bIns="91425" lIns="91425" spcFirstLastPara="1" rIns="91425" wrap="square" tIns="91425">
+            <a:normAutofit/>
+          </a:bodyPr>
+          <a:lstStyle/>
+          <a:p>
+            <a:pPr indent="0" lvl="0" marL="0" rtl="0" algn="l">
+              <a:lnSpc>
+                <a:spcPct val="100000"/>
+              </a:lnSpc>
+              <a:spcBef>
+                <a:spcPts val="0"/>
+              </a:spcBef>
+              <a:spcAft>
+                <a:spcPts val="0"/>
+              </a:spcAft>
+              <a:buSzPts val="2800"/>
+              <a:buNone/>
+            </a:pPr>
+            <a:r>
+              <a:rPr b="1" lang="pt-BR"/>
+              <a:t>Justificativas</a:t>
+            </a:r>
+            <a:endParaRPr b="1">
+              <a:highlight>
+                <a:schemeClr val="accent1"/>
+              </a:highlight>
+            </a:endParaRPr>
+          </a:p>
+        </p:txBody>
+      </p:sp>
+      <p:sp>
+        <p:nvSpPr>
+          <p:cNvPr id="166" name="Google Shape;166;p28"/>
+          <p:cNvSpPr txBox="1"/>
+          <p:nvPr>
+            <p:ph idx="1" type="body"/>
+          </p:nvPr>
+        </p:nvSpPr>
+        <p:spPr>
+          <a:xfrm>
+            <a:off x="311700" y="1505700"/>
+            <a:ext cx="8520600" cy="3413400"/>
+          </a:xfrm>
+          <a:prstGeom prst="rect">
+            <a:avLst/>
+          </a:prstGeom>
+          <a:noFill/>
+          <a:ln>
+            <a:noFill/>
+          </a:ln>
+        </p:spPr>
+        <p:txBody>
+          <a:bodyPr anchorCtr="0" anchor="t" bIns="91425" lIns="91425" spcFirstLastPara="1" rIns="91425" wrap="square" tIns="91425">
+            <a:normAutofit lnSpcReduction="10000"/>
+          </a:bodyPr>
+          <a:lstStyle/>
+          <a:p>
+            <a:pPr indent="0" lvl="0" marL="0" rtl="0" algn="l">
+              <a:lnSpc>
+                <a:spcPct val="115000"/>
+              </a:lnSpc>
+              <a:spcBef>
+                <a:spcPts val="0"/>
+              </a:spcBef>
+              <a:spcAft>
+                <a:spcPts val="0"/>
+              </a:spcAft>
+              <a:buSzPts val="1300"/>
+              <a:buNone/>
+            </a:pPr>
+            <a:r>
+              <a:rPr lang="pt-BR"/>
+              <a:t>Brainstorm no Miro - </a:t>
+            </a:r>
+            <a:r>
+              <a:rPr lang="pt-BR" u="sng">
+                <a:solidFill>
+                  <a:schemeClr val="hlink"/>
+                </a:solidFill>
+                <a:hlinkClick r:id="rId3"/>
+              </a:rPr>
+              <a:t>https://miro.com/app/board/uXjVKy9CWhY=/?share_link_id=426747425774</a:t>
+            </a:r>
+            <a:endParaRPr/>
+          </a:p>
+          <a:p>
+            <a:pPr indent="0" lvl="0" marL="0" rtl="0" algn="l">
+              <a:lnSpc>
+                <a:spcPct val="115000"/>
+              </a:lnSpc>
+              <a:spcBef>
+                <a:spcPts val="0"/>
+              </a:spcBef>
+              <a:spcAft>
+                <a:spcPts val="0"/>
+              </a:spcAft>
+              <a:buSzPts val="1300"/>
+              <a:buNone/>
+            </a:pPr>
+            <a:r>
+              <a:t/>
+            </a:r>
+            <a:endParaRPr/>
+          </a:p>
+          <a:p>
+            <a:pPr indent="0" lvl="0" marL="0" rtl="0" algn="l">
+              <a:lnSpc>
+                <a:spcPct val="115000"/>
+              </a:lnSpc>
+              <a:spcBef>
+                <a:spcPts val="0"/>
+              </a:spcBef>
+              <a:spcAft>
+                <a:spcPts val="0"/>
+              </a:spcAft>
+              <a:buSzPts val="1300"/>
+              <a:buNone/>
+            </a:pPr>
+            <a:r>
+              <a:rPr lang="pt-BR"/>
+              <a:t>Solução MVP vs Solução Completa</a:t>
+            </a:r>
+            <a:endParaRPr/>
+          </a:p>
+          <a:p>
+            <a:pPr indent="-311150" lvl="0" marL="457200" rtl="0" algn="l">
+              <a:lnSpc>
+                <a:spcPct val="115000"/>
+              </a:lnSpc>
+              <a:spcBef>
+                <a:spcPts val="0"/>
+              </a:spcBef>
+              <a:spcAft>
+                <a:spcPts val="0"/>
+              </a:spcAft>
+              <a:buSzPts val="1300"/>
+              <a:buChar char="●"/>
+            </a:pPr>
+            <a:r>
+              <a:rPr lang="pt-BR"/>
+              <a:t>Arquitetura monolito modular vs micro-serviços</a:t>
+            </a:r>
+            <a:endParaRPr/>
+          </a:p>
+          <a:p>
+            <a:pPr indent="0" lvl="0" marL="0" rtl="0" algn="l">
+              <a:lnSpc>
+                <a:spcPct val="115000"/>
+              </a:lnSpc>
+              <a:spcBef>
+                <a:spcPts val="0"/>
+              </a:spcBef>
+              <a:spcAft>
+                <a:spcPts val="0"/>
+              </a:spcAft>
+              <a:buSzPts val="1300"/>
+              <a:buNone/>
+            </a:pPr>
+            <a:r>
+              <a:t/>
+            </a:r>
+            <a:endParaRPr/>
+          </a:p>
+          <a:p>
+            <a:pPr indent="0" lvl="0" marL="0" rtl="0" algn="l">
+              <a:lnSpc>
+                <a:spcPct val="115000"/>
+              </a:lnSpc>
+              <a:spcBef>
+                <a:spcPts val="0"/>
+              </a:spcBef>
+              <a:spcAft>
+                <a:spcPts val="0"/>
+              </a:spcAft>
+              <a:buSzPts val="1300"/>
+              <a:buNone/>
+            </a:pPr>
+            <a:r>
+              <a:rPr lang="pt-BR"/>
+              <a:t>Abordagens, Padrões e estilos arquiteturais usados</a:t>
+            </a:r>
+            <a:endParaRPr/>
+          </a:p>
+          <a:p>
+            <a:pPr indent="-311150" lvl="0" marL="457200" rtl="0" algn="l">
+              <a:lnSpc>
+                <a:spcPct val="115000"/>
+              </a:lnSpc>
+              <a:spcBef>
+                <a:spcPts val="0"/>
+              </a:spcBef>
+              <a:spcAft>
+                <a:spcPts val="0"/>
+              </a:spcAft>
+              <a:buSzPts val="1300"/>
+              <a:buChar char="●"/>
+            </a:pPr>
+            <a:r>
+              <a:rPr lang="pt-BR"/>
+              <a:t>DDD</a:t>
+            </a:r>
+            <a:endParaRPr/>
+          </a:p>
+          <a:p>
+            <a:pPr indent="-311150" lvl="0" marL="457200" rtl="0" algn="l">
+              <a:lnSpc>
+                <a:spcPct val="115000"/>
+              </a:lnSpc>
+              <a:spcBef>
+                <a:spcPts val="0"/>
+              </a:spcBef>
+              <a:spcAft>
+                <a:spcPts val="0"/>
+              </a:spcAft>
+              <a:buSzPts val="1300"/>
+              <a:buChar char="●"/>
+            </a:pPr>
+            <a:r>
+              <a:rPr lang="pt-BR"/>
+              <a:t>TDD</a:t>
+            </a:r>
+            <a:endParaRPr/>
+          </a:p>
+          <a:p>
+            <a:pPr indent="-311150" lvl="0" marL="457200" rtl="0" algn="l">
+              <a:lnSpc>
+                <a:spcPct val="115000"/>
+              </a:lnSpc>
+              <a:spcBef>
+                <a:spcPts val="0"/>
+              </a:spcBef>
+              <a:spcAft>
+                <a:spcPts val="0"/>
+              </a:spcAft>
+              <a:buSzPts val="1300"/>
+              <a:buChar char="●"/>
+            </a:pPr>
+            <a:r>
+              <a:rPr lang="pt-BR"/>
+              <a:t>Clean Architecture</a:t>
+            </a:r>
+            <a:endParaRPr/>
+          </a:p>
+          <a:p>
+            <a:pPr indent="-311150" lvl="0" marL="457200" rtl="0" algn="l">
+              <a:lnSpc>
+                <a:spcPct val="115000"/>
+              </a:lnSpc>
+              <a:spcBef>
+                <a:spcPts val="0"/>
+              </a:spcBef>
+              <a:spcAft>
+                <a:spcPts val="0"/>
+              </a:spcAft>
+              <a:buSzPts val="1300"/>
+              <a:buChar char="●"/>
+            </a:pPr>
+            <a:r>
+              <a:rPr lang="pt-BR"/>
+              <a:t>Hexagonal Architecture (Ports &amp; Adapters)</a:t>
+            </a:r>
+            <a:endParaRPr/>
+          </a:p>
+          <a:p>
+            <a:pPr indent="-311150" lvl="0" marL="457200" rtl="0" algn="l">
+              <a:lnSpc>
+                <a:spcPct val="115000"/>
+              </a:lnSpc>
+              <a:spcBef>
+                <a:spcPts val="0"/>
+              </a:spcBef>
+              <a:spcAft>
+                <a:spcPts val="0"/>
+              </a:spcAft>
+              <a:buSzPts val="1300"/>
+              <a:buChar char="●"/>
+            </a:pPr>
+            <a:r>
+              <a:rPr lang="pt-BR"/>
+              <a:t>HTTP/S &amp; AMQP</a:t>
+            </a:r>
+            <a:endParaRPr/>
+          </a:p>
+          <a:p>
+            <a:pPr indent="-311150" lvl="0" marL="457200" rtl="0" algn="l">
+              <a:lnSpc>
+                <a:spcPct val="115000"/>
+              </a:lnSpc>
+              <a:spcBef>
+                <a:spcPts val="0"/>
+              </a:spcBef>
+              <a:spcAft>
+                <a:spcPts val="0"/>
+              </a:spcAft>
+              <a:buSzPts val="1300"/>
+              <a:buChar char="●"/>
+            </a:pPr>
+            <a:r>
+              <a:rPr lang="pt-BR"/>
+              <a:t>Retry Policy</a:t>
+            </a:r>
+            <a:endParaRPr/>
+          </a:p>
+          <a:p>
+            <a:pPr indent="-311150" lvl="0" marL="457200" rtl="0" algn="l">
+              <a:lnSpc>
+                <a:spcPct val="115000"/>
+              </a:lnSpc>
+              <a:spcBef>
+                <a:spcPts val="0"/>
+              </a:spcBef>
+              <a:spcAft>
+                <a:spcPts val="0"/>
+              </a:spcAft>
+              <a:buSzPts val="1300"/>
+              <a:buChar char="●"/>
+            </a:pPr>
+            <a:r>
+              <a:rPr lang="pt-BR"/>
+              <a:t>Outbox</a:t>
+            </a:r>
+            <a:endParaRPr/>
+          </a:p>
+          <a:p>
+            <a:pPr indent="-311150" lvl="0" marL="457200" rtl="0" algn="l">
+              <a:lnSpc>
+                <a:spcPct val="115000"/>
+              </a:lnSpc>
+              <a:spcBef>
+                <a:spcPts val="0"/>
+              </a:spcBef>
+              <a:spcAft>
+                <a:spcPts val="0"/>
+              </a:spcAft>
+              <a:buSzPts val="1300"/>
+              <a:buChar char="●"/>
+            </a:pPr>
+            <a:r>
+              <a:rPr lang="pt-BR"/>
+              <a:t>SAGA</a:t>
+            </a:r>
+            <a:endParaRPr/>
+          </a:p>
+          <a:p>
+            <a:pPr indent="0" lvl="0" marL="0" rtl="0" algn="l">
+              <a:lnSpc>
+                <a:spcPct val="115000"/>
+              </a:lnSpc>
+              <a:spcBef>
+                <a:spcPts val="0"/>
+              </a:spcBef>
+              <a:spcAft>
+                <a:spcPts val="0"/>
+              </a:spcAft>
+              <a:buSzPts val="1300"/>
+              <a:buNone/>
+            </a:pPr>
+            <a:r>
+              <a:t/>
+            </a:r>
+            <a:endParaRPr/>
+          </a:p>
+        </p:txBody>
+      </p:sp>
+    </p:spTree>
+  </p:cSld>
+  <p:clrMapOvr>
+    <a:masterClrMapping/>
+  </p:clrMapOvr>
+</p:sld>
+</file>
+
+<file path=ppt/slides/slide17.xml><?xml version="1.0" encoding="utf-8"?>
+<p:sld xmlns:a="http://schemas.openxmlformats.org/drawingml/2006/main" xmlns:r="http://schemas.openxmlformats.org/officeDocument/2006/relationships" xmlns:mc="http://schemas.openxmlformats.org/markup-compatibility/2006" xmlns:mv="urn:schemas-microsoft-com:mac:vml" xmlns:p="http://schemas.openxmlformats.org/presentationml/2006/main" xmlns:c="http://schemas.openxmlformats.org/drawingml/2006/chart" xmlns:dgm="http://schemas.openxmlformats.org/drawingml/2006/diagram" xmlns:o="urn:schemas-microsoft-com:office:office" xmlns:v="urn:schemas-microsoft-com:vml" xmlns:pvml="urn:schemas-microsoft-com:office:powerpoint" xmlns:com="http://schemas.openxmlformats.org/drawingml/2006/compatibility" xmlns:p14="http://schemas.microsoft.com/office/powerpoint/2010/main" xmlns:p15="http://schemas.microsoft.com/office/powerpoint/2012/main" xmlns:ahyp="http://schemas.microsoft.com/office/drawing/2018/hyperlinkcolor">
+  <p:cSld>
+    <p:bg>
+      <p:bgPr>
+        <a:solidFill>
+          <a:schemeClr val="lt1"/>
+        </a:solidFill>
+      </p:bgPr>
+    </p:bg>
+    <p:spTree>
+      <p:nvGrpSpPr>
+        <p:cNvPr id="170" name="Shape 170"/>
+        <p:cNvGrpSpPr/>
+        <p:nvPr/>
+      </p:nvGrpSpPr>
+      <p:grpSpPr>
+        <a:xfrm>
+          <a:off x="0" y="0"/>
+          <a:ext cx="0" cy="0"/>
+          <a:chOff x="0" y="0"/>
+          <a:chExt cx="0" cy="0"/>
+        </a:xfrm>
+      </p:grpSpPr>
+      <p:sp>
+        <p:nvSpPr>
+          <p:cNvPr id="171" name="Google Shape;171;p29"/>
+          <p:cNvSpPr txBox="1"/>
+          <p:nvPr>
+            <p:ph idx="1" type="body"/>
+          </p:nvPr>
+        </p:nvSpPr>
+        <p:spPr>
+          <a:xfrm>
+            <a:off x="311700" y="1505700"/>
+            <a:ext cx="3999900" cy="3076200"/>
+          </a:xfrm>
+          <a:prstGeom prst="rect">
+            <a:avLst/>
+          </a:prstGeom>
+          <a:noFill/>
+          <a:ln>
+            <a:noFill/>
+          </a:ln>
+        </p:spPr>
+        <p:txBody>
+          <a:bodyPr anchorCtr="0" anchor="t" bIns="91425" lIns="91425" spcFirstLastPara="1" rIns="91425" wrap="square" tIns="91425">
+            <a:normAutofit lnSpcReduction="20000"/>
+          </a:bodyPr>
+          <a:lstStyle/>
+          <a:p>
+            <a:pPr indent="0" lvl="0" marL="0" rtl="0" algn="l">
+              <a:lnSpc>
+                <a:spcPct val="115000"/>
+              </a:lnSpc>
+              <a:spcBef>
+                <a:spcPts val="0"/>
+              </a:spcBef>
+              <a:spcAft>
+                <a:spcPts val="0"/>
+              </a:spcAft>
+              <a:buSzPts val="1300"/>
+              <a:buNone/>
+            </a:pPr>
+            <a:r>
+              <a:rPr lang="pt-BR"/>
+              <a:t>Escalabilidade</a:t>
+            </a:r>
+            <a:endParaRPr/>
+          </a:p>
+          <a:p>
+            <a:pPr indent="-311150" lvl="0" marL="457200" rtl="0" algn="l">
+              <a:lnSpc>
+                <a:spcPct val="115000"/>
+              </a:lnSpc>
+              <a:spcBef>
+                <a:spcPts val="0"/>
+              </a:spcBef>
+              <a:spcAft>
+                <a:spcPts val="0"/>
+              </a:spcAft>
+              <a:buSzPts val="1300"/>
+              <a:buChar char="●"/>
+            </a:pPr>
+            <a:r>
+              <a:rPr lang="pt-BR"/>
+              <a:t>Micro-serviços</a:t>
+            </a:r>
+            <a:endParaRPr/>
+          </a:p>
+          <a:p>
+            <a:pPr indent="-311150" lvl="0" marL="457200" rtl="0" algn="l">
+              <a:lnSpc>
+                <a:spcPct val="115000"/>
+              </a:lnSpc>
+              <a:spcBef>
+                <a:spcPts val="0"/>
+              </a:spcBef>
+              <a:spcAft>
+                <a:spcPts val="0"/>
+              </a:spcAft>
+              <a:buSzPts val="1300"/>
+              <a:buChar char="●"/>
+            </a:pPr>
+            <a:r>
+              <a:rPr lang="pt-BR"/>
+              <a:t>Kubernetes</a:t>
+            </a:r>
+            <a:endParaRPr/>
+          </a:p>
+          <a:p>
+            <a:pPr indent="-311150" lvl="0" marL="457200" rtl="0" algn="l">
+              <a:lnSpc>
+                <a:spcPct val="115000"/>
+              </a:lnSpc>
+              <a:spcBef>
+                <a:spcPts val="0"/>
+              </a:spcBef>
+              <a:spcAft>
+                <a:spcPts val="0"/>
+              </a:spcAft>
+              <a:buSzPts val="1300"/>
+              <a:buChar char="●"/>
+            </a:pPr>
+            <a:r>
+              <a:rPr lang="pt-BR"/>
+              <a:t>Mensageria</a:t>
+            </a:r>
+            <a:endParaRPr/>
+          </a:p>
+          <a:p>
+            <a:pPr indent="0" lvl="0" marL="0" rtl="0" algn="l">
+              <a:lnSpc>
+                <a:spcPct val="115000"/>
+              </a:lnSpc>
+              <a:spcBef>
+                <a:spcPts val="0"/>
+              </a:spcBef>
+              <a:spcAft>
+                <a:spcPts val="0"/>
+              </a:spcAft>
+              <a:buSzPts val="1300"/>
+              <a:buNone/>
+            </a:pPr>
+            <a:r>
+              <a:t/>
+            </a:r>
+            <a:endParaRPr/>
+          </a:p>
+          <a:p>
+            <a:pPr indent="0" lvl="0" marL="0" rtl="0" algn="l">
+              <a:lnSpc>
+                <a:spcPct val="115000"/>
+              </a:lnSpc>
+              <a:spcBef>
+                <a:spcPts val="0"/>
+              </a:spcBef>
+              <a:spcAft>
+                <a:spcPts val="0"/>
+              </a:spcAft>
+              <a:buSzPts val="1300"/>
+              <a:buNone/>
+            </a:pPr>
+            <a:r>
+              <a:rPr lang="pt-BR"/>
+              <a:t>Segurança</a:t>
+            </a:r>
+            <a:endParaRPr/>
+          </a:p>
+          <a:p>
+            <a:pPr indent="-311150" lvl="0" marL="457200" rtl="0" algn="l">
+              <a:lnSpc>
+                <a:spcPct val="115000"/>
+              </a:lnSpc>
+              <a:spcBef>
+                <a:spcPts val="0"/>
+              </a:spcBef>
+              <a:spcAft>
+                <a:spcPts val="0"/>
+              </a:spcAft>
+              <a:buSzPts val="1300"/>
+              <a:buChar char="●"/>
+            </a:pPr>
+            <a:r>
+              <a:rPr lang="pt-BR"/>
+              <a:t>Tokens JWT</a:t>
+            </a:r>
+            <a:endParaRPr/>
+          </a:p>
+          <a:p>
+            <a:pPr indent="-311150" lvl="0" marL="457200" rtl="0" algn="l">
+              <a:lnSpc>
+                <a:spcPct val="115000"/>
+              </a:lnSpc>
+              <a:spcBef>
+                <a:spcPts val="0"/>
+              </a:spcBef>
+              <a:spcAft>
+                <a:spcPts val="0"/>
+              </a:spcAft>
+              <a:buSzPts val="1300"/>
+              <a:buChar char="●"/>
+            </a:pPr>
+            <a:r>
+              <a:rPr lang="pt-BR"/>
+              <a:t>MFA/2FA</a:t>
+            </a:r>
+            <a:endParaRPr/>
+          </a:p>
+          <a:p>
+            <a:pPr indent="0" lvl="0" marL="0" rtl="0" algn="l">
+              <a:lnSpc>
+                <a:spcPct val="115000"/>
+              </a:lnSpc>
+              <a:spcBef>
+                <a:spcPts val="0"/>
+              </a:spcBef>
+              <a:spcAft>
+                <a:spcPts val="0"/>
+              </a:spcAft>
+              <a:buSzPts val="1300"/>
+              <a:buNone/>
+            </a:pPr>
+            <a:r>
+              <a:t/>
+            </a:r>
+            <a:endParaRPr/>
+          </a:p>
+          <a:p>
+            <a:pPr indent="0" lvl="0" marL="0" rtl="0" algn="l">
+              <a:lnSpc>
+                <a:spcPct val="115000"/>
+              </a:lnSpc>
+              <a:spcBef>
+                <a:spcPts val="0"/>
+              </a:spcBef>
+              <a:spcAft>
+                <a:spcPts val="0"/>
+              </a:spcAft>
+              <a:buSzPts val="1300"/>
+              <a:buNone/>
+            </a:pPr>
+            <a:r>
+              <a:rPr lang="pt-BR"/>
+              <a:t>Qualidade e Automação</a:t>
+            </a:r>
+            <a:endParaRPr/>
+          </a:p>
+          <a:p>
+            <a:pPr indent="-311150" lvl="0" marL="457200" rtl="0" algn="l">
+              <a:lnSpc>
+                <a:spcPct val="115000"/>
+              </a:lnSpc>
+              <a:spcBef>
+                <a:spcPts val="0"/>
+              </a:spcBef>
+              <a:spcAft>
+                <a:spcPts val="0"/>
+              </a:spcAft>
+              <a:buSzPts val="1300"/>
+              <a:buChar char="●"/>
+            </a:pPr>
+            <a:r>
+              <a:rPr lang="pt-BR"/>
+              <a:t>Pipelines GitHub Actions</a:t>
+            </a:r>
+            <a:endParaRPr/>
+          </a:p>
+          <a:p>
+            <a:pPr indent="-311150" lvl="0" marL="457200" rtl="0" algn="l">
+              <a:lnSpc>
+                <a:spcPct val="115000"/>
+              </a:lnSpc>
+              <a:spcBef>
+                <a:spcPts val="0"/>
+              </a:spcBef>
+              <a:spcAft>
+                <a:spcPts val="0"/>
+              </a:spcAft>
+              <a:buSzPts val="1300"/>
+              <a:buChar char="●"/>
+            </a:pPr>
+            <a:r>
+              <a:rPr lang="pt-BR"/>
+              <a:t>Scripts Terraform</a:t>
+            </a:r>
+            <a:endParaRPr/>
+          </a:p>
+          <a:p>
+            <a:pPr indent="-311150" lvl="0" marL="457200" rtl="0" algn="l">
+              <a:lnSpc>
+                <a:spcPct val="115000"/>
+              </a:lnSpc>
+              <a:spcBef>
+                <a:spcPts val="0"/>
+              </a:spcBef>
+              <a:spcAft>
+                <a:spcPts val="0"/>
+              </a:spcAft>
+              <a:buSzPts val="1300"/>
+              <a:buChar char="●"/>
+            </a:pPr>
+            <a:r>
+              <a:rPr lang="pt-BR"/>
+              <a:t>SonarCloud</a:t>
+            </a:r>
+            <a:endParaRPr/>
+          </a:p>
+          <a:p>
+            <a:pPr indent="-311150" lvl="0" marL="457200" rtl="0" algn="l">
+              <a:lnSpc>
+                <a:spcPct val="115000"/>
+              </a:lnSpc>
+              <a:spcBef>
+                <a:spcPts val="0"/>
+              </a:spcBef>
+              <a:spcAft>
+                <a:spcPts val="0"/>
+              </a:spcAft>
+              <a:buSzPts val="1300"/>
+              <a:buChar char="●"/>
+            </a:pPr>
+            <a:r>
+              <a:rPr lang="pt-BR"/>
+              <a:t>OWASP Zap</a:t>
+            </a:r>
+            <a:endParaRPr/>
+          </a:p>
+        </p:txBody>
+      </p:sp>
+      <p:sp>
+        <p:nvSpPr>
+          <p:cNvPr id="172" name="Google Shape;172;p29"/>
+          <p:cNvSpPr txBox="1"/>
+          <p:nvPr>
+            <p:ph idx="2" type="body"/>
+          </p:nvPr>
+        </p:nvSpPr>
+        <p:spPr>
+          <a:xfrm>
+            <a:off x="4832400" y="1505700"/>
+            <a:ext cx="3999900" cy="3076200"/>
+          </a:xfrm>
+          <a:prstGeom prst="rect">
+            <a:avLst/>
+          </a:prstGeom>
+          <a:noFill/>
+          <a:ln>
+            <a:noFill/>
+          </a:ln>
+        </p:spPr>
+        <p:txBody>
+          <a:bodyPr anchorCtr="0" anchor="t" bIns="91425" lIns="91425" spcFirstLastPara="1" rIns="91425" wrap="square" tIns="91425">
+            <a:normAutofit fontScale="92500" lnSpcReduction="20000"/>
+          </a:bodyPr>
+          <a:lstStyle/>
+          <a:p>
+            <a:pPr indent="0" lvl="0" marL="0" rtl="0" algn="l">
+              <a:lnSpc>
+                <a:spcPct val="115000"/>
+              </a:lnSpc>
+              <a:spcBef>
+                <a:spcPts val="0"/>
+              </a:spcBef>
+              <a:spcAft>
+                <a:spcPts val="0"/>
+              </a:spcAft>
+              <a:buSzPct val="100000"/>
+              <a:buNone/>
+            </a:pPr>
+            <a:r>
+              <a:rPr lang="pt-BR"/>
+              <a:t>Tecnologias usadas</a:t>
+            </a:r>
+            <a:endParaRPr/>
+          </a:p>
+          <a:p>
+            <a:pPr indent="-304958" lvl="0" marL="457200" rtl="0" algn="l">
+              <a:lnSpc>
+                <a:spcPct val="115000"/>
+              </a:lnSpc>
+              <a:spcBef>
+                <a:spcPts val="0"/>
+              </a:spcBef>
+              <a:spcAft>
+                <a:spcPts val="0"/>
+              </a:spcAft>
+              <a:buSzPct val="100000"/>
+              <a:buChar char="●"/>
+            </a:pPr>
+            <a:r>
+              <a:rPr lang="pt-BR"/>
+              <a:t>C#/.NET</a:t>
+            </a:r>
+            <a:endParaRPr/>
+          </a:p>
+          <a:p>
+            <a:pPr indent="-304958" lvl="0" marL="457200" rtl="0" algn="l">
+              <a:lnSpc>
+                <a:spcPct val="115000"/>
+              </a:lnSpc>
+              <a:spcBef>
+                <a:spcPts val="0"/>
+              </a:spcBef>
+              <a:spcAft>
+                <a:spcPts val="0"/>
+              </a:spcAft>
+              <a:buSzPct val="100000"/>
+              <a:buChar char="●"/>
+            </a:pPr>
+            <a:r>
+              <a:rPr lang="pt-BR"/>
+              <a:t>DockerHub</a:t>
+            </a:r>
+            <a:endParaRPr/>
+          </a:p>
+          <a:p>
+            <a:pPr indent="-304958" lvl="0" marL="457200" rtl="0" algn="l">
+              <a:lnSpc>
+                <a:spcPct val="115000"/>
+              </a:lnSpc>
+              <a:spcBef>
+                <a:spcPts val="0"/>
+              </a:spcBef>
+              <a:spcAft>
+                <a:spcPts val="0"/>
+              </a:spcAft>
+              <a:buSzPct val="100000"/>
+              <a:buChar char="●"/>
+            </a:pPr>
+            <a:r>
+              <a:rPr lang="pt-BR"/>
+              <a:t>AWS</a:t>
+            </a:r>
+            <a:endParaRPr/>
+          </a:p>
+          <a:p>
+            <a:pPr indent="-293211" lvl="1" marL="914400" marR="0" rtl="0" algn="l">
+              <a:lnSpc>
+                <a:spcPct val="115000"/>
+              </a:lnSpc>
+              <a:spcBef>
+                <a:spcPts val="0"/>
+              </a:spcBef>
+              <a:spcAft>
+                <a:spcPts val="0"/>
+              </a:spcAft>
+              <a:buSzPct val="84615"/>
+              <a:buChar char="○"/>
+            </a:pPr>
+            <a:r>
+              <a:rPr lang="pt-BR" sz="1300"/>
+              <a:t>DynamoDB</a:t>
+            </a:r>
+            <a:endParaRPr sz="1300"/>
+          </a:p>
+          <a:p>
+            <a:pPr indent="-304958" lvl="1" marL="914400" marR="0" rtl="0" algn="l">
+              <a:lnSpc>
+                <a:spcPct val="115000"/>
+              </a:lnSpc>
+              <a:spcBef>
+                <a:spcPts val="0"/>
+              </a:spcBef>
+              <a:spcAft>
+                <a:spcPts val="0"/>
+              </a:spcAft>
+              <a:buSzPct val="100000"/>
+              <a:buChar char="○"/>
+            </a:pPr>
+            <a:r>
+              <a:rPr lang="pt-BR" sz="1300"/>
+              <a:t>DynamoDB DAX</a:t>
+            </a:r>
+            <a:endParaRPr sz="1300"/>
+          </a:p>
+          <a:p>
+            <a:pPr indent="-293211" lvl="1" marL="914400" marR="0" rtl="0" algn="l">
+              <a:lnSpc>
+                <a:spcPct val="115000"/>
+              </a:lnSpc>
+              <a:spcBef>
+                <a:spcPts val="0"/>
+              </a:spcBef>
+              <a:spcAft>
+                <a:spcPts val="0"/>
+              </a:spcAft>
+              <a:buSzPct val="84615"/>
+              <a:buChar char="○"/>
+            </a:pPr>
+            <a:r>
+              <a:rPr lang="pt-BR" sz="1300"/>
+              <a:t>EKS / Kubernetes</a:t>
+            </a:r>
+            <a:endParaRPr sz="1300"/>
+          </a:p>
+          <a:p>
+            <a:pPr indent="-293211" lvl="1" marL="914400" marR="0" rtl="0" algn="l">
+              <a:lnSpc>
+                <a:spcPct val="115000"/>
+              </a:lnSpc>
+              <a:spcBef>
+                <a:spcPts val="0"/>
+              </a:spcBef>
+              <a:spcAft>
+                <a:spcPts val="0"/>
+              </a:spcAft>
+              <a:buSzPct val="84615"/>
+              <a:buChar char="○"/>
+            </a:pPr>
+            <a:r>
+              <a:rPr lang="pt-BR" sz="1300"/>
+              <a:t>AWS Lambda</a:t>
+            </a:r>
+            <a:endParaRPr sz="1300"/>
+          </a:p>
+          <a:p>
+            <a:pPr indent="-293211" lvl="1" marL="914400" marR="0" rtl="0" algn="l">
+              <a:lnSpc>
+                <a:spcPct val="115000"/>
+              </a:lnSpc>
+              <a:spcBef>
+                <a:spcPts val="0"/>
+              </a:spcBef>
+              <a:spcAft>
+                <a:spcPts val="0"/>
+              </a:spcAft>
+              <a:buSzPct val="84615"/>
+              <a:buChar char="○"/>
+            </a:pPr>
+            <a:r>
+              <a:rPr lang="pt-BR" sz="1300"/>
+              <a:t>API Gateway</a:t>
+            </a:r>
+            <a:endParaRPr sz="1300"/>
+          </a:p>
+          <a:p>
+            <a:pPr indent="-293211" lvl="1" marL="914400" marR="0" rtl="0" algn="l">
+              <a:lnSpc>
+                <a:spcPct val="115000"/>
+              </a:lnSpc>
+              <a:spcBef>
+                <a:spcPts val="0"/>
+              </a:spcBef>
+              <a:spcAft>
+                <a:spcPts val="0"/>
+              </a:spcAft>
+              <a:buSzPct val="84615"/>
+              <a:buChar char="○"/>
+            </a:pPr>
+            <a:r>
+              <a:rPr lang="pt-BR" sz="1300"/>
+              <a:t>S3 Bucket</a:t>
+            </a:r>
+            <a:endParaRPr sz="1300"/>
+          </a:p>
+          <a:p>
+            <a:pPr indent="-293211" lvl="1" marL="914400" marR="0" rtl="0" algn="l">
+              <a:lnSpc>
+                <a:spcPct val="115000"/>
+              </a:lnSpc>
+              <a:spcBef>
+                <a:spcPts val="0"/>
+              </a:spcBef>
+              <a:spcAft>
+                <a:spcPts val="0"/>
+              </a:spcAft>
+              <a:buSzPct val="84615"/>
+              <a:buChar char="○"/>
+            </a:pPr>
+            <a:r>
+              <a:rPr lang="pt-BR" sz="1300"/>
+              <a:t>WAF</a:t>
+            </a:r>
+            <a:endParaRPr sz="1300"/>
+          </a:p>
+          <a:p>
+            <a:pPr indent="-293211" lvl="1" marL="914400" marR="0" rtl="0" algn="l">
+              <a:lnSpc>
+                <a:spcPct val="115000"/>
+              </a:lnSpc>
+              <a:spcBef>
+                <a:spcPts val="0"/>
+              </a:spcBef>
+              <a:spcAft>
+                <a:spcPts val="0"/>
+              </a:spcAft>
+              <a:buSzPct val="84615"/>
+              <a:buChar char="○"/>
+            </a:pPr>
+            <a:r>
+              <a:rPr lang="pt-BR" sz="1300"/>
+              <a:t>Route53</a:t>
+            </a:r>
+            <a:endParaRPr sz="1300"/>
+          </a:p>
+          <a:p>
+            <a:pPr indent="-293211" lvl="1" marL="914400" marR="0" rtl="0" algn="l">
+              <a:lnSpc>
+                <a:spcPct val="115000"/>
+              </a:lnSpc>
+              <a:spcBef>
+                <a:spcPts val="0"/>
+              </a:spcBef>
+              <a:spcAft>
+                <a:spcPts val="0"/>
+              </a:spcAft>
+              <a:buSzPct val="84615"/>
+              <a:buChar char="○"/>
+            </a:pPr>
+            <a:r>
+              <a:rPr lang="pt-BR" sz="1300"/>
+              <a:t>AWS Shield</a:t>
+            </a:r>
+            <a:endParaRPr sz="1300"/>
+          </a:p>
+          <a:p>
+            <a:pPr indent="-293211" lvl="1" marL="914400" marR="0" rtl="0" algn="l">
+              <a:lnSpc>
+                <a:spcPct val="115000"/>
+              </a:lnSpc>
+              <a:spcBef>
+                <a:spcPts val="0"/>
+              </a:spcBef>
+              <a:spcAft>
+                <a:spcPts val="0"/>
+              </a:spcAft>
+              <a:buSzPct val="84615"/>
+              <a:buChar char="○"/>
+            </a:pPr>
+            <a:r>
+              <a:rPr lang="pt-BR" sz="1300"/>
+              <a:t>CloudFront</a:t>
+            </a:r>
+            <a:endParaRPr sz="1300"/>
+          </a:p>
+          <a:p>
+            <a:pPr indent="-293211" lvl="1" marL="914400" marR="0" rtl="0" algn="l">
+              <a:lnSpc>
+                <a:spcPct val="115000"/>
+              </a:lnSpc>
+              <a:spcBef>
+                <a:spcPts val="0"/>
+              </a:spcBef>
+              <a:spcAft>
+                <a:spcPts val="0"/>
+              </a:spcAft>
+              <a:buSzPct val="84615"/>
+              <a:buChar char="○"/>
+            </a:pPr>
+            <a:r>
+              <a:rPr lang="pt-BR" sz="1300"/>
+              <a:t>NLB (Network Load Balancer)</a:t>
+            </a:r>
+            <a:endParaRPr sz="1300"/>
+          </a:p>
+          <a:p>
+            <a:pPr indent="-293211" lvl="1" marL="914400" marR="0" rtl="0" algn="l">
+              <a:lnSpc>
+                <a:spcPct val="115000"/>
+              </a:lnSpc>
+              <a:spcBef>
+                <a:spcPts val="0"/>
+              </a:spcBef>
+              <a:spcAft>
+                <a:spcPts val="0"/>
+              </a:spcAft>
+              <a:buSzPct val="84615"/>
+              <a:buChar char="○"/>
+            </a:pPr>
+            <a:r>
+              <a:rPr lang="pt-BR" sz="1300"/>
+              <a:t>VPC Link</a:t>
+            </a:r>
+            <a:endParaRPr/>
+          </a:p>
+        </p:txBody>
+      </p:sp>
+      <p:sp>
+        <p:nvSpPr>
+          <p:cNvPr id="173" name="Google Shape;173;p29"/>
+          <p:cNvSpPr txBox="1"/>
+          <p:nvPr>
+            <p:ph type="title"/>
+          </p:nvPr>
+        </p:nvSpPr>
+        <p:spPr>
+          <a:xfrm>
+            <a:off x="311700" y="381300"/>
+            <a:ext cx="8520600" cy="623700"/>
+          </a:xfrm>
+          <a:prstGeom prst="rect">
+            <a:avLst/>
+          </a:prstGeom>
+          <a:noFill/>
+          <a:ln>
+            <a:noFill/>
+          </a:ln>
+        </p:spPr>
+        <p:txBody>
+          <a:bodyPr anchorCtr="0" anchor="t" bIns="91425" lIns="91425" spcFirstLastPara="1" rIns="91425" wrap="square" tIns="91425">
+            <a:normAutofit/>
+          </a:bodyPr>
+          <a:lstStyle/>
+          <a:p>
+            <a:pPr indent="0" lvl="0" marL="0" rtl="0" algn="l">
+              <a:lnSpc>
+                <a:spcPct val="100000"/>
+              </a:lnSpc>
+              <a:spcBef>
+                <a:spcPts val="0"/>
+              </a:spcBef>
+              <a:spcAft>
+                <a:spcPts val="0"/>
+              </a:spcAft>
+              <a:buSzPts val="2800"/>
+              <a:buNone/>
+            </a:pPr>
+            <a:r>
+              <a:rPr b="1" lang="pt-BR"/>
+              <a:t>Justificativas</a:t>
+            </a:r>
+            <a:endParaRPr b="1">
+              <a:highlight>
+                <a:schemeClr val="accent1"/>
+              </a:highlight>
+            </a:endParaRPr>
+          </a:p>
+        </p:txBody>
+      </p:sp>
+    </p:spTree>
+  </p:cSld>
+  <p:clrMapOvr>
+    <a:masterClrMapping/>
+  </p:clrMapOvr>
+</p:sld>
+</file>
+
+<file path=ppt/slides/slide18.xml><?xml version="1.0" encoding="utf-8"?>
+<p:sld xmlns:a="http://schemas.openxmlformats.org/drawingml/2006/main" xmlns:r="http://schemas.openxmlformats.org/officeDocument/2006/relationships" xmlns:mc="http://schemas.openxmlformats.org/markup-compatibility/2006" xmlns:mv="urn:schemas-microsoft-com:mac:vml" xmlns:p="http://schemas.openxmlformats.org/presentationml/2006/main" xmlns:c="http://schemas.openxmlformats.org/drawingml/2006/chart" xmlns:dgm="http://schemas.openxmlformats.org/drawingml/2006/diagram" xmlns:o="urn:schemas-microsoft-com:office:office" xmlns:v="urn:schemas-microsoft-com:vml" xmlns:pvml="urn:schemas-microsoft-com:office:powerpoint" xmlns:com="http://schemas.openxmlformats.org/drawingml/2006/compatibility" xmlns:p14="http://schemas.microsoft.com/office/powerpoint/2010/main" xmlns:p15="http://schemas.microsoft.com/office/powerpoint/2012/main" xmlns:ahyp="http://schemas.microsoft.com/office/drawing/2018/hyperlinkcolor">
+  <p:cSld>
+    <p:spTree>
+      <p:nvGrpSpPr>
+        <p:cNvPr id="177" name="Shape 177"/>
+        <p:cNvGrpSpPr/>
+        <p:nvPr/>
+      </p:nvGrpSpPr>
+      <p:grpSpPr>
+        <a:xfrm>
+          <a:off x="0" y="0"/>
+          <a:ext cx="0" cy="0"/>
+          <a:chOff x="0" y="0"/>
+          <a:chExt cx="0" cy="0"/>
+        </a:xfrm>
+      </p:grpSpPr>
+      <p:sp>
+        <p:nvSpPr>
+          <p:cNvPr id="178" name="Google Shape;178;p30"/>
           <p:cNvSpPr txBox="1"/>
           <p:nvPr>
             <p:ph type="ctrTitle"/>
@@ -13507,7 +14325,7 @@
       </p:sp>
       <p:sp>
         <p:nvSpPr>
-          <p:cNvPr id="157" name="Google Shape;157;p27"/>
+          <p:cNvPr id="179" name="Google Shape;179;p30"/>
           <p:cNvSpPr txBox="1"/>
           <p:nvPr>
             <p:ph idx="1" type="subTitle"/>
@@ -13818,7 +14636,7 @@
       </p:sp>
       <p:sp>
         <p:nvSpPr>
-          <p:cNvPr id="158" name="Google Shape;158;p27"/>
+          <p:cNvPr id="180" name="Google Shape;180;p30"/>
           <p:cNvSpPr txBox="1"/>
           <p:nvPr>
             <p:ph idx="1" type="subTitle"/>
@@ -13904,7 +14722,7 @@
       </p:sp>
       <p:pic>
         <p:nvPicPr>
-          <p:cNvPr descr="Interface gráfica do usuário, Aplicativo&#10;&#10;Descrição gerada automaticamente" id="159" name="Google Shape;159;p27"/>
+          <p:cNvPr descr="Interface gráfica do usuário, Aplicativo&#10;&#10;Descrição gerada automaticamente" id="181" name="Google Shape;181;p30"/>
           <p:cNvPicPr preferRelativeResize="0"/>
           <p:nvPr/>
         </p:nvPicPr>
@@ -13931,7 +14749,7 @@
       </p:pic>
       <p:sp>
         <p:nvSpPr>
-          <p:cNvPr id="160" name="Google Shape;160;p27"/>
+          <p:cNvPr id="182" name="Google Shape;182;p30"/>
           <p:cNvSpPr txBox="1"/>
           <p:nvPr/>
         </p:nvSpPr>
@@ -16185,17 +17003,18 @@
           <p:cNvPicPr preferRelativeResize="0"/>
           <p:nvPr/>
         </p:nvPicPr>
-        <p:blipFill rotWithShape="1">
+        <p:blipFill>
           <a:blip r:embed="rId3">
             <a:alphaModFix/>
           </a:blip>
-          <a:srcRect b="0" l="0" r="0" t="0"/>
-          <a:stretch/>
+          <a:stretch>
+            <a:fillRect/>
+          </a:stretch>
         </p:blipFill>
         <p:spPr>
           <a:xfrm>
-            <a:off x="2782938" y="1309800"/>
-            <a:ext cx="3578120" cy="3833700"/>
+            <a:off x="3010375" y="1271100"/>
+            <a:ext cx="3123275" cy="3872398"/>
           </a:xfrm>
           <a:prstGeom prst="rect">
             <a:avLst/>
@@ -16296,17 +17115,18 @@
           <p:cNvPicPr preferRelativeResize="0"/>
           <p:nvPr/>
         </p:nvPicPr>
-        <p:blipFill rotWithShape="1">
+        <p:blipFill>
           <a:blip r:embed="rId3">
             <a:alphaModFix/>
           </a:blip>
-          <a:srcRect b="0" l="0" r="0" t="0"/>
-          <a:stretch/>
+          <a:stretch>
+            <a:fillRect/>
+          </a:stretch>
         </p:blipFill>
         <p:spPr>
           <a:xfrm>
-            <a:off x="1257863" y="1309800"/>
-            <a:ext cx="6628266" cy="3833700"/>
+            <a:off x="1793650" y="1309800"/>
+            <a:ext cx="5556711" cy="3833700"/>
           </a:xfrm>
           <a:prstGeom prst="rect">
             <a:avLst/>
@@ -16328,6 +17148,13 @@
 <file path=ppt/slides/slide9.xml><?xml version="1.0" encoding="utf-8"?>
 <p:sld xmlns:a="http://schemas.openxmlformats.org/drawingml/2006/main" xmlns:r="http://schemas.openxmlformats.org/officeDocument/2006/relationships" xmlns:mc="http://schemas.openxmlformats.org/markup-compatibility/2006" xmlns:mv="urn:schemas-microsoft-com:mac:vml" xmlns:p="http://schemas.openxmlformats.org/presentationml/2006/main" xmlns:c="http://schemas.openxmlformats.org/drawingml/2006/chart" xmlns:dgm="http://schemas.openxmlformats.org/drawingml/2006/diagram" xmlns:o="urn:schemas-microsoft-com:office:office" xmlns:v="urn:schemas-microsoft-com:vml" xmlns:pvml="urn:schemas-microsoft-com:office:powerpoint" xmlns:com="http://schemas.openxmlformats.org/drawingml/2006/compatibility" xmlns:p14="http://schemas.microsoft.com/office/powerpoint/2010/main" xmlns:p15="http://schemas.microsoft.com/office/powerpoint/2012/main" xmlns:ahyp="http://schemas.microsoft.com/office/drawing/2018/hyperlinkcolor">
   <p:cSld>
+    <p:bg>
+      <p:bgPr>
+        <a:solidFill>
+          <a:schemeClr val="lt1"/>
+        </a:solidFill>
+      </p:bgPr>
+    </p:bg>
     <p:spTree>
       <p:nvGrpSpPr>
         <p:cNvPr id="118" name="Shape 118"/>
@@ -16347,13 +17174,13 @@
           <p:cNvPr id="119" name="Google Shape;119;p21"/>
           <p:cNvSpPr txBox="1"/>
           <p:nvPr>
-            <p:ph type="ctrTitle"/>
+            <p:ph type="title"/>
           </p:nvPr>
         </p:nvSpPr>
         <p:spPr>
           <a:xfrm>
-            <a:off x="311700" y="539725"/>
-            <a:ext cx="6561900" cy="702900"/>
+            <a:off x="311700" y="381300"/>
+            <a:ext cx="8520600" cy="623700"/>
           </a:xfrm>
           <a:prstGeom prst="rect">
             <a:avLst/>
@@ -16365,7 +17192,7 @@
         </p:spPr>
         <p:txBody>
           <a:bodyPr anchorCtr="0" anchor="t" bIns="91425" lIns="91425" spcFirstLastPara="1" rIns="91425" wrap="square" tIns="91425">
-            <a:normAutofit fontScale="90000"/>
+            <a:normAutofit/>
           </a:bodyPr>
           <a:lstStyle/>
           <a:p>
@@ -16379,12 +17206,12 @@
               <a:spcAft>
                 <a:spcPts val="0"/>
               </a:spcAft>
-              <a:buSzPct val="111111"/>
+              <a:buSzPts val="2800"/>
               <a:buNone/>
             </a:pPr>
             <a:r>
               <a:rPr b="1" lang="pt-BR"/>
-              <a:t>Repositórios &amp; Pipelines CI/CD</a:t>
+              <a:t>Solução MVP - Estimativa de custos</a:t>
             </a:r>
             <a:endParaRPr b="1">
               <a:highlight>
@@ -16392,48 +17219,26 @@
               </a:highlight>
             </a:endParaRPr>
           </a:p>
-          <a:p>
-            <a:pPr indent="0" lvl="0" marL="0" rtl="0" algn="l">
-              <a:lnSpc>
-                <a:spcPct val="100000"/>
-              </a:lnSpc>
-              <a:spcBef>
-                <a:spcPts val="0"/>
-              </a:spcBef>
-              <a:spcAft>
-                <a:spcPts val="0"/>
-              </a:spcAft>
-              <a:buSzPct val="125000"/>
-              <a:buNone/>
-            </a:pPr>
-            <a:r>
-              <a:t/>
-            </a:r>
-            <a:endParaRPr b="1" sz="3200">
-              <a:solidFill>
-                <a:srgbClr val="002F4A"/>
-              </a:solidFill>
-            </a:endParaRPr>
-          </a:p>
         </p:txBody>
       </p:sp>
       <p:pic>
         <p:nvPicPr>
-          <p:cNvPr descr="Interface gráfica do usuário, Aplicativo&#10;&#10;Descrição gerada automaticamente" id="120" name="Google Shape;120;p21"/>
+          <p:cNvPr id="120" name="Google Shape;120;p21"/>
           <p:cNvPicPr preferRelativeResize="0"/>
           <p:nvPr/>
         </p:nvPicPr>
-        <p:blipFill rotWithShape="1">
+        <p:blipFill>
           <a:blip r:embed="rId3">
             <a:alphaModFix/>
           </a:blip>
-          <a:srcRect b="0" l="0" r="0" t="0"/>
-          <a:stretch/>
+          <a:stretch>
+            <a:fillRect/>
+          </a:stretch>
         </p:blipFill>
         <p:spPr>
           <a:xfrm>
-            <a:off x="6963325" y="-97200"/>
-            <a:ext cx="2814625" cy="1759150"/>
+            <a:off x="0" y="1275650"/>
+            <a:ext cx="7282201" cy="3867850"/>
           </a:xfrm>
           <a:prstGeom prst="rect">
             <a:avLst/>
@@ -16444,6 +17249,131 @@
           </a:ln>
         </p:spPr>
       </p:pic>
+      <p:sp>
+        <p:nvSpPr>
+          <p:cNvPr id="121" name="Google Shape;121;p21"/>
+          <p:cNvSpPr txBox="1"/>
+          <p:nvPr/>
+        </p:nvSpPr>
+        <p:spPr>
+          <a:xfrm>
+            <a:off x="7390100" y="2817025"/>
+            <a:ext cx="1625700" cy="785100"/>
+          </a:xfrm>
+          <a:prstGeom prst="rect">
+            <a:avLst/>
+          </a:prstGeom>
+          <a:noFill/>
+          <a:ln>
+            <a:noFill/>
+          </a:ln>
+        </p:spPr>
+        <p:txBody>
+          <a:bodyPr anchorCtr="0" anchor="t" bIns="91425" lIns="91425" spcFirstLastPara="1" rIns="91425" wrap="square" tIns="91425">
+            <a:spAutoFit/>
+          </a:bodyPr>
+          <a:lstStyle/>
+          <a:p>
+            <a:pPr indent="0" lvl="0" marL="0" rtl="0" algn="l">
+              <a:spcBef>
+                <a:spcPts val="0"/>
+              </a:spcBef>
+              <a:spcAft>
+                <a:spcPts val="0"/>
+              </a:spcAft>
+              <a:buNone/>
+            </a:pPr>
+            <a:r>
+              <a:rPr b="1" lang="pt-BR" sz="1300">
+                <a:solidFill>
+                  <a:schemeClr val="dk2"/>
+                </a:solidFill>
+                <a:latin typeface="Roboto"/>
+                <a:ea typeface="Roboto"/>
+                <a:cs typeface="Roboto"/>
+                <a:sym typeface="Roboto"/>
+              </a:rPr>
+              <a:t>Dólar</a:t>
+            </a:r>
+            <a:r>
+              <a:rPr b="1" lang="pt-BR" sz="1300">
+                <a:solidFill>
+                  <a:schemeClr val="dk2"/>
+                </a:solidFill>
+                <a:latin typeface="Roboto"/>
+                <a:ea typeface="Roboto"/>
+                <a:cs typeface="Roboto"/>
+                <a:sym typeface="Roboto"/>
+              </a:rPr>
+              <a:t> Hoje (25/07/2024): R$5,64</a:t>
+            </a:r>
+            <a:endParaRPr b="1" sz="1300">
+              <a:solidFill>
+                <a:schemeClr val="dk2"/>
+              </a:solidFill>
+              <a:latin typeface="Roboto"/>
+              <a:ea typeface="Roboto"/>
+              <a:cs typeface="Roboto"/>
+              <a:sym typeface="Roboto"/>
+            </a:endParaRPr>
+          </a:p>
+        </p:txBody>
+      </p:sp>
+      <p:sp>
+        <p:nvSpPr>
+          <p:cNvPr id="122" name="Google Shape;122;p21"/>
+          <p:cNvSpPr txBox="1"/>
+          <p:nvPr/>
+        </p:nvSpPr>
+        <p:spPr>
+          <a:xfrm>
+            <a:off x="620750" y="4820400"/>
+            <a:ext cx="6954000" cy="323100"/>
+          </a:xfrm>
+          <a:prstGeom prst="rect">
+            <a:avLst/>
+          </a:prstGeom>
+          <a:noFill/>
+          <a:ln>
+            <a:noFill/>
+          </a:ln>
+        </p:spPr>
+        <p:txBody>
+          <a:bodyPr anchorCtr="0" anchor="t" bIns="91425" lIns="91425" spcFirstLastPara="1" rIns="91425" wrap="square" tIns="91425">
+            <a:spAutoFit/>
+          </a:bodyPr>
+          <a:lstStyle/>
+          <a:p>
+            <a:pPr indent="0" lvl="0" marL="0" rtl="0" algn="l">
+              <a:spcBef>
+                <a:spcPts val="0"/>
+              </a:spcBef>
+              <a:spcAft>
+                <a:spcPts val="0"/>
+              </a:spcAft>
+              <a:buNone/>
+            </a:pPr>
+            <a:r>
+              <a:rPr lang="pt-BR" sz="900" u="sng">
+                <a:solidFill>
+                  <a:schemeClr val="hlink"/>
+                </a:solidFill>
+                <a:hlinkClick r:id="rId4"/>
+              </a:rPr>
+              <a:t>https://calculator.aws/#/estimate?id=c58a1c309b01b71a1570f6eab13a80611dd103a8</a:t>
+            </a:r>
+            <a:endParaRPr sz="1000">
+              <a:solidFill>
+                <a:schemeClr val="dk2"/>
+              </a:solidFill>
+              <a:latin typeface="Roboto"/>
+              <a:ea typeface="Roboto"/>
+              <a:cs typeface="Roboto"/>
+              <a:sym typeface="Roboto"/>
+            </a:endParaRPr>
+          </a:p>
+        </p:txBody>
+      </p:sp>
     </p:spTree>
   </p:cSld>
   <p:clrMapOvr>

</xml_diff>